<commit_message>
Updated slides for BE Lunch and Learn and removed files not needed
</commit_message>
<xml_diff>
--- a/JUnit 5 HOL Intro Presentation.pptx
+++ b/JUnit 5 HOL Intro Presentation.pptx
@@ -6,25 +6,24 @@
     <p:sldMasterId id="2147483649" r:id="rId2"/>
   </p:sldMasterIdLst>
   <p:notesMasterIdLst>
-    <p:notesMasterId r:id="rId16"/>
+    <p:notesMasterId r:id="rId15"/>
   </p:notesMasterIdLst>
   <p:handoutMasterIdLst>
-    <p:handoutMasterId r:id="rId17"/>
+    <p:handoutMasterId r:id="rId16"/>
   </p:handoutMasterIdLst>
   <p:sldIdLst>
     <p:sldId id="304" r:id="rId3"/>
-    <p:sldId id="353" r:id="rId4"/>
-    <p:sldId id="360" r:id="rId5"/>
-    <p:sldId id="358" r:id="rId6"/>
-    <p:sldId id="348" r:id="rId7"/>
-    <p:sldId id="349" r:id="rId8"/>
-    <p:sldId id="351" r:id="rId9"/>
-    <p:sldId id="354" r:id="rId10"/>
-    <p:sldId id="356" r:id="rId11"/>
-    <p:sldId id="357" r:id="rId12"/>
-    <p:sldId id="355" r:id="rId13"/>
-    <p:sldId id="361" r:id="rId14"/>
-    <p:sldId id="352" r:id="rId15"/>
+    <p:sldId id="360" r:id="rId4"/>
+    <p:sldId id="358" r:id="rId5"/>
+    <p:sldId id="348" r:id="rId6"/>
+    <p:sldId id="349" r:id="rId7"/>
+    <p:sldId id="351" r:id="rId8"/>
+    <p:sldId id="354" r:id="rId9"/>
+    <p:sldId id="356" r:id="rId10"/>
+    <p:sldId id="357" r:id="rId11"/>
+    <p:sldId id="355" r:id="rId12"/>
+    <p:sldId id="361" r:id="rId13"/>
+    <p:sldId id="352" r:id="rId14"/>
   </p:sldIdLst>
   <p:sldSz cx="9144000" cy="5143500" type="screen16x9"/>
   <p:notesSz cx="7772400" cy="10058400"/>
@@ -260,7 +259,7 @@
           <p:cNvPr id="2" name="Header Placeholder 1">
             <a:extLst>
               <a:ext uri="{FF2B5EF4-FFF2-40B4-BE49-F238E27FC236}">
-                <a16:creationId xmlns:a16="http://schemas.microsoft.com/office/drawing/2014/main" id="{453B9FB4-F803-4A11-B284-0E56E05E0F94}"/>
+                <a16:creationId xmlns:a16="http://schemas.microsoft.com/office/drawing/2014/main" xmlns="" id="{453B9FB4-F803-4A11-B284-0E56E05E0F94}"/>
               </a:ext>
             </a:extLst>
           </p:cNvPr>
@@ -306,7 +305,7 @@
           <p:cNvPr id="3" name="Date Placeholder 2">
             <a:extLst>
               <a:ext uri="{FF2B5EF4-FFF2-40B4-BE49-F238E27FC236}">
-                <a16:creationId xmlns:a16="http://schemas.microsoft.com/office/drawing/2014/main" id="{3A17CBE3-AC17-45AA-A6F1-55F29A0E56CF}"/>
+                <a16:creationId xmlns:a16="http://schemas.microsoft.com/office/drawing/2014/main" xmlns="" id="{3A17CBE3-AC17-45AA-A6F1-55F29A0E56CF}"/>
               </a:ext>
             </a:extLst>
           </p:cNvPr>
@@ -341,7 +340,7 @@
             <a:fld id="{C5BBD3BA-3719-460E-AB4E-C01EFD63C495}" type="datetimeFigureOut">
               <a:rPr lang="en-US" altLang="en-US"/>
               <a:pPr/>
-              <a:t>4/11/2018</a:t>
+              <a:t>5/9/18</a:t>
             </a:fld>
             <a:endParaRPr lang="en-US" altLang="en-US"/>
           </a:p>
@@ -352,7 +351,7 @@
           <p:cNvPr id="4" name="Footer Placeholder 3">
             <a:extLst>
               <a:ext uri="{FF2B5EF4-FFF2-40B4-BE49-F238E27FC236}">
-                <a16:creationId xmlns:a16="http://schemas.microsoft.com/office/drawing/2014/main" id="{42EBECBC-D0CE-4A97-AD51-4A21AA5D0C36}"/>
+                <a16:creationId xmlns:a16="http://schemas.microsoft.com/office/drawing/2014/main" xmlns="" id="{42EBECBC-D0CE-4A97-AD51-4A21AA5D0C36}"/>
               </a:ext>
             </a:extLst>
           </p:cNvPr>
@@ -398,7 +397,7 @@
           <p:cNvPr id="5" name="Slide Number Placeholder 4">
             <a:extLst>
               <a:ext uri="{FF2B5EF4-FFF2-40B4-BE49-F238E27FC236}">
-                <a16:creationId xmlns:a16="http://schemas.microsoft.com/office/drawing/2014/main" id="{FDD31850-DD15-437A-BDB7-67839C74C72A}"/>
+                <a16:creationId xmlns:a16="http://schemas.microsoft.com/office/drawing/2014/main" xmlns="" id="{FDD31850-DD15-437A-BDB7-67839C74C72A}"/>
               </a:ext>
             </a:extLst>
           </p:cNvPr>
@@ -475,7 +474,7 @@
           <p:cNvPr id="3073" name="AutoShape 1">
             <a:extLst>
               <a:ext uri="{FF2B5EF4-FFF2-40B4-BE49-F238E27FC236}">
-                <a16:creationId xmlns:a16="http://schemas.microsoft.com/office/drawing/2014/main" id="{666EDFE5-EB85-404E-A67D-3A4DD6309133}"/>
+                <a16:creationId xmlns:a16="http://schemas.microsoft.com/office/drawing/2014/main" xmlns="" id="{666EDFE5-EB85-404E-A67D-3A4DD6309133}"/>
               </a:ext>
             </a:extLst>
           </p:cNvPr>
@@ -503,7 +502,7 @@
           <a:effectLst/>
           <a:extLst>
             <a:ext uri="{91240B29-F687-4f45-9708-019B960494DF}">
-              <a14:hiddenLine xmlns:a14="http://schemas.microsoft.com/office/drawing/2010/main" xmlns="" w="9525" cap="flat">
+              <a14:hiddenLine xmlns="" xmlns:a14="http://schemas.microsoft.com/office/drawing/2010/main" w="9525" cap="flat">
                 <a:solidFill>
                   <a:srgbClr val="808080"/>
                 </a:solidFill>
@@ -513,7 +512,7 @@
               </a14:hiddenLine>
             </a:ext>
             <a:ext uri="{AF507438-7753-43e0-B8FC-AC1667EBCBE1}">
-              <a14:hiddenEffects xmlns:a14="http://schemas.microsoft.com/office/drawing/2010/main" xmlns="">
+              <a14:hiddenEffects xmlns="" xmlns:a14="http://schemas.microsoft.com/office/drawing/2010/main">
                 <a:effectLst>
                   <a:outerShdw blurRad="63500" dist="38099" dir="2700000" algn="ctr" rotWithShape="0">
                     <a:srgbClr val="000000">
@@ -547,7 +546,7 @@
           <p:cNvPr id="3074" name="AutoShape 2">
             <a:extLst>
               <a:ext uri="{FF2B5EF4-FFF2-40B4-BE49-F238E27FC236}">
-                <a16:creationId xmlns:a16="http://schemas.microsoft.com/office/drawing/2014/main" id="{4D05DBB6-AEB1-4ED2-84A6-103FC6E9C78B}"/>
+                <a16:creationId xmlns:a16="http://schemas.microsoft.com/office/drawing/2014/main" xmlns="" id="{4D05DBB6-AEB1-4ED2-84A6-103FC6E9C78B}"/>
               </a:ext>
             </a:extLst>
           </p:cNvPr>
@@ -575,7 +574,7 @@
           <a:effectLst/>
           <a:extLst>
             <a:ext uri="{91240B29-F687-4f45-9708-019B960494DF}">
-              <a14:hiddenLine xmlns:a14="http://schemas.microsoft.com/office/drawing/2010/main" xmlns="" w="9525" cap="flat">
+              <a14:hiddenLine xmlns="" xmlns:a14="http://schemas.microsoft.com/office/drawing/2010/main" w="9525" cap="flat">
                 <a:solidFill>
                   <a:srgbClr val="808080"/>
                 </a:solidFill>
@@ -585,7 +584,7 @@
               </a14:hiddenLine>
             </a:ext>
             <a:ext uri="{AF507438-7753-43e0-B8FC-AC1667EBCBE1}">
-              <a14:hiddenEffects xmlns:a14="http://schemas.microsoft.com/office/drawing/2010/main" xmlns="">
+              <a14:hiddenEffects xmlns="" xmlns:a14="http://schemas.microsoft.com/office/drawing/2010/main">
                 <a:effectLst>
                   <a:outerShdw blurRad="63500" dist="38099" dir="2700000" algn="ctr" rotWithShape="0">
                     <a:srgbClr val="000000">
@@ -619,7 +618,7 @@
           <p:cNvPr id="3075" name="AutoShape 3">
             <a:extLst>
               <a:ext uri="{FF2B5EF4-FFF2-40B4-BE49-F238E27FC236}">
-                <a16:creationId xmlns:a16="http://schemas.microsoft.com/office/drawing/2014/main" id="{B2F0B214-DE88-4C5C-900E-5C98545DE895}"/>
+                <a16:creationId xmlns:a16="http://schemas.microsoft.com/office/drawing/2014/main" xmlns="" id="{B2F0B214-DE88-4C5C-900E-5C98545DE895}"/>
               </a:ext>
             </a:extLst>
           </p:cNvPr>
@@ -647,7 +646,7 @@
           <a:effectLst/>
           <a:extLst>
             <a:ext uri="{91240B29-F687-4f45-9708-019B960494DF}">
-              <a14:hiddenLine xmlns:a14="http://schemas.microsoft.com/office/drawing/2010/main" xmlns="" w="9525" cap="flat">
+              <a14:hiddenLine xmlns="" xmlns:a14="http://schemas.microsoft.com/office/drawing/2010/main" w="9525" cap="flat">
                 <a:solidFill>
                   <a:srgbClr val="808080"/>
                 </a:solidFill>
@@ -657,7 +656,7 @@
               </a14:hiddenLine>
             </a:ext>
             <a:ext uri="{AF507438-7753-43e0-B8FC-AC1667EBCBE1}">
-              <a14:hiddenEffects xmlns:a14="http://schemas.microsoft.com/office/drawing/2010/main" xmlns="">
+              <a14:hiddenEffects xmlns="" xmlns:a14="http://schemas.microsoft.com/office/drawing/2010/main">
                 <a:effectLst>
                   <a:outerShdw blurRad="63500" dist="38099" dir="2700000" algn="ctr" rotWithShape="0">
                     <a:srgbClr val="000000">
@@ -691,7 +690,7 @@
           <p:cNvPr id="3076" name="AutoShape 4">
             <a:extLst>
               <a:ext uri="{FF2B5EF4-FFF2-40B4-BE49-F238E27FC236}">
-                <a16:creationId xmlns:a16="http://schemas.microsoft.com/office/drawing/2014/main" id="{8ED13B74-80BA-4714-B61C-711D7C1B3FF0}"/>
+                <a16:creationId xmlns:a16="http://schemas.microsoft.com/office/drawing/2014/main" xmlns="" id="{8ED13B74-80BA-4714-B61C-711D7C1B3FF0}"/>
               </a:ext>
             </a:extLst>
           </p:cNvPr>
@@ -719,7 +718,7 @@
           <a:effectLst/>
           <a:extLst>
             <a:ext uri="{91240B29-F687-4f45-9708-019B960494DF}">
-              <a14:hiddenLine xmlns:a14="http://schemas.microsoft.com/office/drawing/2010/main" xmlns="" w="9525" cap="flat">
+              <a14:hiddenLine xmlns="" xmlns:a14="http://schemas.microsoft.com/office/drawing/2010/main" w="9525" cap="flat">
                 <a:solidFill>
                   <a:srgbClr val="808080"/>
                 </a:solidFill>
@@ -729,7 +728,7 @@
               </a14:hiddenLine>
             </a:ext>
             <a:ext uri="{AF507438-7753-43e0-B8FC-AC1667EBCBE1}">
-              <a14:hiddenEffects xmlns:a14="http://schemas.microsoft.com/office/drawing/2010/main" xmlns="">
+              <a14:hiddenEffects xmlns="" xmlns:a14="http://schemas.microsoft.com/office/drawing/2010/main">
                 <a:effectLst>
                   <a:outerShdw blurRad="63500" dist="38099" dir="2700000" algn="ctr" rotWithShape="0">
                     <a:srgbClr val="000000">
@@ -763,7 +762,7 @@
           <p:cNvPr id="3077" name="Rectangle 5">
             <a:extLst>
               <a:ext uri="{FF2B5EF4-FFF2-40B4-BE49-F238E27FC236}">
-                <a16:creationId xmlns:a16="http://schemas.microsoft.com/office/drawing/2014/main" id="{CAAEDCCA-13C1-423F-9F9E-9A6C8F3E68EF}"/>
+                <a16:creationId xmlns:a16="http://schemas.microsoft.com/office/drawing/2014/main" xmlns="" id="{CAAEDCCA-13C1-423F-9F9E-9A6C8F3E68EF}"/>
               </a:ext>
             </a:extLst>
           </p:cNvPr>
@@ -788,15 +787,18 @@
           </a:ln>
           <a:effectLst/>
           <a:extLst>
+            <a:ext uri="{FAA26D3D-D897-4be2-8F04-BA451C77F1D7}">
+              <ma14:placeholderFlag xmlns:ma14="http://schemas.microsoft.com/office/mac/drawingml/2011/main" val="1"/>
+            </a:ext>
             <a:ext uri="{909E8E84-426E-40dd-AFC4-6F175D3DCCD1}">
-              <a14:hiddenFill xmlns:a14="http://schemas.microsoft.com/office/drawing/2010/main" xmlns="">
+              <a14:hiddenFill xmlns="" xmlns:a14="http://schemas.microsoft.com/office/drawing/2010/main">
                 <a:solidFill>
                   <a:srgbClr val="FFFFFF"/>
                 </a:solidFill>
               </a14:hiddenFill>
             </a:ext>
             <a:ext uri="{91240B29-F687-4f45-9708-019B960494DF}">
-              <a14:hiddenLine xmlns:a14="http://schemas.microsoft.com/office/drawing/2010/main" xmlns="" w="9525" cap="flat">
+              <a14:hiddenLine xmlns="" xmlns:a14="http://schemas.microsoft.com/office/drawing/2010/main" w="9525" cap="flat">
                 <a:solidFill>
                   <a:srgbClr val="808080"/>
                 </a:solidFill>
@@ -806,7 +808,7 @@
               </a14:hiddenLine>
             </a:ext>
             <a:ext uri="{AF507438-7753-43e0-B8FC-AC1667EBCBE1}">
-              <a14:hiddenEffects xmlns:a14="http://schemas.microsoft.com/office/drawing/2010/main" xmlns="">
+              <a14:hiddenEffects xmlns="" xmlns:a14="http://schemas.microsoft.com/office/drawing/2010/main">
                 <a:effectLst>
                   <a:outerShdw blurRad="63500" dist="38099" dir="2700000" algn="ctr" rotWithShape="0">
                     <a:schemeClr val="bg2">
@@ -816,9 +818,6 @@
                 </a:effectLst>
               </a14:hiddenEffects>
             </a:ext>
-            <a:ext uri="{FAA26D3D-D897-4be2-8F04-BA451C77F1D7}">
-              <ma14:placeholderFlag xmlns:ma14="http://schemas.microsoft.com/office/mac/drawingml/2011/main" xmlns="" val="1"/>
-            </a:ext>
           </a:extLst>
         </p:spPr>
       </p:sp>
@@ -827,7 +826,7 @@
           <p:cNvPr id="3078" name="Rectangle 6">
             <a:extLst>
               <a:ext uri="{FF2B5EF4-FFF2-40B4-BE49-F238E27FC236}">
-                <a16:creationId xmlns:a16="http://schemas.microsoft.com/office/drawing/2014/main" id="{0817020D-F2A7-45C5-BCA1-32D5A9D9F811}"/>
+                <a16:creationId xmlns:a16="http://schemas.microsoft.com/office/drawing/2014/main" xmlns="" id="{0817020D-F2A7-45C5-BCA1-32D5A9D9F811}"/>
               </a:ext>
             </a:extLst>
           </p:cNvPr>
@@ -852,15 +851,18 @@
           </a:ln>
           <a:effectLst/>
           <a:extLst>
+            <a:ext uri="{FAA26D3D-D897-4be2-8F04-BA451C77F1D7}">
+              <ma14:placeholderFlag xmlns:ma14="http://schemas.microsoft.com/office/mac/drawingml/2011/main" val="1"/>
+            </a:ext>
             <a:ext uri="{909E8E84-426E-40dd-AFC4-6F175D3DCCD1}">
-              <a14:hiddenFill xmlns:a14="http://schemas.microsoft.com/office/drawing/2010/main" xmlns="">
+              <a14:hiddenFill xmlns="" xmlns:a14="http://schemas.microsoft.com/office/drawing/2010/main">
                 <a:solidFill>
                   <a:srgbClr val="FFFFFF"/>
                 </a:solidFill>
               </a14:hiddenFill>
             </a:ext>
             <a:ext uri="{91240B29-F687-4f45-9708-019B960494DF}">
-              <a14:hiddenLine xmlns:a14="http://schemas.microsoft.com/office/drawing/2010/main" xmlns="" w="9525" cap="flat">
+              <a14:hiddenLine xmlns="" xmlns:a14="http://schemas.microsoft.com/office/drawing/2010/main" w="9525" cap="flat">
                 <a:solidFill>
                   <a:srgbClr val="808080"/>
                 </a:solidFill>
@@ -870,7 +872,7 @@
               </a14:hiddenLine>
             </a:ext>
             <a:ext uri="{AF507438-7753-43e0-B8FC-AC1667EBCBE1}">
-              <a14:hiddenEffects xmlns:a14="http://schemas.microsoft.com/office/drawing/2010/main" xmlns="">
+              <a14:hiddenEffects xmlns="" xmlns:a14="http://schemas.microsoft.com/office/drawing/2010/main">
                 <a:effectLst>
                   <a:outerShdw blurRad="63500" dist="38099" dir="2700000" algn="ctr" rotWithShape="0">
                     <a:schemeClr val="bg2">
@@ -879,9 +881,6 @@
                   </a:outerShdw>
                 </a:effectLst>
               </a14:hiddenEffects>
-            </a:ext>
-            <a:ext uri="{FAA26D3D-D897-4be2-8F04-BA451C77F1D7}">
-              <ma14:placeholderFlag xmlns:ma14="http://schemas.microsoft.com/office/mac/drawingml/2011/main" xmlns="" val="1"/>
             </a:ext>
           </a:extLst>
         </p:spPr>
@@ -903,7 +902,7 @@
           <p:cNvPr id="3079" name="Text Box 7">
             <a:extLst>
               <a:ext uri="{FF2B5EF4-FFF2-40B4-BE49-F238E27FC236}">
-                <a16:creationId xmlns:a16="http://schemas.microsoft.com/office/drawing/2014/main" id="{D6D678BC-A474-4E1F-B9DA-2A33641EC5DC}"/>
+                <a16:creationId xmlns:a16="http://schemas.microsoft.com/office/drawing/2014/main" xmlns="" id="{D6D678BC-A474-4E1F-B9DA-2A33641EC5DC}"/>
               </a:ext>
             </a:extLst>
           </p:cNvPr>
@@ -927,14 +926,14 @@
           <a:effectLst/>
           <a:extLst>
             <a:ext uri="{909E8E84-426E-40dd-AFC4-6F175D3DCCD1}">
-              <a14:hiddenFill xmlns:a14="http://schemas.microsoft.com/office/drawing/2010/main" xmlns="">
+              <a14:hiddenFill xmlns="" xmlns:a14="http://schemas.microsoft.com/office/drawing/2010/main">
                 <a:solidFill>
                   <a:srgbClr val="FFFFFF"/>
                 </a:solidFill>
               </a14:hiddenFill>
             </a:ext>
             <a:ext uri="{91240B29-F687-4f45-9708-019B960494DF}">
-              <a14:hiddenLine xmlns:a14="http://schemas.microsoft.com/office/drawing/2010/main" xmlns="" w="9525" cap="flat">
+              <a14:hiddenLine xmlns="" xmlns:a14="http://schemas.microsoft.com/office/drawing/2010/main" w="9525" cap="flat">
                 <a:solidFill>
                   <a:srgbClr val="808080"/>
                 </a:solidFill>
@@ -944,7 +943,7 @@
               </a14:hiddenLine>
             </a:ext>
             <a:ext uri="{AF507438-7753-43e0-B8FC-AC1667EBCBE1}">
-              <a14:hiddenEffects xmlns:a14="http://schemas.microsoft.com/office/drawing/2010/main" xmlns="">
+              <a14:hiddenEffects xmlns="" xmlns:a14="http://schemas.microsoft.com/office/drawing/2010/main">
                 <a:effectLst>
                   <a:outerShdw blurRad="63500" dist="38099" dir="2700000" algn="ctr" rotWithShape="0">
                     <a:srgbClr val="000000">
@@ -978,7 +977,7 @@
           <p:cNvPr id="3080" name="Text Box 8">
             <a:extLst>
               <a:ext uri="{FF2B5EF4-FFF2-40B4-BE49-F238E27FC236}">
-                <a16:creationId xmlns:a16="http://schemas.microsoft.com/office/drawing/2014/main" id="{E56AD731-C436-4767-AC37-4A8270DF8087}"/>
+                <a16:creationId xmlns:a16="http://schemas.microsoft.com/office/drawing/2014/main" xmlns="" id="{E56AD731-C436-4767-AC37-4A8270DF8087}"/>
               </a:ext>
             </a:extLst>
           </p:cNvPr>
@@ -1002,14 +1001,14 @@
           <a:effectLst/>
           <a:extLst>
             <a:ext uri="{909E8E84-426E-40dd-AFC4-6F175D3DCCD1}">
-              <a14:hiddenFill xmlns:a14="http://schemas.microsoft.com/office/drawing/2010/main" xmlns="">
+              <a14:hiddenFill xmlns="" xmlns:a14="http://schemas.microsoft.com/office/drawing/2010/main">
                 <a:solidFill>
                   <a:srgbClr val="FFFFFF"/>
                 </a:solidFill>
               </a14:hiddenFill>
             </a:ext>
             <a:ext uri="{91240B29-F687-4f45-9708-019B960494DF}">
-              <a14:hiddenLine xmlns:a14="http://schemas.microsoft.com/office/drawing/2010/main" xmlns="" w="9525" cap="flat">
+              <a14:hiddenLine xmlns="" xmlns:a14="http://schemas.microsoft.com/office/drawing/2010/main" w="9525" cap="flat">
                 <a:solidFill>
                   <a:srgbClr val="808080"/>
                 </a:solidFill>
@@ -1019,7 +1018,7 @@
               </a14:hiddenLine>
             </a:ext>
             <a:ext uri="{AF507438-7753-43e0-B8FC-AC1667EBCBE1}">
-              <a14:hiddenEffects xmlns:a14="http://schemas.microsoft.com/office/drawing/2010/main" xmlns="">
+              <a14:hiddenEffects xmlns="" xmlns:a14="http://schemas.microsoft.com/office/drawing/2010/main">
                 <a:effectLst>
                   <a:outerShdw blurRad="63500" dist="38099" dir="2700000" algn="ctr" rotWithShape="0">
                     <a:srgbClr val="000000">
@@ -1053,7 +1052,7 @@
           <p:cNvPr id="3081" name="Text Box 9">
             <a:extLst>
               <a:ext uri="{FF2B5EF4-FFF2-40B4-BE49-F238E27FC236}">
-                <a16:creationId xmlns:a16="http://schemas.microsoft.com/office/drawing/2014/main" id="{8A47B6DE-BB96-4D13-A88F-484BA2EA42F0}"/>
+                <a16:creationId xmlns:a16="http://schemas.microsoft.com/office/drawing/2014/main" xmlns="" id="{8A47B6DE-BB96-4D13-A88F-484BA2EA42F0}"/>
               </a:ext>
             </a:extLst>
           </p:cNvPr>
@@ -1077,14 +1076,14 @@
           <a:effectLst/>
           <a:extLst>
             <a:ext uri="{909E8E84-426E-40dd-AFC4-6F175D3DCCD1}">
-              <a14:hiddenFill xmlns:a14="http://schemas.microsoft.com/office/drawing/2010/main" xmlns="">
+              <a14:hiddenFill xmlns="" xmlns:a14="http://schemas.microsoft.com/office/drawing/2010/main">
                 <a:solidFill>
                   <a:srgbClr val="FFFFFF"/>
                 </a:solidFill>
               </a14:hiddenFill>
             </a:ext>
             <a:ext uri="{91240B29-F687-4f45-9708-019B960494DF}">
-              <a14:hiddenLine xmlns:a14="http://schemas.microsoft.com/office/drawing/2010/main" xmlns="" w="9525" cap="flat">
+              <a14:hiddenLine xmlns="" xmlns:a14="http://schemas.microsoft.com/office/drawing/2010/main" w="9525" cap="flat">
                 <a:solidFill>
                   <a:srgbClr val="808080"/>
                 </a:solidFill>
@@ -1094,7 +1093,7 @@
               </a14:hiddenLine>
             </a:ext>
             <a:ext uri="{AF507438-7753-43e0-B8FC-AC1667EBCBE1}">
-              <a14:hiddenEffects xmlns:a14="http://schemas.microsoft.com/office/drawing/2010/main" xmlns="">
+              <a14:hiddenEffects xmlns="" xmlns:a14="http://schemas.microsoft.com/office/drawing/2010/main">
                 <a:effectLst>
                   <a:outerShdw blurRad="63500" dist="38099" dir="2700000" algn="ctr" rotWithShape="0">
                     <a:srgbClr val="000000">
@@ -1128,7 +1127,7 @@
           <p:cNvPr id="3082" name="Rectangle 10">
             <a:extLst>
               <a:ext uri="{FF2B5EF4-FFF2-40B4-BE49-F238E27FC236}">
-                <a16:creationId xmlns:a16="http://schemas.microsoft.com/office/drawing/2014/main" id="{BFC99F93-AE82-4BEB-879B-9AA93337083A}"/>
+                <a16:creationId xmlns:a16="http://schemas.microsoft.com/office/drawing/2014/main" xmlns="" id="{BFC99F93-AE82-4BEB-879B-9AA93337083A}"/>
               </a:ext>
             </a:extLst>
           </p:cNvPr>
@@ -1153,15 +1152,18 @@
           </a:ln>
           <a:effectLst/>
           <a:extLst>
+            <a:ext uri="{FAA26D3D-D897-4be2-8F04-BA451C77F1D7}">
+              <ma14:placeholderFlag xmlns:ma14="http://schemas.microsoft.com/office/mac/drawingml/2011/main" val="1"/>
+            </a:ext>
             <a:ext uri="{909E8E84-426E-40dd-AFC4-6F175D3DCCD1}">
-              <a14:hiddenFill xmlns:a14="http://schemas.microsoft.com/office/drawing/2010/main" xmlns="">
+              <a14:hiddenFill xmlns="" xmlns:a14="http://schemas.microsoft.com/office/drawing/2010/main">
                 <a:solidFill>
                   <a:srgbClr val="FFFFFF"/>
                 </a:solidFill>
               </a14:hiddenFill>
             </a:ext>
             <a:ext uri="{91240B29-F687-4f45-9708-019B960494DF}">
-              <a14:hiddenLine xmlns:a14="http://schemas.microsoft.com/office/drawing/2010/main" xmlns="" w="9525" cap="flat">
+              <a14:hiddenLine xmlns="" xmlns:a14="http://schemas.microsoft.com/office/drawing/2010/main" w="9525" cap="flat">
                 <a:solidFill>
                   <a:srgbClr val="808080"/>
                 </a:solidFill>
@@ -1171,7 +1173,7 @@
               </a14:hiddenLine>
             </a:ext>
             <a:ext uri="{AF507438-7753-43e0-B8FC-AC1667EBCBE1}">
-              <a14:hiddenEffects xmlns:a14="http://schemas.microsoft.com/office/drawing/2010/main" xmlns="">
+              <a14:hiddenEffects xmlns="" xmlns:a14="http://schemas.microsoft.com/office/drawing/2010/main">
                 <a:effectLst>
                   <a:outerShdw blurRad="63500" dist="38099" dir="2700000" algn="ctr" rotWithShape="0">
                     <a:schemeClr val="bg2">
@@ -1180,9 +1182,6 @@
                   </a:outerShdw>
                 </a:effectLst>
               </a14:hiddenEffects>
-            </a:ext>
-            <a:ext uri="{FAA26D3D-D897-4be2-8F04-BA451C77F1D7}">
-              <ma14:placeholderFlag xmlns:ma14="http://schemas.microsoft.com/office/mac/drawingml/2011/main" xmlns="" val="1"/>
             </a:ext>
           </a:extLst>
         </p:spPr>
@@ -1396,7 +1395,7 @@
           <p:cNvPr id="2" name="Slide Image Placeholder 1">
             <a:extLst>
               <a:ext uri="{FF2B5EF4-FFF2-40B4-BE49-F238E27FC236}">
-                <a16:creationId xmlns:a16="http://schemas.microsoft.com/office/drawing/2014/main" id="{E62B490D-AF3F-411D-BFEC-F92928153524}"/>
+                <a16:creationId xmlns:a16="http://schemas.microsoft.com/office/drawing/2014/main" xmlns="" id="{6C3224CF-6295-4E8A-955B-F930BD9C3692}"/>
               </a:ext>
             </a:extLst>
           </p:cNvPr>
@@ -1414,7 +1413,7 @@
           <p:cNvPr id="3" name="Notes Placeholder 2">
             <a:extLst>
               <a:ext uri="{FF2B5EF4-FFF2-40B4-BE49-F238E27FC236}">
-                <a16:creationId xmlns:a16="http://schemas.microsoft.com/office/drawing/2014/main" id="{2F2ED18E-7C0D-4571-BC82-6524CDFB3C05}"/>
+                <a16:creationId xmlns:a16="http://schemas.microsoft.com/office/drawing/2014/main" xmlns="" id="{16490125-E537-46C1-AC80-2B2A9FBCA227}"/>
               </a:ext>
             </a:extLst>
           </p:cNvPr>
@@ -1435,6 +1434,155 @@
               <a:buNone/>
               <a:defRPr/>
             </a:pPr>
+            <a:r>
+              <a:rPr lang="en-US" dirty="0">
+                <a:ea typeface="ＭＳ Ｐゴシック" charset="0"/>
+              </a:rPr>
+              <a:t>Image sources:</a:t>
+            </a:r>
+          </a:p>
+          <a:p>
+            <a:pPr defTabSz="370286">
+              <a:buFont typeface="Times New Roman" charset="0"/>
+              <a:buNone/>
+              <a:defRPr/>
+            </a:pPr>
+            <a:r>
+              <a:rPr lang="en-US" dirty="0">
+                <a:ea typeface="ＭＳ Ｐゴシック" charset="0"/>
+              </a:rPr>
+              <a:t>https://</a:t>
+            </a:r>
+            <a:r>
+              <a:rPr lang="en-US" dirty="0" err="1">
+                <a:ea typeface="ＭＳ Ｐゴシック" charset="0"/>
+              </a:rPr>
+              <a:t>commons.wikimedia.org</a:t>
+            </a:r>
+            <a:r>
+              <a:rPr lang="en-US" dirty="0">
+                <a:ea typeface="ＭＳ Ｐゴシック" charset="0"/>
+              </a:rPr>
+              <a:t>/wiki/</a:t>
+            </a:r>
+            <a:r>
+              <a:rPr lang="en-US" dirty="0" err="1">
+                <a:ea typeface="ＭＳ Ｐゴシック" charset="0"/>
+              </a:rPr>
+              <a:t>File:Antu_netbeans-ide.svg</a:t>
+            </a:r>
+            <a:endParaRPr lang="en-US" dirty="0">
+              <a:ea typeface="ＭＳ Ｐゴシック" charset="0"/>
+            </a:endParaRPr>
+          </a:p>
+          <a:p>
+            <a:pPr defTabSz="370286">
+              <a:buFont typeface="Times New Roman" charset="0"/>
+              <a:buNone/>
+              <a:defRPr/>
+            </a:pPr>
+            <a:r>
+              <a:rPr lang="en-US" dirty="0">
+                <a:ea typeface="ＭＳ Ｐゴシック" charset="0"/>
+              </a:rPr>
+              <a:t>https://</a:t>
+            </a:r>
+            <a:r>
+              <a:rPr lang="en-US" dirty="0" err="1">
+                <a:ea typeface="ＭＳ Ｐゴシック" charset="0"/>
+              </a:rPr>
+              <a:t>commons.wikimedia.org</a:t>
+            </a:r>
+            <a:r>
+              <a:rPr lang="en-US" dirty="0">
+                <a:ea typeface="ＭＳ Ｐゴシック" charset="0"/>
+              </a:rPr>
+              <a:t>/wiki/</a:t>
+            </a:r>
+            <a:r>
+              <a:rPr lang="en-US" dirty="0" err="1">
+                <a:ea typeface="ＭＳ Ｐゴシック" charset="0"/>
+              </a:rPr>
+              <a:t>File:Eclipse-SVG.svg</a:t>
+            </a:r>
+            <a:endParaRPr lang="en-US" dirty="0">
+              <a:ea typeface="ＭＳ Ｐゴシック" charset="0"/>
+            </a:endParaRPr>
+          </a:p>
+          <a:p>
+            <a:pPr defTabSz="370286">
+              <a:buFont typeface="Times New Roman" charset="0"/>
+              <a:buNone/>
+              <a:defRPr/>
+            </a:pPr>
+            <a:r>
+              <a:rPr lang="en-US" dirty="0">
+                <a:ea typeface="ＭＳ Ｐゴシック" charset="0"/>
+              </a:rPr>
+              <a:t>https://</a:t>
+            </a:r>
+            <a:r>
+              <a:rPr lang="en-US" dirty="0" err="1">
+                <a:ea typeface="ＭＳ Ｐゴシック" charset="0"/>
+              </a:rPr>
+              <a:t>commons.wikimedia.org</a:t>
+            </a:r>
+            <a:r>
+              <a:rPr lang="en-US" dirty="0">
+                <a:ea typeface="ＭＳ Ｐゴシック" charset="0"/>
+              </a:rPr>
+              <a:t>/wiki/</a:t>
+            </a:r>
+            <a:r>
+              <a:rPr lang="en-US" dirty="0" err="1">
+                <a:ea typeface="ＭＳ Ｐゴシック" charset="0"/>
+              </a:rPr>
+              <a:t>File:IntelliJ_IDEA_Logo.svg</a:t>
+            </a:r>
+            <a:endParaRPr lang="en-US" dirty="0">
+              <a:ea typeface="ＭＳ Ｐゴシック" charset="0"/>
+            </a:endParaRPr>
+          </a:p>
+          <a:p>
+            <a:pPr defTabSz="370286">
+              <a:buFont typeface="Times New Roman" charset="0"/>
+              <a:buNone/>
+              <a:defRPr/>
+            </a:pPr>
+            <a:r>
+              <a:rPr lang="en-US" dirty="0">
+                <a:ea typeface="ＭＳ Ｐゴシック" charset="0"/>
+              </a:rPr>
+              <a:t>https://</a:t>
+            </a:r>
+            <a:r>
+              <a:rPr lang="en-US" dirty="0" err="1">
+                <a:ea typeface="ＭＳ Ｐゴシック" charset="0"/>
+              </a:rPr>
+              <a:t>ant.apache.org</a:t>
+            </a:r>
+            <a:endParaRPr lang="en-US" dirty="0">
+              <a:ea typeface="ＭＳ Ｐゴシック" charset="0"/>
+            </a:endParaRPr>
+          </a:p>
+          <a:p>
+            <a:pPr defTabSz="370286">
+              <a:buFont typeface="Times New Roman" charset="0"/>
+              <a:buNone/>
+              <a:defRPr/>
+            </a:pPr>
+            <a:r>
+              <a:rPr lang="en-US" dirty="0">
+                <a:ea typeface="ＭＳ Ｐゴシック" charset="0"/>
+              </a:rPr>
+              <a:t>https://</a:t>
+            </a:r>
+            <a:r>
+              <a:rPr lang="en-US" dirty="0" err="1">
+                <a:ea typeface="ＭＳ Ｐゴシック" charset="0"/>
+              </a:rPr>
+              <a:t>maven.apache.org</a:t>
+            </a:r>
             <a:endParaRPr lang="en-US" dirty="0">
               <a:ea typeface="ＭＳ Ｐゴシック" charset="0"/>
             </a:endParaRPr>
@@ -1446,7 +1594,7 @@
           <p:cNvPr id="4" name="Slide Number Placeholder 3">
             <a:extLst>
               <a:ext uri="{FF2B5EF4-FFF2-40B4-BE49-F238E27FC236}">
-                <a16:creationId xmlns:a16="http://schemas.microsoft.com/office/drawing/2014/main" id="{0B77F40C-9D92-4327-95D7-922A2600BC67}"/>
+                <a16:creationId xmlns:a16="http://schemas.microsoft.com/office/drawing/2014/main" xmlns="" id="{EA836C87-D0E0-4D08-B144-5AABBC0A1F09}"/>
               </a:ext>
             </a:extLst>
           </p:cNvPr>
@@ -1459,15 +1607,18 @@
         </p:nvSpPr>
         <p:spPr>
           <a:extLst>
+            <a:ext uri="{FAA26D3D-D897-4be2-8F04-BA451C77F1D7}">
+              <ma14:placeholderFlag xmlns:ma14="http://schemas.microsoft.com/office/mac/drawingml/2011/main" val="1"/>
+            </a:ext>
             <a:ext uri="{909E8E84-426E-40dd-AFC4-6F175D3DCCD1}">
-              <a14:hiddenFill xmlns:a14="http://schemas.microsoft.com/office/drawing/2010/main" xmlns="">
+              <a14:hiddenFill xmlns="" xmlns:a14="http://schemas.microsoft.com/office/drawing/2010/main">
                 <a:solidFill>
                   <a:srgbClr val="FFFFFF"/>
                 </a:solidFill>
               </a14:hiddenFill>
             </a:ext>
             <a:ext uri="{91240B29-F687-4f45-9708-019B960494DF}">
-              <a14:hiddenLine xmlns:a14="http://schemas.microsoft.com/office/drawing/2010/main" xmlns="" w="9525" cap="flat">
+              <a14:hiddenLine xmlns="" xmlns:a14="http://schemas.microsoft.com/office/drawing/2010/main" w="9525" cap="flat">
                 <a:solidFill>
                   <a:srgbClr val="808080"/>
                 </a:solidFill>
@@ -1477,7 +1628,7 @@
               </a14:hiddenLine>
             </a:ext>
             <a:ext uri="{AF507438-7753-43e0-B8FC-AC1667EBCBE1}">
-              <a14:hiddenEffects xmlns:a14="http://schemas.microsoft.com/office/drawing/2010/main" xmlns="">
+              <a14:hiddenEffects xmlns="" xmlns:a14="http://schemas.microsoft.com/office/drawing/2010/main">
                 <a:effectLst>
                   <a:outerShdw blurRad="63500" dist="38099" dir="2700000" algn="ctr" rotWithShape="0">
                     <a:schemeClr val="bg2">
@@ -1486,9 +1637,6 @@
                   </a:outerShdw>
                 </a:effectLst>
               </a14:hiddenEffects>
-            </a:ext>
-            <a:ext uri="{FAA26D3D-D897-4be2-8F04-BA451C77F1D7}">
-              <ma14:placeholderFlag xmlns:ma14="http://schemas.microsoft.com/office/mac/drawingml/2011/main" xmlns="" val="1"/>
             </a:ext>
           </a:extLst>
         </p:spPr>
@@ -1689,7 +1837,7 @@
           </a:lstStyle>
           <a:p>
             <a:pPr eaLnBrk="1"/>
-            <a:fld id="{A9C1B56F-DCC9-4994-A415-2E0061EA3F2D}" type="slidenum">
+            <a:fld id="{10F33ED0-154C-40BC-A97A-B90FDC9D9656}" type="slidenum">
               <a:rPr lang="en-US" altLang="en-US" sz="1400">
                 <a:solidFill>
                   <a:srgbClr val="000000"/>
@@ -1697,7 +1845,7 @@
                 <a:latin typeface="Times New Roman" panose="02020603050405020304" pitchFamily="18" charset="0"/>
               </a:rPr>
               <a:pPr eaLnBrk="1"/>
-              <a:t>2</a:t>
+              <a:t>5</a:t>
             </a:fld>
             <a:endParaRPr lang="en-US" altLang="en-US" sz="1400">
               <a:solidFill>
@@ -1738,7 +1886,7 @@
           <p:cNvPr id="2" name="Slide Image Placeholder 1">
             <a:extLst>
               <a:ext uri="{FF2B5EF4-FFF2-40B4-BE49-F238E27FC236}">
-                <a16:creationId xmlns:a16="http://schemas.microsoft.com/office/drawing/2014/main" id="{6C3224CF-6295-4E8A-955B-F930BD9C3692}"/>
+                <a16:creationId xmlns:a16="http://schemas.microsoft.com/office/drawing/2014/main" xmlns="" id="{3C47B4FB-DA4D-463C-A15B-3815A65564DC}"/>
               </a:ext>
             </a:extLst>
           </p:cNvPr>
@@ -1756,7 +1904,7 @@
           <p:cNvPr id="3" name="Notes Placeholder 2">
             <a:extLst>
               <a:ext uri="{FF2B5EF4-FFF2-40B4-BE49-F238E27FC236}">
-                <a16:creationId xmlns:a16="http://schemas.microsoft.com/office/drawing/2014/main" id="{16490125-E537-46C1-AC80-2B2A9FBCA227}"/>
+                <a16:creationId xmlns:a16="http://schemas.microsoft.com/office/drawing/2014/main" xmlns="" id="{4CC66C26-4CE6-494B-8C23-43DBE4A79232}"/>
               </a:ext>
             </a:extLst>
           </p:cNvPr>
@@ -1781,150 +1929,25 @@
               <a:rPr lang="en-US" dirty="0">
                 <a:ea typeface="ＭＳ Ｐゴシック" charset="0"/>
               </a:rPr>
-              <a:t>Image sources:</a:t>
-            </a:r>
-          </a:p>
-          <a:p>
-            <a:pPr defTabSz="370286">
-              <a:buFont typeface="Times New Roman" charset="0"/>
-              <a:buNone/>
-              <a:defRPr/>
-            </a:pPr>
+              <a:t>https://</a:t>
+            </a:r>
+            <a:r>
+              <a:rPr lang="en-US" dirty="0" err="1">
+                <a:ea typeface="ＭＳ Ｐゴシック" charset="0"/>
+              </a:rPr>
+              <a:t>pixabay.com</a:t>
+            </a:r>
             <a:r>
               <a:rPr lang="en-US" dirty="0">
                 <a:ea typeface="ＭＳ Ｐゴシック" charset="0"/>
               </a:rPr>
-              <a:t>https://</a:t>
+              <a:t>/p-154544/?</a:t>
             </a:r>
             <a:r>
               <a:rPr lang="en-US" dirty="0" err="1">
                 <a:ea typeface="ＭＳ Ｐゴシック" charset="0"/>
               </a:rPr>
-              <a:t>commons.wikimedia.org</a:t>
-            </a:r>
-            <a:r>
-              <a:rPr lang="en-US" dirty="0">
-                <a:ea typeface="ＭＳ Ｐゴシック" charset="0"/>
-              </a:rPr>
-              <a:t>/wiki/</a:t>
-            </a:r>
-            <a:r>
-              <a:rPr lang="en-US" dirty="0" err="1">
-                <a:ea typeface="ＭＳ Ｐゴシック" charset="0"/>
-              </a:rPr>
-              <a:t>File:Antu_netbeans-ide.svg</a:t>
-            </a:r>
-            <a:endParaRPr lang="en-US" dirty="0">
-              <a:ea typeface="ＭＳ Ｐゴシック" charset="0"/>
-            </a:endParaRPr>
-          </a:p>
-          <a:p>
-            <a:pPr defTabSz="370286">
-              <a:buFont typeface="Times New Roman" charset="0"/>
-              <a:buNone/>
-              <a:defRPr/>
-            </a:pPr>
-            <a:r>
-              <a:rPr lang="en-US" dirty="0">
-                <a:ea typeface="ＭＳ Ｐゴシック" charset="0"/>
-              </a:rPr>
-              <a:t>https://</a:t>
-            </a:r>
-            <a:r>
-              <a:rPr lang="en-US" dirty="0" err="1">
-                <a:ea typeface="ＭＳ Ｐゴシック" charset="0"/>
-              </a:rPr>
-              <a:t>commons.wikimedia.org</a:t>
-            </a:r>
-            <a:r>
-              <a:rPr lang="en-US" dirty="0">
-                <a:ea typeface="ＭＳ Ｐゴシック" charset="0"/>
-              </a:rPr>
-              <a:t>/wiki/</a:t>
-            </a:r>
-            <a:r>
-              <a:rPr lang="en-US" dirty="0" err="1">
-                <a:ea typeface="ＭＳ Ｐゴシック" charset="0"/>
-              </a:rPr>
-              <a:t>File:Eclipse-SVG.svg</a:t>
-            </a:r>
-            <a:endParaRPr lang="en-US" dirty="0">
-              <a:ea typeface="ＭＳ Ｐゴシック" charset="0"/>
-            </a:endParaRPr>
-          </a:p>
-          <a:p>
-            <a:pPr defTabSz="370286">
-              <a:buFont typeface="Times New Roman" charset="0"/>
-              <a:buNone/>
-              <a:defRPr/>
-            </a:pPr>
-            <a:r>
-              <a:rPr lang="en-US" dirty="0">
-                <a:ea typeface="ＭＳ Ｐゴシック" charset="0"/>
-              </a:rPr>
-              <a:t>https://</a:t>
-            </a:r>
-            <a:r>
-              <a:rPr lang="en-US" dirty="0" err="1">
-                <a:ea typeface="ＭＳ Ｐゴシック" charset="0"/>
-              </a:rPr>
-              <a:t>commons.wikimedia.org</a:t>
-            </a:r>
-            <a:r>
-              <a:rPr lang="en-US" dirty="0">
-                <a:ea typeface="ＭＳ Ｐゴシック" charset="0"/>
-              </a:rPr>
-              <a:t>/wiki/</a:t>
-            </a:r>
-            <a:r>
-              <a:rPr lang="en-US" dirty="0" err="1">
-                <a:ea typeface="ＭＳ Ｐゴシック" charset="0"/>
-              </a:rPr>
-              <a:t>File:IntelliJ_IDEA_Logo.svg</a:t>
-            </a:r>
-            <a:endParaRPr lang="en-US" dirty="0">
-              <a:ea typeface="ＭＳ Ｐゴシック" charset="0"/>
-            </a:endParaRPr>
-          </a:p>
-          <a:p>
-            <a:pPr defTabSz="370286">
-              <a:buFont typeface="Times New Roman" charset="0"/>
-              <a:buNone/>
-              <a:defRPr/>
-            </a:pPr>
-            <a:r>
-              <a:rPr lang="en-US" dirty="0">
-                <a:ea typeface="ＭＳ Ｐゴシック" charset="0"/>
-              </a:rPr>
-              <a:t>https://</a:t>
-            </a:r>
-            <a:r>
-              <a:rPr lang="en-US" dirty="0" err="1">
-                <a:ea typeface="ＭＳ Ｐゴシック" charset="0"/>
-              </a:rPr>
-              <a:t>ant.apache.org</a:t>
-            </a:r>
-            <a:endParaRPr lang="en-US" dirty="0">
-              <a:ea typeface="ＭＳ Ｐゴシック" charset="0"/>
-            </a:endParaRPr>
-          </a:p>
-          <a:p>
-            <a:pPr defTabSz="370286">
-              <a:buFont typeface="Times New Roman" charset="0"/>
-              <a:buNone/>
-              <a:defRPr/>
-            </a:pPr>
-            <a:r>
-              <a:rPr lang="en-US" dirty="0">
-                <a:ea typeface="ＭＳ Ｐゴシック" charset="0"/>
-              </a:rPr>
-              <a:t>https://</a:t>
-            </a:r>
-            <a:r>
-              <a:rPr lang="en-US" dirty="0" err="1">
-                <a:ea typeface="ＭＳ Ｐゴシック" charset="0"/>
-              </a:rPr>
-              <a:t>maven.apache.org</a:t>
+              <a:t>no_redirect</a:t>
             </a:r>
             <a:endParaRPr lang="en-US" dirty="0">
               <a:ea typeface="ＭＳ Ｐゴシック" charset="0"/>
@@ -1937,7 +1960,7 @@
           <p:cNvPr id="4" name="Slide Number Placeholder 3">
             <a:extLst>
               <a:ext uri="{FF2B5EF4-FFF2-40B4-BE49-F238E27FC236}">
-                <a16:creationId xmlns:a16="http://schemas.microsoft.com/office/drawing/2014/main" id="{EA836C87-D0E0-4D08-B144-5AABBC0A1F09}"/>
+                <a16:creationId xmlns:a16="http://schemas.microsoft.com/office/drawing/2014/main" xmlns="" id="{2EC31DEF-1C96-422B-93B0-56765B3A20E0}"/>
               </a:ext>
             </a:extLst>
           </p:cNvPr>
@@ -1950,15 +1973,18 @@
         </p:nvSpPr>
         <p:spPr>
           <a:extLst>
+            <a:ext uri="{FAA26D3D-D897-4be2-8F04-BA451C77F1D7}">
+              <ma14:placeholderFlag xmlns:ma14="http://schemas.microsoft.com/office/mac/drawingml/2011/main" val="1"/>
+            </a:ext>
             <a:ext uri="{909E8E84-426E-40dd-AFC4-6F175D3DCCD1}">
-              <a14:hiddenFill xmlns:a14="http://schemas.microsoft.com/office/drawing/2010/main" xmlns="">
+              <a14:hiddenFill xmlns="" xmlns:a14="http://schemas.microsoft.com/office/drawing/2010/main">
                 <a:solidFill>
                   <a:srgbClr val="FFFFFF"/>
                 </a:solidFill>
               </a14:hiddenFill>
             </a:ext>
             <a:ext uri="{91240B29-F687-4f45-9708-019B960494DF}">
-              <a14:hiddenLine xmlns:a14="http://schemas.microsoft.com/office/drawing/2010/main" xmlns="" w="9525" cap="flat">
+              <a14:hiddenLine xmlns="" xmlns:a14="http://schemas.microsoft.com/office/drawing/2010/main" w="9525" cap="flat">
                 <a:solidFill>
                   <a:srgbClr val="808080"/>
                 </a:solidFill>
@@ -1968,7 +1994,7 @@
               </a14:hiddenLine>
             </a:ext>
             <a:ext uri="{AF507438-7753-43e0-B8FC-AC1667EBCBE1}">
-              <a14:hiddenEffects xmlns:a14="http://schemas.microsoft.com/office/drawing/2010/main" xmlns="">
+              <a14:hiddenEffects xmlns="" xmlns:a14="http://schemas.microsoft.com/office/drawing/2010/main">
                 <a:effectLst>
                   <a:outerShdw blurRad="63500" dist="38099" dir="2700000" algn="ctr" rotWithShape="0">
                     <a:schemeClr val="bg2">
@@ -1977,9 +2003,6 @@
                   </a:outerShdw>
                 </a:effectLst>
               </a14:hiddenEffects>
-            </a:ext>
-            <a:ext uri="{FAA26D3D-D897-4be2-8F04-BA451C77F1D7}">
-              <ma14:placeholderFlag xmlns:ma14="http://schemas.microsoft.com/office/mac/drawingml/2011/main" xmlns="" val="1"/>
             </a:ext>
           </a:extLst>
         </p:spPr>
@@ -2180,7 +2203,7 @@
           </a:lstStyle>
           <a:p>
             <a:pPr eaLnBrk="1"/>
-            <a:fld id="{10F33ED0-154C-40BC-A97A-B90FDC9D9656}" type="slidenum">
+            <a:fld id="{D38A997B-F0E5-46BC-A0F6-32D4F8CF531D}" type="slidenum">
               <a:rPr lang="en-US" altLang="en-US" sz="1400">
                 <a:solidFill>
                   <a:srgbClr val="000000"/>
@@ -2188,373 +2211,7 @@
                 <a:latin typeface="Times New Roman" panose="02020603050405020304" pitchFamily="18" charset="0"/>
               </a:rPr>
               <a:pPr eaLnBrk="1"/>
-              <a:t>6</a:t>
-            </a:fld>
-            <a:endParaRPr lang="en-US" altLang="en-US" sz="1400">
-              <a:solidFill>
-                <a:srgbClr val="000000"/>
-              </a:solidFill>
-              <a:latin typeface="Times New Roman" panose="02020603050405020304" pitchFamily="18" charset="0"/>
-            </a:endParaRPr>
-          </a:p>
-        </p:txBody>
-      </p:sp>
-    </p:spTree>
-  </p:cSld>
-  <p:clrMapOvr>
-    <a:masterClrMapping/>
-  </p:clrMapOvr>
-</p:notes>
-</file>
-
-<file path=ppt/notesSlides/notesSlide3.xml><?xml version="1.0" encoding="utf-8"?>
-<p:notes xmlns:a="http://schemas.openxmlformats.org/drawingml/2006/main" xmlns:r="http://schemas.openxmlformats.org/officeDocument/2006/relationships" xmlns:p="http://schemas.openxmlformats.org/presentationml/2006/main">
-  <p:cSld>
-    <p:spTree>
-      <p:nvGrpSpPr>
-        <p:cNvPr id="1" name=""/>
-        <p:cNvGrpSpPr/>
-        <p:nvPr/>
-      </p:nvGrpSpPr>
-      <p:grpSpPr>
-        <a:xfrm>
-          <a:off x="0" y="0"/>
-          <a:ext cx="0" cy="0"/>
-          <a:chOff x="0" y="0"/>
-          <a:chExt cx="0" cy="0"/>
-        </a:xfrm>
-      </p:grpSpPr>
-      <p:sp>
-        <p:nvSpPr>
-          <p:cNvPr id="2" name="Slide Image Placeholder 1">
-            <a:extLst>
-              <a:ext uri="{FF2B5EF4-FFF2-40B4-BE49-F238E27FC236}">
-                <a16:creationId xmlns:a16="http://schemas.microsoft.com/office/drawing/2014/main" id="{3C47B4FB-DA4D-463C-A15B-3815A65564DC}"/>
-              </a:ext>
-            </a:extLst>
-          </p:cNvPr>
-          <p:cNvSpPr>
-            <a:spLocks noGrp="1" noRot="1" noChangeAspect="1"/>
-          </p:cNvSpPr>
-          <p:nvPr>
-            <p:ph type="sldImg"/>
-          </p:nvPr>
-        </p:nvSpPr>
-        <p:spPr/>
-      </p:sp>
-      <p:sp>
-        <p:nvSpPr>
-          <p:cNvPr id="3" name="Notes Placeholder 2">
-            <a:extLst>
-              <a:ext uri="{FF2B5EF4-FFF2-40B4-BE49-F238E27FC236}">
-                <a16:creationId xmlns:a16="http://schemas.microsoft.com/office/drawing/2014/main" id="{4CC66C26-4CE6-494B-8C23-43DBE4A79232}"/>
-              </a:ext>
-            </a:extLst>
-          </p:cNvPr>
-          <p:cNvSpPr>
-            <a:spLocks noGrp="1"/>
-          </p:cNvSpPr>
-          <p:nvPr>
-            <p:ph type="body" idx="1"/>
-          </p:nvPr>
-        </p:nvSpPr>
-        <p:spPr/>
-        <p:txBody>
-          <a:bodyPr/>
-          <a:lstStyle/>
-          <a:p>
-            <a:pPr defTabSz="370286">
-              <a:buFont typeface="Times New Roman" charset="0"/>
-              <a:buNone/>
-              <a:defRPr/>
-            </a:pPr>
-            <a:r>
-              <a:rPr lang="en-US" dirty="0">
-                <a:ea typeface="ＭＳ Ｐゴシック" charset="0"/>
-              </a:rPr>
-              <a:t>https://</a:t>
-            </a:r>
-            <a:r>
-              <a:rPr lang="en-US" dirty="0" err="1">
-                <a:ea typeface="ＭＳ Ｐゴシック" charset="0"/>
-              </a:rPr>
-              <a:t>pixabay.com</a:t>
-            </a:r>
-            <a:r>
-              <a:rPr lang="en-US" dirty="0">
-                <a:ea typeface="ＭＳ Ｐゴシック" charset="0"/>
-              </a:rPr>
-              <a:t>/p-154544/?</a:t>
-            </a:r>
-            <a:r>
-              <a:rPr lang="en-US" dirty="0" err="1">
-                <a:ea typeface="ＭＳ Ｐゴシック" charset="0"/>
-              </a:rPr>
-              <a:t>no_redirect</a:t>
-            </a:r>
-            <a:endParaRPr lang="en-US" dirty="0">
-              <a:ea typeface="ＭＳ Ｐゴシック" charset="0"/>
-            </a:endParaRPr>
-          </a:p>
-        </p:txBody>
-      </p:sp>
-      <p:sp>
-        <p:nvSpPr>
-          <p:cNvPr id="4" name="Slide Number Placeholder 3">
-            <a:extLst>
-              <a:ext uri="{FF2B5EF4-FFF2-40B4-BE49-F238E27FC236}">
-                <a16:creationId xmlns:a16="http://schemas.microsoft.com/office/drawing/2014/main" id="{2EC31DEF-1C96-422B-93B0-56765B3A20E0}"/>
-              </a:ext>
-            </a:extLst>
-          </p:cNvPr>
-          <p:cNvSpPr>
-            <a:spLocks noGrp="1"/>
-          </p:cNvSpPr>
-          <p:nvPr>
-            <p:ph type="sldNum" sz="quarter"/>
-          </p:nvPr>
-        </p:nvSpPr>
-        <p:spPr>
-          <a:extLst>
-            <a:ext uri="{909E8E84-426E-40dd-AFC4-6F175D3DCCD1}">
-              <a14:hiddenFill xmlns:a14="http://schemas.microsoft.com/office/drawing/2010/main" xmlns="">
-                <a:solidFill>
-                  <a:srgbClr val="FFFFFF"/>
-                </a:solidFill>
-              </a14:hiddenFill>
-            </a:ext>
-            <a:ext uri="{91240B29-F687-4f45-9708-019B960494DF}">
-              <a14:hiddenLine xmlns:a14="http://schemas.microsoft.com/office/drawing/2010/main" xmlns="" w="9525" cap="flat">
-                <a:solidFill>
-                  <a:srgbClr val="808080"/>
-                </a:solidFill>
-                <a:round/>
-                <a:headEnd/>
-                <a:tailEnd/>
-              </a14:hiddenLine>
-            </a:ext>
-            <a:ext uri="{AF507438-7753-43e0-B8FC-AC1667EBCBE1}">
-              <a14:hiddenEffects xmlns:a14="http://schemas.microsoft.com/office/drawing/2010/main" xmlns="">
-                <a:effectLst>
-                  <a:outerShdw blurRad="63500" dist="38099" dir="2700000" algn="ctr" rotWithShape="0">
-                    <a:schemeClr val="bg2">
-                      <a:alpha val="74998"/>
-                    </a:schemeClr>
-                  </a:outerShdw>
-                </a:effectLst>
-              </a14:hiddenEffects>
-            </a:ext>
-            <a:ext uri="{FAA26D3D-D897-4be2-8F04-BA451C77F1D7}">
-              <ma14:placeholderFlag xmlns:ma14="http://schemas.microsoft.com/office/mac/drawingml/2011/main" xmlns="" val="1"/>
-            </a:ext>
-          </a:extLst>
-        </p:spPr>
-        <p:txBody>
-          <a:bodyPr/>
-          <a:lstStyle>
-            <a:lvl1pPr eaLnBrk="0">
-              <a:tabLst>
-                <a:tab pos="723900" algn="l"/>
-                <a:tab pos="1447800" algn="l"/>
-                <a:tab pos="2171700" algn="l"/>
-                <a:tab pos="2895600" algn="l"/>
-              </a:tabLst>
-              <a:defRPr sz="1900">
-                <a:solidFill>
-                  <a:schemeClr val="bg1"/>
-                </a:solidFill>
-                <a:latin typeface="Arial" panose="020B0604020202020204" pitchFamily="34" charset="0"/>
-                <a:ea typeface="MS PGothic" panose="020B0600070205080204" pitchFamily="34" charset="-128"/>
-              </a:defRPr>
-            </a:lvl1pPr>
-            <a:lvl2pPr marL="742950" indent="-285750" eaLnBrk="0">
-              <a:tabLst>
-                <a:tab pos="723900" algn="l"/>
-                <a:tab pos="1447800" algn="l"/>
-                <a:tab pos="2171700" algn="l"/>
-                <a:tab pos="2895600" algn="l"/>
-              </a:tabLst>
-              <a:defRPr sz="1900">
-                <a:solidFill>
-                  <a:schemeClr val="bg1"/>
-                </a:solidFill>
-                <a:latin typeface="Arial" panose="020B0604020202020204" pitchFamily="34" charset="0"/>
-                <a:ea typeface="MS PGothic" panose="020B0600070205080204" pitchFamily="34" charset="-128"/>
-              </a:defRPr>
-            </a:lvl2pPr>
-            <a:lvl3pPr marL="1143000" indent="-228600" eaLnBrk="0">
-              <a:tabLst>
-                <a:tab pos="723900" algn="l"/>
-                <a:tab pos="1447800" algn="l"/>
-                <a:tab pos="2171700" algn="l"/>
-                <a:tab pos="2895600" algn="l"/>
-              </a:tabLst>
-              <a:defRPr sz="1900">
-                <a:solidFill>
-                  <a:schemeClr val="bg1"/>
-                </a:solidFill>
-                <a:latin typeface="Arial" panose="020B0604020202020204" pitchFamily="34" charset="0"/>
-                <a:ea typeface="MS PGothic" panose="020B0600070205080204" pitchFamily="34" charset="-128"/>
-              </a:defRPr>
-            </a:lvl3pPr>
-            <a:lvl4pPr marL="1600200" indent="-228600" eaLnBrk="0">
-              <a:tabLst>
-                <a:tab pos="723900" algn="l"/>
-                <a:tab pos="1447800" algn="l"/>
-                <a:tab pos="2171700" algn="l"/>
-                <a:tab pos="2895600" algn="l"/>
-              </a:tabLst>
-              <a:defRPr sz="1900">
-                <a:solidFill>
-                  <a:schemeClr val="bg1"/>
-                </a:solidFill>
-                <a:latin typeface="Arial" panose="020B0604020202020204" pitchFamily="34" charset="0"/>
-                <a:ea typeface="MS PGothic" panose="020B0600070205080204" pitchFamily="34" charset="-128"/>
-              </a:defRPr>
-            </a:lvl4pPr>
-            <a:lvl5pPr marL="2057400" indent="-228600" eaLnBrk="0">
-              <a:tabLst>
-                <a:tab pos="723900" algn="l"/>
-                <a:tab pos="1447800" algn="l"/>
-                <a:tab pos="2171700" algn="l"/>
-                <a:tab pos="2895600" algn="l"/>
-              </a:tabLst>
-              <a:defRPr sz="1900">
-                <a:solidFill>
-                  <a:schemeClr val="bg1"/>
-                </a:solidFill>
-                <a:latin typeface="Arial" panose="020B0604020202020204" pitchFamily="34" charset="0"/>
-                <a:ea typeface="MS PGothic" panose="020B0600070205080204" pitchFamily="34" charset="-128"/>
-              </a:defRPr>
-            </a:lvl5pPr>
-            <a:lvl6pPr marL="2514600" indent="-228600" defTabSz="369888" eaLnBrk="0" fontAlgn="base" hangingPunct="0">
-              <a:lnSpc>
-                <a:spcPct val="93000"/>
-              </a:lnSpc>
-              <a:spcBef>
-                <a:spcPct val="0"/>
-              </a:spcBef>
-              <a:spcAft>
-                <a:spcPct val="0"/>
-              </a:spcAft>
-              <a:buClr>
-                <a:srgbClr val="000000"/>
-              </a:buClr>
-              <a:buSzPct val="100000"/>
-              <a:buFont typeface="Times New Roman" panose="02020603050405020304" pitchFamily="18" charset="0"/>
-              <a:tabLst>
-                <a:tab pos="723900" algn="l"/>
-                <a:tab pos="1447800" algn="l"/>
-                <a:tab pos="2171700" algn="l"/>
-                <a:tab pos="2895600" algn="l"/>
-              </a:tabLst>
-              <a:defRPr sz="1900">
-                <a:solidFill>
-                  <a:schemeClr val="bg1"/>
-                </a:solidFill>
-                <a:latin typeface="Arial" panose="020B0604020202020204" pitchFamily="34" charset="0"/>
-                <a:ea typeface="MS PGothic" panose="020B0600070205080204" pitchFamily="34" charset="-128"/>
-              </a:defRPr>
-            </a:lvl6pPr>
-            <a:lvl7pPr marL="2971800" indent="-228600" defTabSz="369888" eaLnBrk="0" fontAlgn="base" hangingPunct="0">
-              <a:lnSpc>
-                <a:spcPct val="93000"/>
-              </a:lnSpc>
-              <a:spcBef>
-                <a:spcPct val="0"/>
-              </a:spcBef>
-              <a:spcAft>
-                <a:spcPct val="0"/>
-              </a:spcAft>
-              <a:buClr>
-                <a:srgbClr val="000000"/>
-              </a:buClr>
-              <a:buSzPct val="100000"/>
-              <a:buFont typeface="Times New Roman" panose="02020603050405020304" pitchFamily="18" charset="0"/>
-              <a:tabLst>
-                <a:tab pos="723900" algn="l"/>
-                <a:tab pos="1447800" algn="l"/>
-                <a:tab pos="2171700" algn="l"/>
-                <a:tab pos="2895600" algn="l"/>
-              </a:tabLst>
-              <a:defRPr sz="1900">
-                <a:solidFill>
-                  <a:schemeClr val="bg1"/>
-                </a:solidFill>
-                <a:latin typeface="Arial" panose="020B0604020202020204" pitchFamily="34" charset="0"/>
-                <a:ea typeface="MS PGothic" panose="020B0600070205080204" pitchFamily="34" charset="-128"/>
-              </a:defRPr>
-            </a:lvl7pPr>
-            <a:lvl8pPr marL="3429000" indent="-228600" defTabSz="369888" eaLnBrk="0" fontAlgn="base" hangingPunct="0">
-              <a:lnSpc>
-                <a:spcPct val="93000"/>
-              </a:lnSpc>
-              <a:spcBef>
-                <a:spcPct val="0"/>
-              </a:spcBef>
-              <a:spcAft>
-                <a:spcPct val="0"/>
-              </a:spcAft>
-              <a:buClr>
-                <a:srgbClr val="000000"/>
-              </a:buClr>
-              <a:buSzPct val="100000"/>
-              <a:buFont typeface="Times New Roman" panose="02020603050405020304" pitchFamily="18" charset="0"/>
-              <a:tabLst>
-                <a:tab pos="723900" algn="l"/>
-                <a:tab pos="1447800" algn="l"/>
-                <a:tab pos="2171700" algn="l"/>
-                <a:tab pos="2895600" algn="l"/>
-              </a:tabLst>
-              <a:defRPr sz="1900">
-                <a:solidFill>
-                  <a:schemeClr val="bg1"/>
-                </a:solidFill>
-                <a:latin typeface="Arial" panose="020B0604020202020204" pitchFamily="34" charset="0"/>
-                <a:ea typeface="MS PGothic" panose="020B0600070205080204" pitchFamily="34" charset="-128"/>
-              </a:defRPr>
-            </a:lvl8pPr>
-            <a:lvl9pPr marL="3886200" indent="-228600" defTabSz="369888" eaLnBrk="0" fontAlgn="base" hangingPunct="0">
-              <a:lnSpc>
-                <a:spcPct val="93000"/>
-              </a:lnSpc>
-              <a:spcBef>
-                <a:spcPct val="0"/>
-              </a:spcBef>
-              <a:spcAft>
-                <a:spcPct val="0"/>
-              </a:spcAft>
-              <a:buClr>
-                <a:srgbClr val="000000"/>
-              </a:buClr>
-              <a:buSzPct val="100000"/>
-              <a:buFont typeface="Times New Roman" panose="02020603050405020304" pitchFamily="18" charset="0"/>
-              <a:tabLst>
-                <a:tab pos="723900" algn="l"/>
-                <a:tab pos="1447800" algn="l"/>
-                <a:tab pos="2171700" algn="l"/>
-                <a:tab pos="2895600" algn="l"/>
-              </a:tabLst>
-              <a:defRPr sz="1900">
-                <a:solidFill>
-                  <a:schemeClr val="bg1"/>
-                </a:solidFill>
-                <a:latin typeface="Arial" panose="020B0604020202020204" pitchFamily="34" charset="0"/>
-                <a:ea typeface="MS PGothic" panose="020B0600070205080204" pitchFamily="34" charset="-128"/>
-              </a:defRPr>
-            </a:lvl9pPr>
-          </a:lstStyle>
-          <a:p>
-            <a:pPr eaLnBrk="1"/>
-            <a:fld id="{D38A997B-F0E5-46BC-A0F6-32D4F8CF531D}" type="slidenum">
-              <a:rPr lang="en-US" altLang="en-US" sz="1400">
-                <a:solidFill>
-                  <a:srgbClr val="000000"/>
-                </a:solidFill>
-                <a:latin typeface="Times New Roman" panose="02020603050405020304" pitchFamily="18" charset="0"/>
-              </a:rPr>
-              <a:pPr eaLnBrk="1"/>
-              <a:t>13</a:t>
+              <a:t>12</a:t>
             </a:fld>
             <a:endParaRPr lang="en-US" altLang="en-US" sz="1400">
               <a:solidFill>
@@ -2686,7 +2343,7 @@
           <p:cNvPr id="4" name="Rectangle 5">
             <a:extLst>
               <a:ext uri="{FF2B5EF4-FFF2-40B4-BE49-F238E27FC236}">
-                <a16:creationId xmlns:a16="http://schemas.microsoft.com/office/drawing/2014/main" id="{DEAFA22A-9B81-4B4F-A614-F21B077EBE67}"/>
+                <a16:creationId xmlns:a16="http://schemas.microsoft.com/office/drawing/2014/main" xmlns="" id="{DEAFA22A-9B81-4B4F-A614-F21B077EBE67}"/>
               </a:ext>
             </a:extLst>
           </p:cNvPr>
@@ -2825,7 +2482,7 @@
           <p:cNvPr id="4" name="Rectangle 5">
             <a:extLst>
               <a:ext uri="{FF2B5EF4-FFF2-40B4-BE49-F238E27FC236}">
-                <a16:creationId xmlns:a16="http://schemas.microsoft.com/office/drawing/2014/main" id="{EB83CECE-A795-47EC-8F7B-6B72BC388D13}"/>
+                <a16:creationId xmlns:a16="http://schemas.microsoft.com/office/drawing/2014/main" xmlns="" id="{EB83CECE-A795-47EC-8F7B-6B72BC388D13}"/>
               </a:ext>
             </a:extLst>
           </p:cNvPr>
@@ -2974,7 +2631,7 @@
           <p:cNvPr id="4" name="Rectangle 5">
             <a:extLst>
               <a:ext uri="{FF2B5EF4-FFF2-40B4-BE49-F238E27FC236}">
-                <a16:creationId xmlns:a16="http://schemas.microsoft.com/office/drawing/2014/main" id="{31BD418F-B892-42DB-AEC4-65B196E9A2B1}"/>
+                <a16:creationId xmlns:a16="http://schemas.microsoft.com/office/drawing/2014/main" xmlns="" id="{31BD418F-B892-42DB-AEC4-65B196E9A2B1}"/>
               </a:ext>
             </a:extLst>
           </p:cNvPr>
@@ -3131,7 +2788,7 @@
           <p:cNvPr id="4" name="Rectangle 5">
             <a:extLst>
               <a:ext uri="{FF2B5EF4-FFF2-40B4-BE49-F238E27FC236}">
-                <a16:creationId xmlns:a16="http://schemas.microsoft.com/office/drawing/2014/main" id="{BD7C811D-4014-4398-B757-4F313E065638}"/>
+                <a16:creationId xmlns:a16="http://schemas.microsoft.com/office/drawing/2014/main" xmlns="" id="{BD7C811D-4014-4398-B757-4F313E065638}"/>
               </a:ext>
             </a:extLst>
           </p:cNvPr>
@@ -3270,7 +2927,7 @@
           <p:cNvPr id="4" name="Rectangle 5">
             <a:extLst>
               <a:ext uri="{FF2B5EF4-FFF2-40B4-BE49-F238E27FC236}">
-                <a16:creationId xmlns:a16="http://schemas.microsoft.com/office/drawing/2014/main" id="{F912D23E-11D0-40D7-BA3E-F40A8E796F74}"/>
+                <a16:creationId xmlns:a16="http://schemas.microsoft.com/office/drawing/2014/main" xmlns="" id="{F912D23E-11D0-40D7-BA3E-F40A8E796F74}"/>
               </a:ext>
             </a:extLst>
           </p:cNvPr>
@@ -3432,7 +3089,7 @@
           <p:cNvPr id="4" name="Rectangle 5">
             <a:extLst>
               <a:ext uri="{FF2B5EF4-FFF2-40B4-BE49-F238E27FC236}">
-                <a16:creationId xmlns:a16="http://schemas.microsoft.com/office/drawing/2014/main" id="{9C9A0F60-35A5-4F58-9BFA-BA2982ED144D}"/>
+                <a16:creationId xmlns:a16="http://schemas.microsoft.com/office/drawing/2014/main" xmlns="" id="{9C9A0F60-35A5-4F58-9BFA-BA2982ED144D}"/>
               </a:ext>
             </a:extLst>
           </p:cNvPr>
@@ -3688,7 +3345,7 @@
           <p:cNvPr id="5" name="Rectangle 5">
             <a:extLst>
               <a:ext uri="{FF2B5EF4-FFF2-40B4-BE49-F238E27FC236}">
-                <a16:creationId xmlns:a16="http://schemas.microsoft.com/office/drawing/2014/main" id="{A601F445-B879-4FC0-86EC-491F7993F429}"/>
+                <a16:creationId xmlns:a16="http://schemas.microsoft.com/office/drawing/2014/main" xmlns="" id="{A601F445-B879-4FC0-86EC-491F7993F429}"/>
               </a:ext>
             </a:extLst>
           </p:cNvPr>
@@ -4083,7 +3740,7 @@
           <p:cNvPr id="7" name="Rectangle 5">
             <a:extLst>
               <a:ext uri="{FF2B5EF4-FFF2-40B4-BE49-F238E27FC236}">
-                <a16:creationId xmlns:a16="http://schemas.microsoft.com/office/drawing/2014/main" id="{C6543717-522D-41F3-ADC5-2B295A0E18B7}"/>
+                <a16:creationId xmlns:a16="http://schemas.microsoft.com/office/drawing/2014/main" xmlns="" id="{C6543717-522D-41F3-ADC5-2B295A0E18B7}"/>
               </a:ext>
             </a:extLst>
           </p:cNvPr>
@@ -4171,7 +3828,7 @@
           <p:cNvPr id="3" name="Rectangle 5">
             <a:extLst>
               <a:ext uri="{FF2B5EF4-FFF2-40B4-BE49-F238E27FC236}">
-                <a16:creationId xmlns:a16="http://schemas.microsoft.com/office/drawing/2014/main" id="{003C9890-801F-4F93-9031-AEA1702B4137}"/>
+                <a16:creationId xmlns:a16="http://schemas.microsoft.com/office/drawing/2014/main" xmlns="" id="{003C9890-801F-4F93-9031-AEA1702B4137}"/>
               </a:ext>
             </a:extLst>
           </p:cNvPr>
@@ -4237,7 +3894,7 @@
           <p:cNvPr id="2" name="Rectangle 5">
             <a:extLst>
               <a:ext uri="{FF2B5EF4-FFF2-40B4-BE49-F238E27FC236}">
-                <a16:creationId xmlns:a16="http://schemas.microsoft.com/office/drawing/2014/main" id="{8BF52773-BA28-407D-8D46-87A73CFD6BDE}"/>
+                <a16:creationId xmlns:a16="http://schemas.microsoft.com/office/drawing/2014/main" xmlns="" id="{8BF52773-BA28-407D-8D46-87A73CFD6BDE}"/>
               </a:ext>
             </a:extLst>
           </p:cNvPr>
@@ -4483,7 +4140,7 @@
           <p:cNvPr id="5" name="Rectangle 5">
             <a:extLst>
               <a:ext uri="{FF2B5EF4-FFF2-40B4-BE49-F238E27FC236}">
-                <a16:creationId xmlns:a16="http://schemas.microsoft.com/office/drawing/2014/main" id="{8C3FB4E9-5ED1-4013-BFA3-BD672510D8D9}"/>
+                <a16:creationId xmlns:a16="http://schemas.microsoft.com/office/drawing/2014/main" xmlns="" id="{8C3FB4E9-5ED1-4013-BFA3-BD672510D8D9}"/>
               </a:ext>
             </a:extLst>
           </p:cNvPr>
@@ -4622,7 +4279,7 @@
           <p:cNvPr id="4" name="Rectangle 5">
             <a:extLst>
               <a:ext uri="{FF2B5EF4-FFF2-40B4-BE49-F238E27FC236}">
-                <a16:creationId xmlns:a16="http://schemas.microsoft.com/office/drawing/2014/main" id="{5CEAF18A-ED4C-46EB-BC4A-EEE0AC7EAEBE}"/>
+                <a16:creationId xmlns:a16="http://schemas.microsoft.com/office/drawing/2014/main" xmlns="" id="{5CEAF18A-ED4C-46EB-BC4A-EEE0AC7EAEBE}"/>
               </a:ext>
             </a:extLst>
           </p:cNvPr>
@@ -4846,7 +4503,7 @@
           <p:cNvPr id="5" name="Rectangle 5">
             <a:extLst>
               <a:ext uri="{FF2B5EF4-FFF2-40B4-BE49-F238E27FC236}">
-                <a16:creationId xmlns:a16="http://schemas.microsoft.com/office/drawing/2014/main" id="{01BC617F-27A5-432D-A13F-0B6A875FD66D}"/>
+                <a16:creationId xmlns:a16="http://schemas.microsoft.com/office/drawing/2014/main" xmlns="" id="{01BC617F-27A5-432D-A13F-0B6A875FD66D}"/>
               </a:ext>
             </a:extLst>
           </p:cNvPr>
@@ -4985,7 +4642,7 @@
           <p:cNvPr id="4" name="Rectangle 5">
             <a:extLst>
               <a:ext uri="{FF2B5EF4-FFF2-40B4-BE49-F238E27FC236}">
-                <a16:creationId xmlns:a16="http://schemas.microsoft.com/office/drawing/2014/main" id="{55F203EE-3EB9-4790-A3D9-56480C0A3091}"/>
+                <a16:creationId xmlns:a16="http://schemas.microsoft.com/office/drawing/2014/main" xmlns="" id="{55F203EE-3EB9-4790-A3D9-56480C0A3091}"/>
               </a:ext>
             </a:extLst>
           </p:cNvPr>
@@ -5134,7 +4791,7 @@
           <p:cNvPr id="4" name="Rectangle 5">
             <a:extLst>
               <a:ext uri="{FF2B5EF4-FFF2-40B4-BE49-F238E27FC236}">
-                <a16:creationId xmlns:a16="http://schemas.microsoft.com/office/drawing/2014/main" id="{4B9FFACF-8000-4550-9782-7E8067C2732F}"/>
+                <a16:creationId xmlns:a16="http://schemas.microsoft.com/office/drawing/2014/main" xmlns="" id="{4B9FFACF-8000-4550-9782-7E8067C2732F}"/>
               </a:ext>
             </a:extLst>
           </p:cNvPr>
@@ -5296,7 +4953,7 @@
           <p:cNvPr id="4" name="Rectangle 5">
             <a:extLst>
               <a:ext uri="{FF2B5EF4-FFF2-40B4-BE49-F238E27FC236}">
-                <a16:creationId xmlns:a16="http://schemas.microsoft.com/office/drawing/2014/main" id="{D9AB5B53-A0F5-46A7-B36D-70210F9A329A}"/>
+                <a16:creationId xmlns:a16="http://schemas.microsoft.com/office/drawing/2014/main" xmlns="" id="{D9AB5B53-A0F5-46A7-B36D-70210F9A329A}"/>
               </a:ext>
             </a:extLst>
           </p:cNvPr>
@@ -5552,7 +5209,7 @@
           <p:cNvPr id="5" name="Rectangle 5">
             <a:extLst>
               <a:ext uri="{FF2B5EF4-FFF2-40B4-BE49-F238E27FC236}">
-                <a16:creationId xmlns:a16="http://schemas.microsoft.com/office/drawing/2014/main" id="{23D99C64-DB28-4015-A0B6-4097CB5CD220}"/>
+                <a16:creationId xmlns:a16="http://schemas.microsoft.com/office/drawing/2014/main" xmlns="" id="{23D99C64-DB28-4015-A0B6-4097CB5CD220}"/>
               </a:ext>
             </a:extLst>
           </p:cNvPr>
@@ -5947,7 +5604,7 @@
           <p:cNvPr id="7" name="Rectangle 5">
             <a:extLst>
               <a:ext uri="{FF2B5EF4-FFF2-40B4-BE49-F238E27FC236}">
-                <a16:creationId xmlns:a16="http://schemas.microsoft.com/office/drawing/2014/main" id="{21920599-26C9-4454-8538-B4EF4D8EF4C5}"/>
+                <a16:creationId xmlns:a16="http://schemas.microsoft.com/office/drawing/2014/main" xmlns="" id="{21920599-26C9-4454-8538-B4EF4D8EF4C5}"/>
               </a:ext>
             </a:extLst>
           </p:cNvPr>
@@ -6035,7 +5692,7 @@
           <p:cNvPr id="3" name="Rectangle 5">
             <a:extLst>
               <a:ext uri="{FF2B5EF4-FFF2-40B4-BE49-F238E27FC236}">
-                <a16:creationId xmlns:a16="http://schemas.microsoft.com/office/drawing/2014/main" id="{E457DE9E-FB61-4AAB-8787-933D7BBEBFA9}"/>
+                <a16:creationId xmlns:a16="http://schemas.microsoft.com/office/drawing/2014/main" xmlns="" id="{E457DE9E-FB61-4AAB-8787-933D7BBEBFA9}"/>
               </a:ext>
             </a:extLst>
           </p:cNvPr>
@@ -6101,7 +5758,7 @@
           <p:cNvPr id="2" name="Rectangle 5">
             <a:extLst>
               <a:ext uri="{FF2B5EF4-FFF2-40B4-BE49-F238E27FC236}">
-                <a16:creationId xmlns:a16="http://schemas.microsoft.com/office/drawing/2014/main" id="{2724BC64-188E-490C-8143-71A15F10B209}"/>
+                <a16:creationId xmlns:a16="http://schemas.microsoft.com/office/drawing/2014/main" xmlns="" id="{2724BC64-188E-490C-8143-71A15F10B209}"/>
               </a:ext>
             </a:extLst>
           </p:cNvPr>
@@ -6347,7 +6004,7 @@
           <p:cNvPr id="5" name="Rectangle 5">
             <a:extLst>
               <a:ext uri="{FF2B5EF4-FFF2-40B4-BE49-F238E27FC236}">
-                <a16:creationId xmlns:a16="http://schemas.microsoft.com/office/drawing/2014/main" id="{C80040F1-04C4-4B23-994D-3CCD0FFB3E62}"/>
+                <a16:creationId xmlns:a16="http://schemas.microsoft.com/office/drawing/2014/main" xmlns="" id="{C80040F1-04C4-4B23-994D-3CCD0FFB3E62}"/>
               </a:ext>
             </a:extLst>
           </p:cNvPr>
@@ -6571,7 +6228,7 @@
           <p:cNvPr id="5" name="Rectangle 5">
             <a:extLst>
               <a:ext uri="{FF2B5EF4-FFF2-40B4-BE49-F238E27FC236}">
-                <a16:creationId xmlns:a16="http://schemas.microsoft.com/office/drawing/2014/main" id="{E7C4F85B-793B-46CC-BC02-869384F730B5}"/>
+                <a16:creationId xmlns:a16="http://schemas.microsoft.com/office/drawing/2014/main" xmlns="" id="{E7C4F85B-793B-46CC-BC02-869384F730B5}"/>
               </a:ext>
             </a:extLst>
           </p:cNvPr>
@@ -6645,7 +6302,7 @@
           <p:cNvPr id="1025" name="Rectangle 1">
             <a:extLst>
               <a:ext uri="{FF2B5EF4-FFF2-40B4-BE49-F238E27FC236}">
-                <a16:creationId xmlns:a16="http://schemas.microsoft.com/office/drawing/2014/main" id="{790E1319-028A-4802-9434-B7C23C369D1F}"/>
+                <a16:creationId xmlns:a16="http://schemas.microsoft.com/office/drawing/2014/main" xmlns="" id="{790E1319-028A-4802-9434-B7C23C369D1F}"/>
               </a:ext>
             </a:extLst>
           </p:cNvPr>
@@ -6670,15 +6327,18 @@
           </a:ln>
           <a:effectLst/>
           <a:extLst>
+            <a:ext uri="{FAA26D3D-D897-4be2-8F04-BA451C77F1D7}">
+              <ma14:placeholderFlag xmlns:ma14="http://schemas.microsoft.com/office/mac/drawingml/2011/main" val="1"/>
+            </a:ext>
             <a:ext uri="{909E8E84-426E-40dd-AFC4-6F175D3DCCD1}">
-              <a14:hiddenFill xmlns:a14="http://schemas.microsoft.com/office/drawing/2010/main" xmlns="">
+              <a14:hiddenFill xmlns="" xmlns:a14="http://schemas.microsoft.com/office/drawing/2010/main">
                 <a:solidFill>
                   <a:srgbClr val="FFFFFF"/>
                 </a:solidFill>
               </a14:hiddenFill>
             </a:ext>
             <a:ext uri="{91240B29-F687-4f45-9708-019B960494DF}">
-              <a14:hiddenLine xmlns:a14="http://schemas.microsoft.com/office/drawing/2010/main" xmlns="" w="9525" cap="flat">
+              <a14:hiddenLine xmlns="" xmlns:a14="http://schemas.microsoft.com/office/drawing/2010/main" w="9525" cap="flat">
                 <a:solidFill>
                   <a:srgbClr val="808080"/>
                 </a:solidFill>
@@ -6688,7 +6348,7 @@
               </a14:hiddenLine>
             </a:ext>
             <a:ext uri="{AF507438-7753-43e0-B8FC-AC1667EBCBE1}">
-              <a14:hiddenEffects xmlns:a14="http://schemas.microsoft.com/office/drawing/2010/main" xmlns="">
+              <a14:hiddenEffects xmlns="" xmlns:a14="http://schemas.microsoft.com/office/drawing/2010/main">
                 <a:effectLst>
                   <a:outerShdw blurRad="63500" dist="38099" dir="2700000" algn="ctr" rotWithShape="0">
                     <a:schemeClr val="bg2">
@@ -6697,9 +6357,6 @@
                   </a:outerShdw>
                 </a:effectLst>
               </a14:hiddenEffects>
-            </a:ext>
-            <a:ext uri="{FAA26D3D-D897-4be2-8F04-BA451C77F1D7}">
-              <ma14:placeholderFlag xmlns:ma14="http://schemas.microsoft.com/office/mac/drawingml/2011/main" xmlns="" val="1"/>
             </a:ext>
           </a:extLst>
         </p:spPr>
@@ -6724,7 +6381,7 @@
           <p:cNvPr id="1026" name="Rectangle 2">
             <a:extLst>
               <a:ext uri="{FF2B5EF4-FFF2-40B4-BE49-F238E27FC236}">
-                <a16:creationId xmlns:a16="http://schemas.microsoft.com/office/drawing/2014/main" id="{874BE4DA-BF8A-45F5-AA06-6C1C7589D3F2}"/>
+                <a16:creationId xmlns:a16="http://schemas.microsoft.com/office/drawing/2014/main" xmlns="" id="{874BE4DA-BF8A-45F5-AA06-6C1C7589D3F2}"/>
               </a:ext>
             </a:extLst>
           </p:cNvPr>
@@ -6749,15 +6406,18 @@
           </a:ln>
           <a:effectLst/>
           <a:extLst>
+            <a:ext uri="{FAA26D3D-D897-4be2-8F04-BA451C77F1D7}">
+              <ma14:placeholderFlag xmlns:ma14="http://schemas.microsoft.com/office/mac/drawingml/2011/main" val="1"/>
+            </a:ext>
             <a:ext uri="{909E8E84-426E-40dd-AFC4-6F175D3DCCD1}">
-              <a14:hiddenFill xmlns:a14="http://schemas.microsoft.com/office/drawing/2010/main" xmlns="">
+              <a14:hiddenFill xmlns="" xmlns:a14="http://schemas.microsoft.com/office/drawing/2010/main">
                 <a:solidFill>
                   <a:srgbClr val="FFFFFF"/>
                 </a:solidFill>
               </a14:hiddenFill>
             </a:ext>
             <a:ext uri="{91240B29-F687-4f45-9708-019B960494DF}">
-              <a14:hiddenLine xmlns:a14="http://schemas.microsoft.com/office/drawing/2010/main" xmlns="" w="9525" cap="flat">
+              <a14:hiddenLine xmlns="" xmlns:a14="http://schemas.microsoft.com/office/drawing/2010/main" w="9525" cap="flat">
                 <a:solidFill>
                   <a:srgbClr val="808080"/>
                 </a:solidFill>
@@ -6767,7 +6427,7 @@
               </a14:hiddenLine>
             </a:ext>
             <a:ext uri="{AF507438-7753-43e0-B8FC-AC1667EBCBE1}">
-              <a14:hiddenEffects xmlns:a14="http://schemas.microsoft.com/office/drawing/2010/main" xmlns="">
+              <a14:hiddenEffects xmlns="" xmlns:a14="http://schemas.microsoft.com/office/drawing/2010/main">
                 <a:effectLst>
                   <a:outerShdw blurRad="63500" dist="38099" dir="2700000" algn="ctr" rotWithShape="0">
                     <a:schemeClr val="bg2">
@@ -6776,9 +6436,6 @@
                   </a:outerShdw>
                 </a:effectLst>
               </a14:hiddenEffects>
-            </a:ext>
-            <a:ext uri="{FAA26D3D-D897-4be2-8F04-BA451C77F1D7}">
-              <ma14:placeholderFlag xmlns:ma14="http://schemas.microsoft.com/office/mac/drawingml/2011/main" xmlns="" val="1"/>
             </a:ext>
           </a:extLst>
         </p:spPr>
@@ -6859,7 +6516,7 @@
           <p:cNvPr id="1027" name="Text Box 3">
             <a:extLst>
               <a:ext uri="{FF2B5EF4-FFF2-40B4-BE49-F238E27FC236}">
-                <a16:creationId xmlns:a16="http://schemas.microsoft.com/office/drawing/2014/main" id="{1994C92B-7DFF-48F9-A1BA-8B57FA28211F}"/>
+                <a16:creationId xmlns:a16="http://schemas.microsoft.com/office/drawing/2014/main" xmlns="" id="{1994C92B-7DFF-48F9-A1BA-8B57FA28211F}"/>
               </a:ext>
             </a:extLst>
           </p:cNvPr>
@@ -6883,14 +6540,14 @@
           <a:effectLst/>
           <a:extLst>
             <a:ext uri="{909E8E84-426E-40dd-AFC4-6F175D3DCCD1}">
-              <a14:hiddenFill xmlns:a14="http://schemas.microsoft.com/office/drawing/2010/main" xmlns="">
+              <a14:hiddenFill xmlns="" xmlns:a14="http://schemas.microsoft.com/office/drawing/2010/main">
                 <a:solidFill>
                   <a:srgbClr val="FFFFFF"/>
                 </a:solidFill>
               </a14:hiddenFill>
             </a:ext>
             <a:ext uri="{91240B29-F687-4f45-9708-019B960494DF}">
-              <a14:hiddenLine xmlns:a14="http://schemas.microsoft.com/office/drawing/2010/main" xmlns="" w="9525" cap="flat">
+              <a14:hiddenLine xmlns="" xmlns:a14="http://schemas.microsoft.com/office/drawing/2010/main" w="9525" cap="flat">
                 <a:solidFill>
                   <a:srgbClr val="808080"/>
                 </a:solidFill>
@@ -6900,7 +6557,7 @@
               </a14:hiddenLine>
             </a:ext>
             <a:ext uri="{AF507438-7753-43e0-B8FC-AC1667EBCBE1}">
-              <a14:hiddenEffects xmlns:a14="http://schemas.microsoft.com/office/drawing/2010/main" xmlns="">
+              <a14:hiddenEffects xmlns="" xmlns:a14="http://schemas.microsoft.com/office/drawing/2010/main">
                 <a:effectLst>
                   <a:outerShdw blurRad="63500" dist="38099" dir="2700000" algn="ctr" rotWithShape="0">
                     <a:srgbClr val="000000">
@@ -6933,7 +6590,7 @@
           <p:cNvPr id="1028" name="Text Box 4">
             <a:extLst>
               <a:ext uri="{FF2B5EF4-FFF2-40B4-BE49-F238E27FC236}">
-                <a16:creationId xmlns:a16="http://schemas.microsoft.com/office/drawing/2014/main" id="{B74BF381-6BF0-42C5-AB9C-660AA24E2AE5}"/>
+                <a16:creationId xmlns:a16="http://schemas.microsoft.com/office/drawing/2014/main" xmlns="" id="{B74BF381-6BF0-42C5-AB9C-660AA24E2AE5}"/>
               </a:ext>
             </a:extLst>
           </p:cNvPr>
@@ -6957,14 +6614,14 @@
           <a:effectLst/>
           <a:extLst>
             <a:ext uri="{909E8E84-426E-40dd-AFC4-6F175D3DCCD1}">
-              <a14:hiddenFill xmlns:a14="http://schemas.microsoft.com/office/drawing/2010/main" xmlns="">
+              <a14:hiddenFill xmlns="" xmlns:a14="http://schemas.microsoft.com/office/drawing/2010/main">
                 <a:solidFill>
                   <a:srgbClr val="FFFFFF"/>
                 </a:solidFill>
               </a14:hiddenFill>
             </a:ext>
             <a:ext uri="{91240B29-F687-4f45-9708-019B960494DF}">
-              <a14:hiddenLine xmlns:a14="http://schemas.microsoft.com/office/drawing/2010/main" xmlns="" w="9525" cap="flat">
+              <a14:hiddenLine xmlns="" xmlns:a14="http://schemas.microsoft.com/office/drawing/2010/main" w="9525" cap="flat">
                 <a:solidFill>
                   <a:srgbClr val="808080"/>
                 </a:solidFill>
@@ -6974,7 +6631,7 @@
               </a14:hiddenLine>
             </a:ext>
             <a:ext uri="{AF507438-7753-43e0-B8FC-AC1667EBCBE1}">
-              <a14:hiddenEffects xmlns:a14="http://schemas.microsoft.com/office/drawing/2010/main" xmlns="">
+              <a14:hiddenEffects xmlns="" xmlns:a14="http://schemas.microsoft.com/office/drawing/2010/main">
                 <a:effectLst>
                   <a:outerShdw blurRad="63500" dist="38099" dir="2700000" algn="ctr" rotWithShape="0">
                     <a:srgbClr val="000000">
@@ -7007,7 +6664,7 @@
           <p:cNvPr id="1029" name="Rectangle 5">
             <a:extLst>
               <a:ext uri="{FF2B5EF4-FFF2-40B4-BE49-F238E27FC236}">
-                <a16:creationId xmlns:a16="http://schemas.microsoft.com/office/drawing/2014/main" id="{B91BC11B-7419-4D0E-B90D-1F9210B2236D}"/>
+                <a16:creationId xmlns:a16="http://schemas.microsoft.com/office/drawing/2014/main" xmlns="" id="{B91BC11B-7419-4D0E-B90D-1F9210B2236D}"/>
               </a:ext>
             </a:extLst>
           </p:cNvPr>
@@ -7032,15 +6689,18 @@
           </a:ln>
           <a:effectLst/>
           <a:extLst>
+            <a:ext uri="{FAA26D3D-D897-4be2-8F04-BA451C77F1D7}">
+              <ma14:placeholderFlag xmlns:ma14="http://schemas.microsoft.com/office/mac/drawingml/2011/main" val="1"/>
+            </a:ext>
             <a:ext uri="{909E8E84-426E-40dd-AFC4-6F175D3DCCD1}">
-              <a14:hiddenFill xmlns:a14="http://schemas.microsoft.com/office/drawing/2010/main" xmlns="">
+              <a14:hiddenFill xmlns="" xmlns:a14="http://schemas.microsoft.com/office/drawing/2010/main">
                 <a:solidFill>
                   <a:srgbClr val="FFFFFF"/>
                 </a:solidFill>
               </a14:hiddenFill>
             </a:ext>
             <a:ext uri="{91240B29-F687-4f45-9708-019B960494DF}">
-              <a14:hiddenLine xmlns:a14="http://schemas.microsoft.com/office/drawing/2010/main" xmlns="" w="9525" cap="flat">
+              <a14:hiddenLine xmlns="" xmlns:a14="http://schemas.microsoft.com/office/drawing/2010/main" w="9525" cap="flat">
                 <a:solidFill>
                   <a:srgbClr val="808080"/>
                 </a:solidFill>
@@ -7050,7 +6710,7 @@
               </a14:hiddenLine>
             </a:ext>
             <a:ext uri="{AF507438-7753-43e0-B8FC-AC1667EBCBE1}">
-              <a14:hiddenEffects xmlns:a14="http://schemas.microsoft.com/office/drawing/2010/main" xmlns="">
+              <a14:hiddenEffects xmlns="" xmlns:a14="http://schemas.microsoft.com/office/drawing/2010/main">
                 <a:effectLst>
                   <a:outerShdw blurRad="63500" dist="38099" dir="2700000" algn="ctr" rotWithShape="0">
                     <a:schemeClr val="bg2">
@@ -7059,9 +6719,6 @@
                   </a:outerShdw>
                 </a:effectLst>
               </a14:hiddenEffects>
-            </a:ext>
-            <a:ext uri="{FAA26D3D-D897-4be2-8F04-BA451C77F1D7}">
-              <ma14:placeholderFlag xmlns:ma14="http://schemas.microsoft.com/office/mac/drawingml/2011/main" xmlns="" val="1"/>
             </a:ext>
           </a:extLst>
         </p:spPr>
@@ -7702,7 +7359,7 @@
           <p:cNvPr id="2049" name="Rectangle 1">
             <a:extLst>
               <a:ext uri="{FF2B5EF4-FFF2-40B4-BE49-F238E27FC236}">
-                <a16:creationId xmlns:a16="http://schemas.microsoft.com/office/drawing/2014/main" id="{1BAD7E75-5102-48FC-A1C6-FA063A615EB8}"/>
+                <a16:creationId xmlns:a16="http://schemas.microsoft.com/office/drawing/2014/main" xmlns="" id="{1BAD7E75-5102-48FC-A1C6-FA063A615EB8}"/>
               </a:ext>
             </a:extLst>
           </p:cNvPr>
@@ -7727,15 +7384,18 @@
           </a:ln>
           <a:effectLst/>
           <a:extLst>
+            <a:ext uri="{FAA26D3D-D897-4be2-8F04-BA451C77F1D7}">
+              <ma14:placeholderFlag xmlns:ma14="http://schemas.microsoft.com/office/mac/drawingml/2011/main" val="1"/>
+            </a:ext>
             <a:ext uri="{909E8E84-426E-40dd-AFC4-6F175D3DCCD1}">
-              <a14:hiddenFill xmlns:a14="http://schemas.microsoft.com/office/drawing/2010/main" xmlns="">
+              <a14:hiddenFill xmlns="" xmlns:a14="http://schemas.microsoft.com/office/drawing/2010/main">
                 <a:solidFill>
                   <a:srgbClr val="FFFFFF"/>
                 </a:solidFill>
               </a14:hiddenFill>
             </a:ext>
             <a:ext uri="{91240B29-F687-4f45-9708-019B960494DF}">
-              <a14:hiddenLine xmlns:a14="http://schemas.microsoft.com/office/drawing/2010/main" xmlns="" w="9525" cap="flat">
+              <a14:hiddenLine xmlns="" xmlns:a14="http://schemas.microsoft.com/office/drawing/2010/main" w="9525" cap="flat">
                 <a:solidFill>
                   <a:srgbClr val="808080"/>
                 </a:solidFill>
@@ -7745,7 +7405,7 @@
               </a14:hiddenLine>
             </a:ext>
             <a:ext uri="{AF507438-7753-43e0-B8FC-AC1667EBCBE1}">
-              <a14:hiddenEffects xmlns:a14="http://schemas.microsoft.com/office/drawing/2010/main" xmlns="">
+              <a14:hiddenEffects xmlns="" xmlns:a14="http://schemas.microsoft.com/office/drawing/2010/main">
                 <a:effectLst>
                   <a:outerShdw blurRad="63500" dist="38099" dir="2700000" algn="ctr" rotWithShape="0">
                     <a:schemeClr val="bg2">
@@ -7754,9 +7414,6 @@
                   </a:outerShdw>
                 </a:effectLst>
               </a14:hiddenEffects>
-            </a:ext>
-            <a:ext uri="{FAA26D3D-D897-4be2-8F04-BA451C77F1D7}">
-              <ma14:placeholderFlag xmlns:ma14="http://schemas.microsoft.com/office/mac/drawingml/2011/main" xmlns="" val="1"/>
             </a:ext>
           </a:extLst>
         </p:spPr>
@@ -7781,7 +7438,7 @@
           <p:cNvPr id="2050" name="Rectangle 2">
             <a:extLst>
               <a:ext uri="{FF2B5EF4-FFF2-40B4-BE49-F238E27FC236}">
-                <a16:creationId xmlns:a16="http://schemas.microsoft.com/office/drawing/2014/main" id="{32AA3DF1-9C9C-4EE1-AAFD-DF4362DF1C7E}"/>
+                <a16:creationId xmlns:a16="http://schemas.microsoft.com/office/drawing/2014/main" xmlns="" id="{32AA3DF1-9C9C-4EE1-AAFD-DF4362DF1C7E}"/>
               </a:ext>
             </a:extLst>
           </p:cNvPr>
@@ -7806,15 +7463,18 @@
           </a:ln>
           <a:effectLst/>
           <a:extLst>
+            <a:ext uri="{FAA26D3D-D897-4be2-8F04-BA451C77F1D7}">
+              <ma14:placeholderFlag xmlns:ma14="http://schemas.microsoft.com/office/mac/drawingml/2011/main" val="1"/>
+            </a:ext>
             <a:ext uri="{909E8E84-426E-40dd-AFC4-6F175D3DCCD1}">
-              <a14:hiddenFill xmlns:a14="http://schemas.microsoft.com/office/drawing/2010/main" xmlns="">
+              <a14:hiddenFill xmlns="" xmlns:a14="http://schemas.microsoft.com/office/drawing/2010/main">
                 <a:solidFill>
                   <a:srgbClr val="FFFFFF"/>
                 </a:solidFill>
               </a14:hiddenFill>
             </a:ext>
             <a:ext uri="{91240B29-F687-4f45-9708-019B960494DF}">
-              <a14:hiddenLine xmlns:a14="http://schemas.microsoft.com/office/drawing/2010/main" xmlns="" w="9525" cap="flat">
+              <a14:hiddenLine xmlns="" xmlns:a14="http://schemas.microsoft.com/office/drawing/2010/main" w="9525" cap="flat">
                 <a:solidFill>
                   <a:srgbClr val="808080"/>
                 </a:solidFill>
@@ -7824,7 +7484,7 @@
               </a14:hiddenLine>
             </a:ext>
             <a:ext uri="{AF507438-7753-43e0-B8FC-AC1667EBCBE1}">
-              <a14:hiddenEffects xmlns:a14="http://schemas.microsoft.com/office/drawing/2010/main" xmlns="">
+              <a14:hiddenEffects xmlns="" xmlns:a14="http://schemas.microsoft.com/office/drawing/2010/main">
                 <a:effectLst>
                   <a:outerShdw blurRad="63500" dist="38099" dir="2700000" algn="ctr" rotWithShape="0">
                     <a:schemeClr val="bg2">
@@ -7833,9 +7493,6 @@
                   </a:outerShdw>
                 </a:effectLst>
               </a14:hiddenEffects>
-            </a:ext>
-            <a:ext uri="{FAA26D3D-D897-4be2-8F04-BA451C77F1D7}">
-              <ma14:placeholderFlag xmlns:ma14="http://schemas.microsoft.com/office/mac/drawingml/2011/main" xmlns="" val="1"/>
             </a:ext>
           </a:extLst>
         </p:spPr>
@@ -7916,7 +7573,7 @@
           <p:cNvPr id="2051" name="Text Box 3">
             <a:extLst>
               <a:ext uri="{FF2B5EF4-FFF2-40B4-BE49-F238E27FC236}">
-                <a16:creationId xmlns:a16="http://schemas.microsoft.com/office/drawing/2014/main" id="{39A3E2B9-8C19-449A-9711-7813229F89CD}"/>
+                <a16:creationId xmlns:a16="http://schemas.microsoft.com/office/drawing/2014/main" xmlns="" id="{39A3E2B9-8C19-449A-9711-7813229F89CD}"/>
               </a:ext>
             </a:extLst>
           </p:cNvPr>
@@ -7940,14 +7597,14 @@
           <a:effectLst/>
           <a:extLst>
             <a:ext uri="{909E8E84-426E-40dd-AFC4-6F175D3DCCD1}">
-              <a14:hiddenFill xmlns:a14="http://schemas.microsoft.com/office/drawing/2010/main" xmlns="">
+              <a14:hiddenFill xmlns="" xmlns:a14="http://schemas.microsoft.com/office/drawing/2010/main">
                 <a:solidFill>
                   <a:srgbClr val="FFFFFF"/>
                 </a:solidFill>
               </a14:hiddenFill>
             </a:ext>
             <a:ext uri="{91240B29-F687-4f45-9708-019B960494DF}">
-              <a14:hiddenLine xmlns:a14="http://schemas.microsoft.com/office/drawing/2010/main" xmlns="" w="9525" cap="flat">
+              <a14:hiddenLine xmlns="" xmlns:a14="http://schemas.microsoft.com/office/drawing/2010/main" w="9525" cap="flat">
                 <a:solidFill>
                   <a:srgbClr val="808080"/>
                 </a:solidFill>
@@ -7957,7 +7614,7 @@
               </a14:hiddenLine>
             </a:ext>
             <a:ext uri="{AF507438-7753-43e0-B8FC-AC1667EBCBE1}">
-              <a14:hiddenEffects xmlns:a14="http://schemas.microsoft.com/office/drawing/2010/main" xmlns="">
+              <a14:hiddenEffects xmlns="" xmlns:a14="http://schemas.microsoft.com/office/drawing/2010/main">
                 <a:effectLst>
                   <a:outerShdw blurRad="63500" dist="38099" dir="2700000" algn="ctr" rotWithShape="0">
                     <a:srgbClr val="000000">
@@ -7990,7 +7647,7 @@
           <p:cNvPr id="2052" name="Text Box 4">
             <a:extLst>
               <a:ext uri="{FF2B5EF4-FFF2-40B4-BE49-F238E27FC236}">
-                <a16:creationId xmlns:a16="http://schemas.microsoft.com/office/drawing/2014/main" id="{0800CF4E-1C2B-4907-952F-9CCEC518CC31}"/>
+                <a16:creationId xmlns:a16="http://schemas.microsoft.com/office/drawing/2014/main" xmlns="" id="{0800CF4E-1C2B-4907-952F-9CCEC518CC31}"/>
               </a:ext>
             </a:extLst>
           </p:cNvPr>
@@ -8014,14 +7671,14 @@
           <a:effectLst/>
           <a:extLst>
             <a:ext uri="{909E8E84-426E-40dd-AFC4-6F175D3DCCD1}">
-              <a14:hiddenFill xmlns:a14="http://schemas.microsoft.com/office/drawing/2010/main" xmlns="">
+              <a14:hiddenFill xmlns="" xmlns:a14="http://schemas.microsoft.com/office/drawing/2010/main">
                 <a:solidFill>
                   <a:srgbClr val="FFFFFF"/>
                 </a:solidFill>
               </a14:hiddenFill>
             </a:ext>
             <a:ext uri="{91240B29-F687-4f45-9708-019B960494DF}">
-              <a14:hiddenLine xmlns:a14="http://schemas.microsoft.com/office/drawing/2010/main" xmlns="" w="9525" cap="flat">
+              <a14:hiddenLine xmlns="" xmlns:a14="http://schemas.microsoft.com/office/drawing/2010/main" w="9525" cap="flat">
                 <a:solidFill>
                   <a:srgbClr val="808080"/>
                 </a:solidFill>
@@ -8031,7 +7688,7 @@
               </a14:hiddenLine>
             </a:ext>
             <a:ext uri="{AF507438-7753-43e0-B8FC-AC1667EBCBE1}">
-              <a14:hiddenEffects xmlns:a14="http://schemas.microsoft.com/office/drawing/2010/main" xmlns="">
+              <a14:hiddenEffects xmlns="" xmlns:a14="http://schemas.microsoft.com/office/drawing/2010/main">
                 <a:effectLst>
                   <a:outerShdw blurRad="63500" dist="38099" dir="2700000" algn="ctr" rotWithShape="0">
                     <a:srgbClr val="000000">
@@ -8064,7 +7721,7 @@
           <p:cNvPr id="2053" name="Rectangle 5">
             <a:extLst>
               <a:ext uri="{FF2B5EF4-FFF2-40B4-BE49-F238E27FC236}">
-                <a16:creationId xmlns:a16="http://schemas.microsoft.com/office/drawing/2014/main" id="{E6D6EC0F-0C77-4018-8DD3-A93B4D124B31}"/>
+                <a16:creationId xmlns:a16="http://schemas.microsoft.com/office/drawing/2014/main" xmlns="" id="{E6D6EC0F-0C77-4018-8DD3-A93B4D124B31}"/>
               </a:ext>
             </a:extLst>
           </p:cNvPr>
@@ -8089,15 +7746,18 @@
           </a:ln>
           <a:effectLst/>
           <a:extLst>
+            <a:ext uri="{FAA26D3D-D897-4be2-8F04-BA451C77F1D7}">
+              <ma14:placeholderFlag xmlns:ma14="http://schemas.microsoft.com/office/mac/drawingml/2011/main" val="1"/>
+            </a:ext>
             <a:ext uri="{909E8E84-426E-40dd-AFC4-6F175D3DCCD1}">
-              <a14:hiddenFill xmlns:a14="http://schemas.microsoft.com/office/drawing/2010/main" xmlns="">
+              <a14:hiddenFill xmlns="" xmlns:a14="http://schemas.microsoft.com/office/drawing/2010/main">
                 <a:solidFill>
                   <a:srgbClr val="FFFFFF"/>
                 </a:solidFill>
               </a14:hiddenFill>
             </a:ext>
             <a:ext uri="{91240B29-F687-4f45-9708-019B960494DF}">
-              <a14:hiddenLine xmlns:a14="http://schemas.microsoft.com/office/drawing/2010/main" xmlns="" w="9525" cap="flat">
+              <a14:hiddenLine xmlns="" xmlns:a14="http://schemas.microsoft.com/office/drawing/2010/main" w="9525" cap="flat">
                 <a:solidFill>
                   <a:srgbClr val="808080"/>
                 </a:solidFill>
@@ -8107,7 +7767,7 @@
               </a14:hiddenLine>
             </a:ext>
             <a:ext uri="{AF507438-7753-43e0-B8FC-AC1667EBCBE1}">
-              <a14:hiddenEffects xmlns:a14="http://schemas.microsoft.com/office/drawing/2010/main" xmlns="">
+              <a14:hiddenEffects xmlns="" xmlns:a14="http://schemas.microsoft.com/office/drawing/2010/main">
                 <a:effectLst>
                   <a:outerShdw blurRad="63500" dist="38099" dir="2700000" algn="ctr" rotWithShape="0">
                     <a:schemeClr val="bg2">
@@ -8116,9 +7776,6 @@
                   </a:outerShdw>
                 </a:effectLst>
               </a14:hiddenEffects>
-            </a:ext>
-            <a:ext uri="{FAA26D3D-D897-4be2-8F04-BA451C77F1D7}">
-              <ma14:placeholderFlag xmlns:ma14="http://schemas.microsoft.com/office/mac/drawingml/2011/main" xmlns="" val="1"/>
             </a:ext>
           </a:extLst>
         </p:spPr>
@@ -8730,7 +8387,7 @@
           <p:cNvPr id="2" name="Title 1">
             <a:extLst>
               <a:ext uri="{FF2B5EF4-FFF2-40B4-BE49-F238E27FC236}">
-                <a16:creationId xmlns:a16="http://schemas.microsoft.com/office/drawing/2014/main" id="{56B17F45-4B66-4276-BFBE-9F1511CBB0BC}"/>
+                <a16:creationId xmlns:a16="http://schemas.microsoft.com/office/drawing/2014/main" xmlns="" id="{56B17F45-4B66-4276-BFBE-9F1511CBB0BC}"/>
               </a:ext>
             </a:extLst>
           </p:cNvPr>
@@ -8767,227 +8424,10 @@
       </p:sp>
       <p:sp>
         <p:nvSpPr>
-          <p:cNvPr id="27650" name="Rectangle 5">
-            <a:extLst>
-              <a:ext uri="{FF2B5EF4-FFF2-40B4-BE49-F238E27FC236}">
-                <a16:creationId xmlns:a16="http://schemas.microsoft.com/office/drawing/2014/main" id="{B513553E-4E05-4049-988F-E36B1E7B19BF}"/>
-              </a:ext>
-            </a:extLst>
-          </p:cNvPr>
-          <p:cNvSpPr>
-            <a:spLocks noChangeArrowheads="1"/>
-          </p:cNvSpPr>
-          <p:nvPr/>
-        </p:nvSpPr>
-        <p:spPr bwMode="auto">
-          <a:xfrm>
-            <a:off x="3326208" y="3962496"/>
-            <a:ext cx="2256634" cy="361013"/>
-          </a:xfrm>
-          <a:prstGeom prst="rect">
-            <a:avLst/>
-          </a:prstGeom>
-          <a:noFill/>
-          <a:ln>
-            <a:noFill/>
-          </a:ln>
-          <a:extLst>
-            <a:ext uri="{909E8E84-426E-40DD-AFC4-6F175D3DCCD1}">
-              <a14:hiddenFill xmlns:a14="http://schemas.microsoft.com/office/drawing/2010/main">
-                <a:solidFill>
-                  <a:srgbClr val="FFFFFF"/>
-                </a:solidFill>
-              </a14:hiddenFill>
-            </a:ext>
-            <a:ext uri="{91240B29-F687-4F45-9708-019B960494DF}">
-              <a14:hiddenLine xmlns:a14="http://schemas.microsoft.com/office/drawing/2010/main" w="9525">
-                <a:solidFill>
-                  <a:srgbClr val="000000"/>
-                </a:solidFill>
-                <a:miter lim="800000"/>
-                <a:headEnd/>
-                <a:tailEnd/>
-              </a14:hiddenLine>
-            </a:ext>
-          </a:extLst>
-        </p:spPr>
-        <p:txBody>
-          <a:bodyPr wrap="square" lIns="74057" tIns="37029" rIns="74057" bIns="37029">
-            <a:spAutoFit/>
-          </a:bodyPr>
-          <a:lstStyle>
-            <a:lvl1pPr eaLnBrk="0">
-              <a:defRPr sz="1900">
-                <a:solidFill>
-                  <a:schemeClr val="bg1"/>
-                </a:solidFill>
-                <a:latin typeface="Arial" panose="020B0604020202020204" pitchFamily="34" charset="0"/>
-                <a:ea typeface="MS PGothic" panose="020B0600070205080204" pitchFamily="34" charset="-128"/>
-              </a:defRPr>
-            </a:lvl1pPr>
-            <a:lvl2pPr marL="742950" indent="-285750" eaLnBrk="0">
-              <a:defRPr sz="1900">
-                <a:solidFill>
-                  <a:schemeClr val="bg1"/>
-                </a:solidFill>
-                <a:latin typeface="Arial" panose="020B0604020202020204" pitchFamily="34" charset="0"/>
-                <a:ea typeface="MS PGothic" panose="020B0600070205080204" pitchFamily="34" charset="-128"/>
-              </a:defRPr>
-            </a:lvl2pPr>
-            <a:lvl3pPr marL="1143000" indent="-228600" eaLnBrk="0">
-              <a:defRPr sz="1900">
-                <a:solidFill>
-                  <a:schemeClr val="bg1"/>
-                </a:solidFill>
-                <a:latin typeface="Arial" panose="020B0604020202020204" pitchFamily="34" charset="0"/>
-                <a:ea typeface="MS PGothic" panose="020B0600070205080204" pitchFamily="34" charset="-128"/>
-              </a:defRPr>
-            </a:lvl3pPr>
-            <a:lvl4pPr marL="1600200" indent="-228600" eaLnBrk="0">
-              <a:defRPr sz="1900">
-                <a:solidFill>
-                  <a:schemeClr val="bg1"/>
-                </a:solidFill>
-                <a:latin typeface="Arial" panose="020B0604020202020204" pitchFamily="34" charset="0"/>
-                <a:ea typeface="MS PGothic" panose="020B0600070205080204" pitchFamily="34" charset="-128"/>
-              </a:defRPr>
-            </a:lvl4pPr>
-            <a:lvl5pPr marL="2057400" indent="-228600" eaLnBrk="0">
-              <a:defRPr sz="1900">
-                <a:solidFill>
-                  <a:schemeClr val="bg1"/>
-                </a:solidFill>
-                <a:latin typeface="Arial" panose="020B0604020202020204" pitchFamily="34" charset="0"/>
-                <a:ea typeface="MS PGothic" panose="020B0600070205080204" pitchFamily="34" charset="-128"/>
-              </a:defRPr>
-            </a:lvl5pPr>
-            <a:lvl6pPr marL="2514600" indent="-228600" defTabSz="369888" eaLnBrk="0" fontAlgn="base" hangingPunct="0">
-              <a:lnSpc>
-                <a:spcPct val="93000"/>
-              </a:lnSpc>
-              <a:spcBef>
-                <a:spcPct val="0"/>
-              </a:spcBef>
-              <a:spcAft>
-                <a:spcPct val="0"/>
-              </a:spcAft>
-              <a:buClr>
-                <a:srgbClr val="000000"/>
-              </a:buClr>
-              <a:buSzPct val="100000"/>
-              <a:buFont typeface="Times New Roman" panose="02020603050405020304" pitchFamily="18" charset="0"/>
-              <a:defRPr sz="1900">
-                <a:solidFill>
-                  <a:schemeClr val="bg1"/>
-                </a:solidFill>
-                <a:latin typeface="Arial" panose="020B0604020202020204" pitchFamily="34" charset="0"/>
-                <a:ea typeface="MS PGothic" panose="020B0600070205080204" pitchFamily="34" charset="-128"/>
-              </a:defRPr>
-            </a:lvl6pPr>
-            <a:lvl7pPr marL="2971800" indent="-228600" defTabSz="369888" eaLnBrk="0" fontAlgn="base" hangingPunct="0">
-              <a:lnSpc>
-                <a:spcPct val="93000"/>
-              </a:lnSpc>
-              <a:spcBef>
-                <a:spcPct val="0"/>
-              </a:spcBef>
-              <a:spcAft>
-                <a:spcPct val="0"/>
-              </a:spcAft>
-              <a:buClr>
-                <a:srgbClr val="000000"/>
-              </a:buClr>
-              <a:buSzPct val="100000"/>
-              <a:buFont typeface="Times New Roman" panose="02020603050405020304" pitchFamily="18" charset="0"/>
-              <a:defRPr sz="1900">
-                <a:solidFill>
-                  <a:schemeClr val="bg1"/>
-                </a:solidFill>
-                <a:latin typeface="Arial" panose="020B0604020202020204" pitchFamily="34" charset="0"/>
-                <a:ea typeface="MS PGothic" panose="020B0600070205080204" pitchFamily="34" charset="-128"/>
-              </a:defRPr>
-            </a:lvl7pPr>
-            <a:lvl8pPr marL="3429000" indent="-228600" defTabSz="369888" eaLnBrk="0" fontAlgn="base" hangingPunct="0">
-              <a:lnSpc>
-                <a:spcPct val="93000"/>
-              </a:lnSpc>
-              <a:spcBef>
-                <a:spcPct val="0"/>
-              </a:spcBef>
-              <a:spcAft>
-                <a:spcPct val="0"/>
-              </a:spcAft>
-              <a:buClr>
-                <a:srgbClr val="000000"/>
-              </a:buClr>
-              <a:buSzPct val="100000"/>
-              <a:buFont typeface="Times New Roman" panose="02020603050405020304" pitchFamily="18" charset="0"/>
-              <a:defRPr sz="1900">
-                <a:solidFill>
-                  <a:schemeClr val="bg1"/>
-                </a:solidFill>
-                <a:latin typeface="Arial" panose="020B0604020202020204" pitchFamily="34" charset="0"/>
-                <a:ea typeface="MS PGothic" panose="020B0600070205080204" pitchFamily="34" charset="-128"/>
-              </a:defRPr>
-            </a:lvl8pPr>
-            <a:lvl9pPr marL="3886200" indent="-228600" defTabSz="369888" eaLnBrk="0" fontAlgn="base" hangingPunct="0">
-              <a:lnSpc>
-                <a:spcPct val="93000"/>
-              </a:lnSpc>
-              <a:spcBef>
-                <a:spcPct val="0"/>
-              </a:spcBef>
-              <a:spcAft>
-                <a:spcPct val="0"/>
-              </a:spcAft>
-              <a:buClr>
-                <a:srgbClr val="000000"/>
-              </a:buClr>
-              <a:buSzPct val="100000"/>
-              <a:buFont typeface="Times New Roman" panose="02020603050405020304" pitchFamily="18" charset="0"/>
-              <a:defRPr sz="1900">
-                <a:solidFill>
-                  <a:schemeClr val="bg1"/>
-                </a:solidFill>
-                <a:latin typeface="Arial" panose="020B0604020202020204" pitchFamily="34" charset="0"/>
-                <a:ea typeface="MS PGothic" panose="020B0600070205080204" pitchFamily="34" charset="-128"/>
-              </a:defRPr>
-            </a:lvl9pPr>
-          </a:lstStyle>
-          <a:p>
-            <a:pPr algn="ctr" eaLnBrk="1">
-              <a:buClrTx/>
-            </a:pPr>
-            <a:r>
-              <a:rPr lang="en-US" altLang="en-US" sz="2000" dirty="0">
-                <a:solidFill>
-                  <a:schemeClr val="tx1"/>
-                </a:solidFill>
-              </a:rPr>
-              <a:t>Twitter @</a:t>
-            </a:r>
-            <a:r>
-              <a:rPr lang="en-US" altLang="en-US" sz="2000" dirty="0" err="1">
-                <a:solidFill>
-                  <a:schemeClr val="tx1"/>
-                </a:solidFill>
-              </a:rPr>
-              <a:t>bazza_ni</a:t>
-            </a:r>
-            <a:endParaRPr lang="en-US" altLang="en-US" sz="2000" dirty="0">
-              <a:solidFill>
-                <a:schemeClr val="tx1"/>
-              </a:solidFill>
-            </a:endParaRPr>
-          </a:p>
-        </p:txBody>
-      </p:sp>
-      <p:sp>
-        <p:nvSpPr>
           <p:cNvPr id="8" name="Subtitle 2">
             <a:extLst>
               <a:ext uri="{FF2B5EF4-FFF2-40B4-BE49-F238E27FC236}">
-                <a16:creationId xmlns:a16="http://schemas.microsoft.com/office/drawing/2014/main" id="{33C5FC42-8727-4298-BDEE-E09A07238DB9}"/>
+                <a16:creationId xmlns:a16="http://schemas.microsoft.com/office/drawing/2014/main" xmlns="" id="{33C5FC42-8727-4298-BDEE-E09A07238DB9}"/>
               </a:ext>
             </a:extLst>
           </p:cNvPr>
@@ -9033,23 +8473,7 @@
               <a:defRPr/>
             </a:pPr>
             <a:r>
-              <a:rPr lang="en-US" dirty="0">
-                <a:ea typeface="+mn-ea"/>
-              </a:rPr>
-              <a:t>Barry Evans</a:t>
-            </a:r>
-          </a:p>
-          <a:p>
-            <a:pPr defTabSz="370286">
-              <a:spcAft>
-                <a:spcPts val="1144"/>
-              </a:spcAft>
-              <a:buFont typeface="Times New Roman" charset="0"/>
-              <a:buNone/>
-              <a:defRPr/>
-            </a:pPr>
-            <a:r>
-              <a:rPr lang="en-US" dirty="0">
+              <a:rPr lang="en-US" dirty="0" smtClean="0">
                 <a:ea typeface="+mn-ea"/>
               </a:rPr>
               <a:t>(</a:t>
@@ -9072,69 +8496,6 @@
               </a:rPr>
               <a:t>)</a:t>
             </a:r>
-          </a:p>
-        </p:txBody>
-      </p:sp>
-      <p:sp>
-        <p:nvSpPr>
-          <p:cNvPr id="3" name="Rectangle 2">
-            <a:extLst>
-              <a:ext uri="{FF2B5EF4-FFF2-40B4-BE49-F238E27FC236}">
-                <a16:creationId xmlns:a16="http://schemas.microsoft.com/office/drawing/2014/main" id="{60442607-ED20-4104-8B05-94A55E75FA4E}"/>
-              </a:ext>
-            </a:extLst>
-          </p:cNvPr>
-          <p:cNvSpPr/>
-          <p:nvPr/>
-        </p:nvSpPr>
-        <p:spPr>
-          <a:xfrm>
-            <a:off x="2436035" y="3333750"/>
-            <a:ext cx="4303679" cy="464423"/>
-          </a:xfrm>
-          <a:prstGeom prst="rect">
-            <a:avLst/>
-          </a:prstGeom>
-        </p:spPr>
-        <p:txBody>
-          <a:bodyPr wrap="none">
-            <a:spAutoFit/>
-          </a:bodyPr>
-          <a:lstStyle/>
-          <a:p>
-            <a:pPr defTabSz="370286">
-              <a:spcAft>
-                <a:spcPts val="1144"/>
-              </a:spcAft>
-              <a:defRPr/>
-            </a:pPr>
-            <a:r>
-              <a:rPr lang="en-US" sz="2600" dirty="0">
-                <a:solidFill>
-                  <a:srgbClr val="000000"/>
-                </a:solidFill>
-                <a:latin typeface="+mn-lt"/>
-                <a:ea typeface="+mn-ea"/>
-              </a:rPr>
-              <a:t>April 11th, 2018 @ </a:t>
-            </a:r>
-            <a:r>
-              <a:rPr lang="en-US" sz="2600" dirty="0" err="1">
-                <a:solidFill>
-                  <a:srgbClr val="000000"/>
-                </a:solidFill>
-                <a:latin typeface="+mn-lt"/>
-                <a:ea typeface="+mn-ea"/>
-              </a:rPr>
-              <a:t>DubJUG</a:t>
-            </a:r>
-            <a:endParaRPr lang="en-US" sz="2600" dirty="0">
-              <a:solidFill>
-                <a:srgbClr val="000000"/>
-              </a:solidFill>
-              <a:latin typeface="+mn-lt"/>
-              <a:ea typeface="+mn-ea"/>
-            </a:endParaRPr>
           </a:p>
         </p:txBody>
       </p:sp>
@@ -9168,7 +8529,7 @@
           <p:cNvPr id="2" name="Title 1">
             <a:extLst>
               <a:ext uri="{FF2B5EF4-FFF2-40B4-BE49-F238E27FC236}">
-                <a16:creationId xmlns:a16="http://schemas.microsoft.com/office/drawing/2014/main" id="{49652696-1EC9-4920-9C45-4FF657F92627}"/>
+                <a16:creationId xmlns:a16="http://schemas.microsoft.com/office/drawing/2014/main" xmlns="" id="{49652696-1EC9-4920-9C45-4FF657F92627}"/>
               </a:ext>
             </a:extLst>
           </p:cNvPr>
@@ -9193,47 +8554,140 @@
               <a:rPr lang="en-US" dirty="0">
                 <a:ea typeface="+mj-ea"/>
               </a:rPr>
-              <a:t>After…</a:t>
+              <a:t>What tools do I use?</a:t>
             </a:r>
           </a:p>
         </p:txBody>
       </p:sp>
-      <p:pic>
-        <p:nvPicPr>
-          <p:cNvPr id="6" name="Picture 5">
+      <p:sp>
+        <p:nvSpPr>
+          <p:cNvPr id="3" name="Content Placeholder 2">
             <a:extLst>
               <a:ext uri="{FF2B5EF4-FFF2-40B4-BE49-F238E27FC236}">
-                <a16:creationId xmlns:a16="http://schemas.microsoft.com/office/drawing/2014/main" id="{B7230B95-95BA-4AAB-B0E5-49A6C17ED7E4}"/>
+                <a16:creationId xmlns:a16="http://schemas.microsoft.com/office/drawing/2014/main" xmlns="" id="{82CD5303-1403-42D4-8658-2A3CCFF5906A}"/>
               </a:ext>
             </a:extLst>
           </p:cNvPr>
-          <p:cNvPicPr>
-            <a:picLocks noChangeAspect="1"/>
-          </p:cNvPicPr>
-          <p:nvPr/>
-        </p:nvPicPr>
-        <p:blipFill>
-          <a:blip r:embed="rId2"/>
-          <a:stretch>
-            <a:fillRect/>
-          </a:stretch>
-        </p:blipFill>
-        <p:spPr>
-          <a:xfrm>
-            <a:off x="1982788" y="1253656"/>
-            <a:ext cx="5105400" cy="3169119"/>
-          </a:xfrm>
-          <a:prstGeom prst="rect">
-            <a:avLst/>
-          </a:prstGeom>
-        </p:spPr>
-      </p:pic>
+          <p:cNvSpPr>
+            <a:spLocks noGrp="1"/>
+          </p:cNvSpPr>
+          <p:nvPr>
+            <p:ph idx="1"/>
+          </p:nvPr>
+        </p:nvSpPr>
+        <p:spPr/>
+        <p:txBody>
+          <a:bodyPr/>
+          <a:lstStyle/>
+          <a:p>
+            <a:pPr marL="370286" indent="-370286" defTabSz="370286">
+              <a:spcAft>
+                <a:spcPts val="1144"/>
+              </a:spcAft>
+              <a:buFont typeface="Arial"/>
+              <a:buChar char="•"/>
+              <a:defRPr/>
+            </a:pPr>
+            <a:r>
+              <a:rPr lang="en-US" dirty="0"/>
+              <a:t>IntelliJ IDEA</a:t>
+            </a:r>
+            <a:endParaRPr lang="en-US" dirty="0">
+              <a:ea typeface="+mn-ea"/>
+            </a:endParaRPr>
+          </a:p>
+          <a:p>
+            <a:pPr marL="0" indent="0" defTabSz="370286">
+              <a:spcAft>
+                <a:spcPts val="1144"/>
+              </a:spcAft>
+              <a:buFont typeface="Times New Roman" charset="0"/>
+              <a:buNone/>
+              <a:defRPr/>
+            </a:pPr>
+            <a:r>
+              <a:rPr lang="en-US" dirty="0">
+                <a:ea typeface="+mn-ea"/>
+              </a:rPr>
+              <a:t>		or</a:t>
+            </a:r>
+          </a:p>
+          <a:p>
+            <a:pPr marL="370286" indent="-370286" defTabSz="370286">
+              <a:spcAft>
+                <a:spcPts val="1144"/>
+              </a:spcAft>
+              <a:buFont typeface="Arial"/>
+              <a:buChar char="•"/>
+              <a:defRPr/>
+            </a:pPr>
+            <a:r>
+              <a:rPr lang="en-US" dirty="0"/>
+              <a:t>Eclipse</a:t>
+            </a:r>
+            <a:endParaRPr lang="en-US" dirty="0">
+              <a:ea typeface="+mn-ea"/>
+            </a:endParaRPr>
+          </a:p>
+          <a:p>
+            <a:pPr marL="0" indent="0" defTabSz="370286">
+              <a:spcAft>
+                <a:spcPts val="1144"/>
+              </a:spcAft>
+              <a:buFont typeface="Times New Roman" charset="0"/>
+              <a:buNone/>
+              <a:defRPr/>
+            </a:pPr>
+            <a:r>
+              <a:rPr lang="en-US" dirty="0">
+                <a:ea typeface="+mn-ea"/>
+              </a:rPr>
+              <a:t>		or</a:t>
+            </a:r>
+          </a:p>
+          <a:p>
+            <a:pPr marL="370286" indent="-370286" defTabSz="370286">
+              <a:spcAft>
+                <a:spcPts val="1144"/>
+              </a:spcAft>
+              <a:buFont typeface="Arial"/>
+              <a:buChar char="•"/>
+              <a:defRPr/>
+            </a:pPr>
+            <a:r>
+              <a:rPr lang="en-US" dirty="0">
+                <a:ea typeface="+mn-ea"/>
+              </a:rPr>
+              <a:t>Command line Maven/Git</a:t>
+            </a:r>
+            <a:br>
+              <a:rPr lang="en-US" dirty="0">
+                <a:ea typeface="+mn-ea"/>
+              </a:rPr>
+            </a:br>
+            <a:r>
+              <a:rPr lang="en-US" dirty="0">
+                <a:ea typeface="+mn-ea"/>
+              </a:rPr>
+              <a:t>+ your choice of text editor</a:t>
+            </a:r>
+          </a:p>
+          <a:p>
+            <a:pPr marL="370286" indent="-370286" defTabSz="370286">
+              <a:spcAft>
+                <a:spcPts val="1144"/>
+              </a:spcAft>
+              <a:buFont typeface="Arial"/>
+              <a:buChar char="•"/>
+              <a:defRPr/>
+            </a:pPr>
+            <a:endParaRPr lang="en-US" dirty="0">
+              <a:ea typeface="+mn-ea"/>
+            </a:endParaRPr>
+          </a:p>
+        </p:txBody>
+      </p:sp>
     </p:spTree>
-    <p:extLst>
-      <p:ext uri="{BB962C8B-B14F-4D97-AF65-F5344CB8AC3E}">
-        <p14:creationId xmlns:p14="http://schemas.microsoft.com/office/powerpoint/2010/main" val="1149604350"/>
-      </p:ext>
-    </p:extLst>
   </p:cSld>
   <p:clrMapOvr>
     <a:masterClrMapping/>
@@ -9263,7 +8717,7 @@
           <p:cNvPr id="2" name="Title 1">
             <a:extLst>
               <a:ext uri="{FF2B5EF4-FFF2-40B4-BE49-F238E27FC236}">
-                <a16:creationId xmlns:a16="http://schemas.microsoft.com/office/drawing/2014/main" id="{49652696-1EC9-4920-9C45-4FF657F92627}"/>
+                <a16:creationId xmlns:a16="http://schemas.microsoft.com/office/drawing/2014/main" xmlns="" id="{6FCCBA75-7662-4752-8F74-B705EDAC9965}"/>
               </a:ext>
             </a:extLst>
           </p:cNvPr>
@@ -9279,194 +8733,6 @@
           <a:bodyPr/>
           <a:lstStyle/>
           <a:p>
-            <a:pPr defTabSz="370286">
-              <a:buFont typeface="Times New Roman" charset="0"/>
-              <a:buNone/>
-              <a:defRPr/>
-            </a:pPr>
-            <a:r>
-              <a:rPr lang="en-US" dirty="0">
-                <a:ea typeface="+mj-ea"/>
-              </a:rPr>
-              <a:t>What tools do I use?</a:t>
-            </a:r>
-          </a:p>
-        </p:txBody>
-      </p:sp>
-      <p:sp>
-        <p:nvSpPr>
-          <p:cNvPr id="3" name="Content Placeholder 2">
-            <a:extLst>
-              <a:ext uri="{FF2B5EF4-FFF2-40B4-BE49-F238E27FC236}">
-                <a16:creationId xmlns:a16="http://schemas.microsoft.com/office/drawing/2014/main" id="{82CD5303-1403-42D4-8658-2A3CCFF5906A}"/>
-              </a:ext>
-            </a:extLst>
-          </p:cNvPr>
-          <p:cNvSpPr>
-            <a:spLocks noGrp="1"/>
-          </p:cNvSpPr>
-          <p:nvPr>
-            <p:ph idx="1"/>
-          </p:nvPr>
-        </p:nvSpPr>
-        <p:spPr/>
-        <p:txBody>
-          <a:bodyPr/>
-          <a:lstStyle/>
-          <a:p>
-            <a:pPr marL="370286" indent="-370286" defTabSz="370286">
-              <a:spcAft>
-                <a:spcPts val="1144"/>
-              </a:spcAft>
-              <a:buFont typeface="Arial"/>
-              <a:buChar char="•"/>
-              <a:defRPr/>
-            </a:pPr>
-            <a:r>
-              <a:rPr lang="en-US" dirty="0"/>
-              <a:t>IntelliJ IDEA</a:t>
-            </a:r>
-            <a:endParaRPr lang="en-US" dirty="0">
-              <a:ea typeface="+mn-ea"/>
-            </a:endParaRPr>
-          </a:p>
-          <a:p>
-            <a:pPr marL="0" indent="0" defTabSz="370286">
-              <a:spcAft>
-                <a:spcPts val="1144"/>
-              </a:spcAft>
-              <a:buFont typeface="Times New Roman" charset="0"/>
-              <a:buNone/>
-              <a:defRPr/>
-            </a:pPr>
-            <a:r>
-              <a:rPr lang="en-US" dirty="0">
-                <a:ea typeface="+mn-ea"/>
-              </a:rPr>
-              <a:t>		or</a:t>
-            </a:r>
-          </a:p>
-          <a:p>
-            <a:pPr marL="370286" indent="-370286" defTabSz="370286">
-              <a:spcAft>
-                <a:spcPts val="1144"/>
-              </a:spcAft>
-              <a:buFont typeface="Arial"/>
-              <a:buChar char="•"/>
-              <a:defRPr/>
-            </a:pPr>
-            <a:r>
-              <a:rPr lang="en-US" dirty="0"/>
-              <a:t>Eclipse</a:t>
-            </a:r>
-            <a:endParaRPr lang="en-US" dirty="0">
-              <a:ea typeface="+mn-ea"/>
-            </a:endParaRPr>
-          </a:p>
-          <a:p>
-            <a:pPr marL="0" indent="0" defTabSz="370286">
-              <a:spcAft>
-                <a:spcPts val="1144"/>
-              </a:spcAft>
-              <a:buFont typeface="Times New Roman" charset="0"/>
-              <a:buNone/>
-              <a:defRPr/>
-            </a:pPr>
-            <a:r>
-              <a:rPr lang="en-US" dirty="0">
-                <a:ea typeface="+mn-ea"/>
-              </a:rPr>
-              <a:t>		or</a:t>
-            </a:r>
-          </a:p>
-          <a:p>
-            <a:pPr marL="370286" indent="-370286" defTabSz="370286">
-              <a:spcAft>
-                <a:spcPts val="1144"/>
-              </a:spcAft>
-              <a:buFont typeface="Arial"/>
-              <a:buChar char="•"/>
-              <a:defRPr/>
-            </a:pPr>
-            <a:r>
-              <a:rPr lang="en-US" dirty="0">
-                <a:ea typeface="+mn-ea"/>
-              </a:rPr>
-              <a:t>Command line Maven/Git</a:t>
-            </a:r>
-            <a:br>
-              <a:rPr lang="en-US" dirty="0">
-                <a:ea typeface="+mn-ea"/>
-              </a:rPr>
-            </a:br>
-            <a:r>
-              <a:rPr lang="en-US" dirty="0">
-                <a:ea typeface="+mn-ea"/>
-              </a:rPr>
-              <a:t>+ your choice of text editor</a:t>
-            </a:r>
-          </a:p>
-          <a:p>
-            <a:pPr marL="370286" indent="-370286" defTabSz="370286">
-              <a:spcAft>
-                <a:spcPts val="1144"/>
-              </a:spcAft>
-              <a:buFont typeface="Arial"/>
-              <a:buChar char="•"/>
-              <a:defRPr/>
-            </a:pPr>
-            <a:endParaRPr lang="en-US" dirty="0">
-              <a:ea typeface="+mn-ea"/>
-            </a:endParaRPr>
-          </a:p>
-        </p:txBody>
-      </p:sp>
-    </p:spTree>
-  </p:cSld>
-  <p:clrMapOvr>
-    <a:masterClrMapping/>
-  </p:clrMapOvr>
-</p:sld>
-</file>
-
-<file path=ppt/slides/slide12.xml><?xml version="1.0" encoding="utf-8"?>
-<p:sld xmlns:a="http://schemas.openxmlformats.org/drawingml/2006/main" xmlns:r="http://schemas.openxmlformats.org/officeDocument/2006/relationships" xmlns:p="http://schemas.openxmlformats.org/presentationml/2006/main">
-  <p:cSld>
-    <p:spTree>
-      <p:nvGrpSpPr>
-        <p:cNvPr id="1" name=""/>
-        <p:cNvGrpSpPr/>
-        <p:nvPr/>
-      </p:nvGrpSpPr>
-      <p:grpSpPr>
-        <a:xfrm>
-          <a:off x="0" y="0"/>
-          <a:ext cx="0" cy="0"/>
-          <a:chOff x="0" y="0"/>
-          <a:chExt cx="0" cy="0"/>
-        </a:xfrm>
-      </p:grpSpPr>
-      <p:sp>
-        <p:nvSpPr>
-          <p:cNvPr id="2" name="Title 1">
-            <a:extLst>
-              <a:ext uri="{FF2B5EF4-FFF2-40B4-BE49-F238E27FC236}">
-                <a16:creationId xmlns:a16="http://schemas.microsoft.com/office/drawing/2014/main" id="{6FCCBA75-7662-4752-8F74-B705EDAC9965}"/>
-              </a:ext>
-            </a:extLst>
-          </p:cNvPr>
-          <p:cNvSpPr>
-            <a:spLocks noGrp="1"/>
-          </p:cNvSpPr>
-          <p:nvPr>
-            <p:ph type="title"/>
-          </p:nvPr>
-        </p:nvSpPr>
-        <p:spPr/>
-        <p:txBody>
-          <a:bodyPr/>
-          <a:lstStyle/>
-          <a:p>
             <a:r>
               <a:rPr lang="en-IE" dirty="0"/>
               <a:t>Allow me to introduce JUnit 5 Jim</a:t>
@@ -9480,7 +8746,7 @@
           <p:cNvPr id="7" name="Content Placeholder 6">
             <a:extLst>
               <a:ext uri="{FF2B5EF4-FFF2-40B4-BE49-F238E27FC236}">
-                <a16:creationId xmlns:a16="http://schemas.microsoft.com/office/drawing/2014/main" id="{C38FC959-A0A4-487F-87FB-6DA6C9D2A95E}"/>
+                <a16:creationId xmlns:a16="http://schemas.microsoft.com/office/drawing/2014/main" xmlns="" id="{C38FC959-A0A4-487F-87FB-6DA6C9D2A95E}"/>
               </a:ext>
             </a:extLst>
           </p:cNvPr>
@@ -9509,7 +8775,7 @@
           <p:cNvPr id="8" name="Picture 7">
             <a:extLst>
               <a:ext uri="{FF2B5EF4-FFF2-40B4-BE49-F238E27FC236}">
-                <a16:creationId xmlns:a16="http://schemas.microsoft.com/office/drawing/2014/main" id="{A8D6792B-897E-4ED4-B793-F04FE0D5B3E6}"/>
+                <a16:creationId xmlns:a16="http://schemas.microsoft.com/office/drawing/2014/main" xmlns="" id="{A8D6792B-897E-4ED4-B793-F04FE0D5B3E6}"/>
               </a:ext>
             </a:extLst>
           </p:cNvPr>
@@ -9522,7 +8788,7 @@
           <a:blip r:embed="rId3">
             <a:extLst>
               <a:ext uri="{837473B0-CC2E-450A-ABE3-18F120FF3D39}">
-                <a1611:picAttrSrcUrl xmlns:a1611="http://schemas.microsoft.com/office/drawing/2016/11/main" r:id="rId4"/>
+                <a1611:picAttrSrcUrl xmlns:a1611="http://schemas.microsoft.com/office/drawing/2016/11/main" xmlns="" r:id="rId4"/>
               </a:ext>
             </a:extLst>
           </a:blip>
@@ -9545,7 +8811,7 @@
           <p:cNvPr id="1026" name="Picture 2" descr="Image result for junit 5">
             <a:extLst>
               <a:ext uri="{FF2B5EF4-FFF2-40B4-BE49-F238E27FC236}">
-                <a16:creationId xmlns:a16="http://schemas.microsoft.com/office/drawing/2014/main" id="{C9990B8E-2C82-430E-B4E7-8D633E115018}"/>
+                <a16:creationId xmlns:a16="http://schemas.microsoft.com/office/drawing/2014/main" xmlns="" id="{C9990B8E-2C82-430E-B4E7-8D633E115018}"/>
               </a:ext>
             </a:extLst>
           </p:cNvPr>
@@ -9592,7 +8858,7 @@
           <p:cNvPr id="14" name="Picture 13">
             <a:extLst>
               <a:ext uri="{FF2B5EF4-FFF2-40B4-BE49-F238E27FC236}">
-                <a16:creationId xmlns:a16="http://schemas.microsoft.com/office/drawing/2014/main" id="{6EBD5D10-5B88-4B5C-904C-F69D957E3FF9}"/>
+                <a16:creationId xmlns:a16="http://schemas.microsoft.com/office/drawing/2014/main" xmlns="" id="{6EBD5D10-5B88-4B5C-904C-F69D957E3FF9}"/>
               </a:ext>
             </a:extLst>
           </p:cNvPr>
@@ -9605,7 +8871,7 @@
           <a:blip r:embed="rId6">
             <a:extLst>
               <a:ext uri="{837473B0-CC2E-450A-ABE3-18F120FF3D39}">
-                <a1611:picAttrSrcUrl xmlns:a1611="http://schemas.microsoft.com/office/drawing/2016/11/main" r:id="rId7"/>
+                <a1611:picAttrSrcUrl xmlns:a1611="http://schemas.microsoft.com/office/drawing/2016/11/main" xmlns="" r:id="rId7"/>
               </a:ext>
             </a:extLst>
           </a:blip>
@@ -9756,7 +9022,7 @@
 </p:sld>
 </file>
 
-<file path=ppt/slides/slide13.xml><?xml version="1.0" encoding="utf-8"?>
+<file path=ppt/slides/slide12.xml><?xml version="1.0" encoding="utf-8"?>
 <p:sld xmlns:a="http://schemas.openxmlformats.org/drawingml/2006/main" xmlns:r="http://schemas.openxmlformats.org/officeDocument/2006/relationships" xmlns:p="http://schemas.openxmlformats.org/presentationml/2006/main">
   <p:cSld>
     <p:spTree>
@@ -9778,7 +9044,7 @@
           <p:cNvPr id="37889" name="TextBox 5">
             <a:extLst>
               <a:ext uri="{FF2B5EF4-FFF2-40B4-BE49-F238E27FC236}">
-                <a16:creationId xmlns:a16="http://schemas.microsoft.com/office/drawing/2014/main" id="{4DB83A44-3C76-43F1-99BC-3C72D1A0CDD6}"/>
+                <a16:creationId xmlns:a16="http://schemas.microsoft.com/office/drawing/2014/main" xmlns="" id="{4DB83A44-3C76-43F1-99BC-3C72D1A0CDD6}"/>
               </a:ext>
             </a:extLst>
           </p:cNvPr>
@@ -9991,7 +9257,7 @@
           <p:cNvPr id="37890" name="Picture 6">
             <a:extLst>
               <a:ext uri="{FF2B5EF4-FFF2-40B4-BE49-F238E27FC236}">
-                <a16:creationId xmlns:a16="http://schemas.microsoft.com/office/drawing/2014/main" id="{46D97EC3-8351-4308-B5EE-9CD7D2AF29AE}"/>
+                <a16:creationId xmlns:a16="http://schemas.microsoft.com/office/drawing/2014/main" xmlns="" id="{46D97EC3-8351-4308-B5EE-9CD7D2AF29AE}"/>
               </a:ext>
             </a:extLst>
           </p:cNvPr>
@@ -10051,7 +9317,7 @@
           <p:cNvPr id="37891" name="TextBox 1">
             <a:extLst>
               <a:ext uri="{FF2B5EF4-FFF2-40B4-BE49-F238E27FC236}">
-                <a16:creationId xmlns:a16="http://schemas.microsoft.com/office/drawing/2014/main" id="{F23A54B0-BCAB-4D0F-9F76-91B00A8C0B01}"/>
+                <a16:creationId xmlns:a16="http://schemas.microsoft.com/office/drawing/2014/main" xmlns="" id="{F23A54B0-BCAB-4D0F-9F76-91B00A8C0B01}"/>
               </a:ext>
             </a:extLst>
           </p:cNvPr>
@@ -10063,7 +9329,7 @@
         <p:spPr bwMode="auto">
           <a:xfrm>
             <a:off x="914400" y="2647950"/>
-            <a:ext cx="4267200" cy="1809726"/>
+            <a:ext cx="5334000" cy="1809726"/>
           </a:xfrm>
           <a:prstGeom prst="rect">
             <a:avLst/>
@@ -10093,7 +9359,7 @@
           </a:extLst>
         </p:spPr>
         <p:txBody>
-          <a:bodyPr>
+          <a:bodyPr wrap="square">
             <a:spAutoFit/>
           </a:bodyPr>
           <a:lstStyle>
@@ -10254,7 +9520,47 @@
                   <a:srgbClr val="0000FF"/>
                 </a:solidFill>
               </a:rPr>
-              <a:t>https://github.com/bazzani/JavaOne2017-HOL-JUnit5 (</a:t>
+              <a:t>https://</a:t>
+            </a:r>
+            <a:r>
+              <a:rPr lang="en-US" altLang="en-US" sz="2000" dirty="0" err="1" smtClean="0">
+                <a:solidFill>
+                  <a:srgbClr val="0000FF"/>
+                </a:solidFill>
+              </a:rPr>
+              <a:t>github.com</a:t>
+            </a:r>
+            <a:r>
+              <a:rPr lang="en-US" altLang="en-US" sz="2000" dirty="0" smtClean="0">
+                <a:solidFill>
+                  <a:srgbClr val="0000FF"/>
+                </a:solidFill>
+              </a:rPr>
+              <a:t>/</a:t>
+            </a:r>
+            <a:r>
+              <a:rPr lang="en-US" altLang="en-US" sz="2000" dirty="0" err="1" smtClean="0">
+                <a:solidFill>
+                  <a:srgbClr val="0000FF"/>
+                </a:solidFill>
+              </a:rPr>
+              <a:t>mcdonnell</a:t>
+            </a:r>
+            <a:r>
+              <a:rPr lang="en-US" altLang="en-US" sz="2000" dirty="0" smtClean="0">
+                <a:solidFill>
+                  <a:srgbClr val="0000FF"/>
+                </a:solidFill>
+              </a:rPr>
+              <a:t>-john/JavaOne2017-HOL-JUnit5 </a:t>
+            </a:r>
+            <a:r>
+              <a:rPr lang="en-US" altLang="en-US" sz="2000" dirty="0">
+                <a:solidFill>
+                  <a:srgbClr val="0000FF"/>
+                </a:solidFill>
+              </a:rPr>
+              <a:t>(</a:t>
             </a:r>
             <a:r>
               <a:rPr lang="en-US" altLang="en-US" sz="1600" dirty="0">
@@ -10273,13 +9579,13 @@
               <a:t>)</a:t>
             </a:r>
             <a:br>
-              <a:rPr lang="en-US" altLang="en-US" sz="2000">
+              <a:rPr lang="en-US" altLang="en-US" sz="2000" dirty="0">
                 <a:solidFill>
                   <a:srgbClr val="0000FF"/>
                 </a:solidFill>
               </a:rPr>
             </a:br>
-            <a:endParaRPr lang="en-US" altLang="en-US" sz="2000">
+            <a:endParaRPr lang="en-US" altLang="en-US" sz="2000" dirty="0">
               <a:solidFill>
                 <a:srgbClr val="0000FF"/>
               </a:solidFill>
@@ -10288,7 +9594,7 @@
           <a:p>
             <a:pPr eaLnBrk="1"/>
             <a:r>
-              <a:rPr lang="en-US" altLang="en-US" sz="2000">
+              <a:rPr lang="en-US" altLang="en-US" sz="2000" dirty="0">
                 <a:solidFill>
                   <a:srgbClr val="0000FF"/>
                 </a:solidFill>
@@ -10341,225 +9647,10 @@
       </p:grpSpPr>
       <p:sp>
         <p:nvSpPr>
-          <p:cNvPr id="28673" name="TextBox 4">
+          <p:cNvPr id="2" name="Title 1">
             <a:extLst>
               <a:ext uri="{FF2B5EF4-FFF2-40B4-BE49-F238E27FC236}">
-                <a16:creationId xmlns:a16="http://schemas.microsoft.com/office/drawing/2014/main" id="{3F31BFB2-65B9-4ADF-B9A6-157E76FE5BFB}"/>
-              </a:ext>
-            </a:extLst>
-          </p:cNvPr>
-          <p:cNvSpPr txBox="1">
-            <a:spLocks noChangeArrowheads="1"/>
-          </p:cNvSpPr>
-          <p:nvPr/>
-        </p:nvSpPr>
-        <p:spPr bwMode="auto">
-          <a:xfrm>
-            <a:off x="3764757" y="3897312"/>
-            <a:ext cx="1541462" cy="350838"/>
-          </a:xfrm>
-          <a:prstGeom prst="rect">
-            <a:avLst/>
-          </a:prstGeom>
-          <a:noFill/>
-          <a:ln>
-            <a:noFill/>
-          </a:ln>
-          <a:extLst>
-            <a:ext uri="{909E8E84-426E-40DD-AFC4-6F175D3DCCD1}">
-              <a14:hiddenFill xmlns:a14="http://schemas.microsoft.com/office/drawing/2010/main">
-                <a:solidFill>
-                  <a:srgbClr val="FFFFFF"/>
-                </a:solidFill>
-              </a14:hiddenFill>
-            </a:ext>
-            <a:ext uri="{91240B29-F687-4F45-9708-019B960494DF}">
-              <a14:hiddenLine xmlns:a14="http://schemas.microsoft.com/office/drawing/2010/main" w="9525">
-                <a:solidFill>
-                  <a:srgbClr val="000000"/>
-                </a:solidFill>
-                <a:miter lim="800000"/>
-                <a:headEnd/>
-                <a:tailEnd/>
-              </a14:hiddenLine>
-            </a:ext>
-          </a:extLst>
-        </p:spPr>
-        <p:txBody>
-          <a:bodyPr wrap="square" lIns="74057" tIns="37029" rIns="74057" bIns="37029">
-            <a:spAutoFit/>
-          </a:bodyPr>
-          <a:lstStyle>
-            <a:lvl1pPr eaLnBrk="0">
-              <a:defRPr sz="1900">
-                <a:solidFill>
-                  <a:schemeClr val="bg1"/>
-                </a:solidFill>
-                <a:latin typeface="Arial" panose="020B0604020202020204" pitchFamily="34" charset="0"/>
-                <a:ea typeface="MS PGothic" panose="020B0600070205080204" pitchFamily="34" charset="-128"/>
-              </a:defRPr>
-            </a:lvl1pPr>
-            <a:lvl2pPr marL="742950" indent="-285750" eaLnBrk="0">
-              <a:defRPr sz="1900">
-                <a:solidFill>
-                  <a:schemeClr val="bg1"/>
-                </a:solidFill>
-                <a:latin typeface="Arial" panose="020B0604020202020204" pitchFamily="34" charset="0"/>
-                <a:ea typeface="MS PGothic" panose="020B0600070205080204" pitchFamily="34" charset="-128"/>
-              </a:defRPr>
-            </a:lvl2pPr>
-            <a:lvl3pPr marL="1143000" indent="-228600" eaLnBrk="0">
-              <a:defRPr sz="1900">
-                <a:solidFill>
-                  <a:schemeClr val="bg1"/>
-                </a:solidFill>
-                <a:latin typeface="Arial" panose="020B0604020202020204" pitchFamily="34" charset="0"/>
-                <a:ea typeface="MS PGothic" panose="020B0600070205080204" pitchFamily="34" charset="-128"/>
-              </a:defRPr>
-            </a:lvl3pPr>
-            <a:lvl4pPr marL="1600200" indent="-228600" eaLnBrk="0">
-              <a:defRPr sz="1900">
-                <a:solidFill>
-                  <a:schemeClr val="bg1"/>
-                </a:solidFill>
-                <a:latin typeface="Arial" panose="020B0604020202020204" pitchFamily="34" charset="0"/>
-                <a:ea typeface="MS PGothic" panose="020B0600070205080204" pitchFamily="34" charset="-128"/>
-              </a:defRPr>
-            </a:lvl4pPr>
-            <a:lvl5pPr marL="2057400" indent="-228600" eaLnBrk="0">
-              <a:defRPr sz="1900">
-                <a:solidFill>
-                  <a:schemeClr val="bg1"/>
-                </a:solidFill>
-                <a:latin typeface="Arial" panose="020B0604020202020204" pitchFamily="34" charset="0"/>
-                <a:ea typeface="MS PGothic" panose="020B0600070205080204" pitchFamily="34" charset="-128"/>
-              </a:defRPr>
-            </a:lvl5pPr>
-            <a:lvl6pPr marL="2514600" indent="-228600" defTabSz="369888" eaLnBrk="0" fontAlgn="base" hangingPunct="0">
-              <a:lnSpc>
-                <a:spcPct val="93000"/>
-              </a:lnSpc>
-              <a:spcBef>
-                <a:spcPct val="0"/>
-              </a:spcBef>
-              <a:spcAft>
-                <a:spcPct val="0"/>
-              </a:spcAft>
-              <a:buClr>
-                <a:srgbClr val="000000"/>
-              </a:buClr>
-              <a:buSzPct val="100000"/>
-              <a:buFont typeface="Times New Roman" panose="02020603050405020304" pitchFamily="18" charset="0"/>
-              <a:defRPr sz="1900">
-                <a:solidFill>
-                  <a:schemeClr val="bg1"/>
-                </a:solidFill>
-                <a:latin typeface="Arial" panose="020B0604020202020204" pitchFamily="34" charset="0"/>
-                <a:ea typeface="MS PGothic" panose="020B0600070205080204" pitchFamily="34" charset="-128"/>
-              </a:defRPr>
-            </a:lvl6pPr>
-            <a:lvl7pPr marL="2971800" indent="-228600" defTabSz="369888" eaLnBrk="0" fontAlgn="base" hangingPunct="0">
-              <a:lnSpc>
-                <a:spcPct val="93000"/>
-              </a:lnSpc>
-              <a:spcBef>
-                <a:spcPct val="0"/>
-              </a:spcBef>
-              <a:spcAft>
-                <a:spcPct val="0"/>
-              </a:spcAft>
-              <a:buClr>
-                <a:srgbClr val="000000"/>
-              </a:buClr>
-              <a:buSzPct val="100000"/>
-              <a:buFont typeface="Times New Roman" panose="02020603050405020304" pitchFamily="18" charset="0"/>
-              <a:defRPr sz="1900">
-                <a:solidFill>
-                  <a:schemeClr val="bg1"/>
-                </a:solidFill>
-                <a:latin typeface="Arial" panose="020B0604020202020204" pitchFamily="34" charset="0"/>
-                <a:ea typeface="MS PGothic" panose="020B0600070205080204" pitchFamily="34" charset="-128"/>
-              </a:defRPr>
-            </a:lvl7pPr>
-            <a:lvl8pPr marL="3429000" indent="-228600" defTabSz="369888" eaLnBrk="0" fontAlgn="base" hangingPunct="0">
-              <a:lnSpc>
-                <a:spcPct val="93000"/>
-              </a:lnSpc>
-              <a:spcBef>
-                <a:spcPct val="0"/>
-              </a:spcBef>
-              <a:spcAft>
-                <a:spcPct val="0"/>
-              </a:spcAft>
-              <a:buClr>
-                <a:srgbClr val="000000"/>
-              </a:buClr>
-              <a:buSzPct val="100000"/>
-              <a:buFont typeface="Times New Roman" panose="02020603050405020304" pitchFamily="18" charset="0"/>
-              <a:defRPr sz="1900">
-                <a:solidFill>
-                  <a:schemeClr val="bg1"/>
-                </a:solidFill>
-                <a:latin typeface="Arial" panose="020B0604020202020204" pitchFamily="34" charset="0"/>
-                <a:ea typeface="MS PGothic" panose="020B0600070205080204" pitchFamily="34" charset="-128"/>
-              </a:defRPr>
-            </a:lvl8pPr>
-            <a:lvl9pPr marL="3886200" indent="-228600" defTabSz="369888" eaLnBrk="0" fontAlgn="base" hangingPunct="0">
-              <a:lnSpc>
-                <a:spcPct val="93000"/>
-              </a:lnSpc>
-              <a:spcBef>
-                <a:spcPct val="0"/>
-              </a:spcBef>
-              <a:spcAft>
-                <a:spcPct val="0"/>
-              </a:spcAft>
-              <a:buClr>
-                <a:srgbClr val="000000"/>
-              </a:buClr>
-              <a:buSzPct val="100000"/>
-              <a:buFont typeface="Times New Roman" panose="02020603050405020304" pitchFamily="18" charset="0"/>
-              <a:defRPr sz="1900">
-                <a:solidFill>
-                  <a:schemeClr val="bg1"/>
-                </a:solidFill>
-                <a:latin typeface="Arial" panose="020B0604020202020204" pitchFamily="34" charset="0"/>
-                <a:ea typeface="MS PGothic" panose="020B0600070205080204" pitchFamily="34" charset="-128"/>
-              </a:defRPr>
-            </a:lvl9pPr>
-          </a:lstStyle>
-          <a:p>
-            <a:pPr eaLnBrk="1"/>
-            <a:r>
-              <a:rPr lang="en-US" altLang="en-US" dirty="0">
-                <a:solidFill>
-                  <a:schemeClr val="tx1"/>
-                </a:solidFill>
-              </a:rPr>
-              <a:t>@</a:t>
-            </a:r>
-            <a:r>
-              <a:rPr lang="en-US" altLang="en-US" dirty="0" err="1">
-                <a:solidFill>
-                  <a:schemeClr val="tx1"/>
-                </a:solidFill>
-              </a:rPr>
-              <a:t>bazza_ni</a:t>
-            </a:r>
-            <a:endParaRPr lang="en-US" altLang="en-US" dirty="0">
-              <a:solidFill>
-                <a:schemeClr val="tx1"/>
-              </a:solidFill>
-            </a:endParaRPr>
-          </a:p>
-        </p:txBody>
-      </p:sp>
-      <p:sp>
-        <p:nvSpPr>
-          <p:cNvPr id="9" name="Title 1">
-            <a:extLst>
-              <a:ext uri="{FF2B5EF4-FFF2-40B4-BE49-F238E27FC236}">
-                <a16:creationId xmlns:a16="http://schemas.microsoft.com/office/drawing/2014/main" id="{419C89CD-A480-49DF-97CE-19F37389AD1D}"/>
+                <a16:creationId xmlns:a16="http://schemas.microsoft.com/office/drawing/2014/main" xmlns="" id="{6FCCBA75-7662-4752-8F74-B705EDAC9965}"/>
               </a:ext>
             </a:extLst>
           </p:cNvPr>
@@ -10575,399 +9666,6 @@
           <a:bodyPr/>
           <a:lstStyle/>
           <a:p>
-            <a:pPr defTabSz="370286">
-              <a:buFont typeface="Times New Roman" charset="0"/>
-              <a:buNone/>
-              <a:defRPr/>
-            </a:pPr>
-            <a:r>
-              <a:rPr lang="en-US" dirty="0">
-                <a:ea typeface="+mj-ea"/>
-              </a:rPr>
-              <a:t>About Me</a:t>
-            </a:r>
-          </a:p>
-        </p:txBody>
-      </p:sp>
-      <p:sp>
-        <p:nvSpPr>
-          <p:cNvPr id="2" name="TextBox 1">
-            <a:extLst>
-              <a:ext uri="{FF2B5EF4-FFF2-40B4-BE49-F238E27FC236}">
-                <a16:creationId xmlns:a16="http://schemas.microsoft.com/office/drawing/2014/main" id="{D780B107-FBA7-4FB1-85CD-3A562D980BE1}"/>
-              </a:ext>
-            </a:extLst>
-          </p:cNvPr>
-          <p:cNvSpPr txBox="1"/>
-          <p:nvPr/>
-        </p:nvSpPr>
-        <p:spPr>
-          <a:xfrm>
-            <a:off x="1371600" y="1276350"/>
-            <a:ext cx="2286000" cy="1978316"/>
-          </a:xfrm>
-          <a:prstGeom prst="rect">
-            <a:avLst/>
-          </a:prstGeom>
-          <a:noFill/>
-        </p:spPr>
-        <p:txBody>
-          <a:bodyPr wrap="square" lIns="74057" tIns="37029" rIns="74057" bIns="37029">
-            <a:spAutoFit/>
-          </a:bodyPr>
-          <a:lstStyle/>
-          <a:p>
-            <a:pPr algn="ctr" defTabSz="370286">
-              <a:buFont typeface="Times New Roman" charset="0"/>
-              <a:buNone/>
-              <a:defRPr/>
-            </a:pPr>
-            <a:endParaRPr lang="en-US" dirty="0">
-              <a:solidFill>
-                <a:schemeClr val="tx1"/>
-              </a:solidFill>
-              <a:latin typeface="Arial" charset="0"/>
-              <a:ea typeface="ＭＳ Ｐゴシック" charset="0"/>
-            </a:endParaRPr>
-          </a:p>
-          <a:p>
-            <a:pPr defTabSz="370286">
-              <a:buFont typeface="Times New Roman" charset="0"/>
-              <a:buNone/>
-              <a:defRPr/>
-            </a:pPr>
-            <a:r>
-              <a:rPr lang="en-US" u="sng" dirty="0">
-                <a:solidFill>
-                  <a:schemeClr val="tx1"/>
-                </a:solidFill>
-                <a:latin typeface="Arial" charset="0"/>
-                <a:ea typeface="ＭＳ Ｐゴシック" charset="0"/>
-              </a:rPr>
-              <a:t>11 years as</a:t>
-            </a:r>
-          </a:p>
-          <a:p>
-            <a:pPr defTabSz="370286">
-              <a:buFont typeface="Times New Roman" charset="0"/>
-              <a:buNone/>
-              <a:defRPr/>
-            </a:pPr>
-            <a:endParaRPr lang="en-US" dirty="0">
-              <a:solidFill>
-                <a:schemeClr val="tx1"/>
-              </a:solidFill>
-              <a:latin typeface="Arial" charset="0"/>
-              <a:ea typeface="ＭＳ Ｐゴシック" charset="0"/>
-            </a:endParaRPr>
-          </a:p>
-          <a:p>
-            <a:pPr marL="277715" indent="-277715" defTabSz="370286">
-              <a:buFont typeface="Arial"/>
-              <a:buChar char="•"/>
-              <a:defRPr/>
-            </a:pPr>
-            <a:r>
-              <a:rPr lang="en-US" dirty="0">
-                <a:solidFill>
-                  <a:schemeClr val="tx1"/>
-                </a:solidFill>
-                <a:latin typeface="Arial" charset="0"/>
-                <a:ea typeface="ＭＳ Ｐゴシック" charset="0"/>
-              </a:rPr>
-              <a:t>Java Developer</a:t>
-            </a:r>
-          </a:p>
-          <a:p>
-            <a:pPr marL="277715" indent="-277715" defTabSz="370286">
-              <a:buFont typeface="Arial"/>
-              <a:buChar char="•"/>
-              <a:defRPr/>
-            </a:pPr>
-            <a:endParaRPr lang="en-US" dirty="0">
-              <a:solidFill>
-                <a:schemeClr val="tx1"/>
-              </a:solidFill>
-              <a:latin typeface="Arial" charset="0"/>
-              <a:ea typeface="ＭＳ Ｐゴシック" charset="0"/>
-            </a:endParaRPr>
-          </a:p>
-          <a:p>
-            <a:pPr marL="277715" indent="-277715" defTabSz="370286">
-              <a:buFont typeface="Arial"/>
-              <a:buChar char="•"/>
-              <a:defRPr/>
-            </a:pPr>
-            <a:r>
-              <a:rPr lang="en-US" dirty="0">
-                <a:solidFill>
-                  <a:schemeClr val="tx1"/>
-                </a:solidFill>
-                <a:latin typeface="Arial" charset="0"/>
-                <a:ea typeface="ＭＳ Ｐゴシック" charset="0"/>
-              </a:rPr>
-              <a:t>JUnit user</a:t>
-            </a:r>
-          </a:p>
-          <a:p>
-            <a:pPr marL="277715" indent="-277715" defTabSz="370286">
-              <a:buFont typeface="Arial"/>
-              <a:buChar char="•"/>
-              <a:defRPr/>
-            </a:pPr>
-            <a:endParaRPr lang="en-US" dirty="0">
-              <a:solidFill>
-                <a:schemeClr val="tx1"/>
-              </a:solidFill>
-              <a:latin typeface="Arial" charset="0"/>
-              <a:ea typeface="ＭＳ Ｐゴシック" charset="0"/>
-            </a:endParaRPr>
-          </a:p>
-        </p:txBody>
-      </p:sp>
-      <p:sp>
-        <p:nvSpPr>
-          <p:cNvPr id="3" name="Rectangle 2">
-            <a:extLst>
-              <a:ext uri="{FF2B5EF4-FFF2-40B4-BE49-F238E27FC236}">
-                <a16:creationId xmlns:a16="http://schemas.microsoft.com/office/drawing/2014/main" id="{805D1496-1E2E-47EF-9ECB-EB1508ACA500}"/>
-              </a:ext>
-            </a:extLst>
-          </p:cNvPr>
-          <p:cNvSpPr/>
-          <p:nvPr/>
-        </p:nvSpPr>
-        <p:spPr>
-          <a:xfrm>
-            <a:off x="4343400" y="2419350"/>
-            <a:ext cx="4572000" cy="992579"/>
-          </a:xfrm>
-          <a:prstGeom prst="rect">
-            <a:avLst/>
-          </a:prstGeom>
-        </p:spPr>
-        <p:txBody>
-          <a:bodyPr>
-            <a:spAutoFit/>
-          </a:bodyPr>
-          <a:lstStyle/>
-          <a:p>
-            <a:pPr marL="457200" indent="-323850">
-              <a:lnSpc>
-                <a:spcPct val="150000"/>
-              </a:lnSpc>
-              <a:buFont typeface="Proxima Nova"/>
-              <a:buChar char="-"/>
-            </a:pPr>
-            <a:endParaRPr lang="en-GB" dirty="0">
-              <a:solidFill>
-                <a:schemeClr val="tx1"/>
-              </a:solidFill>
-              <a:latin typeface="Arial" charset="0"/>
-              <a:ea typeface="ＭＳ Ｐゴシック" charset="0"/>
-            </a:endParaRPr>
-          </a:p>
-          <a:p>
-            <a:pPr marL="457200" indent="-323850">
-              <a:lnSpc>
-                <a:spcPct val="150000"/>
-              </a:lnSpc>
-              <a:buFont typeface="Proxima Nova"/>
-              <a:buChar char="-"/>
-            </a:pPr>
-            <a:endParaRPr lang="en-GB" dirty="0">
-              <a:solidFill>
-                <a:schemeClr val="tx1"/>
-              </a:solidFill>
-              <a:latin typeface="Arial" charset="0"/>
-              <a:ea typeface="ＭＳ Ｐゴシック" charset="0"/>
-            </a:endParaRPr>
-          </a:p>
-        </p:txBody>
-      </p:sp>
-      <p:sp>
-        <p:nvSpPr>
-          <p:cNvPr id="7" name="TextBox 6">
-            <a:extLst>
-              <a:ext uri="{FF2B5EF4-FFF2-40B4-BE49-F238E27FC236}">
-                <a16:creationId xmlns:a16="http://schemas.microsoft.com/office/drawing/2014/main" id="{95EA28A7-00E7-48A9-9540-C527EB027079}"/>
-              </a:ext>
-            </a:extLst>
-          </p:cNvPr>
-          <p:cNvSpPr txBox="1"/>
-          <p:nvPr/>
-        </p:nvSpPr>
-        <p:spPr>
-          <a:xfrm>
-            <a:off x="4724400" y="1809750"/>
-            <a:ext cx="3886200" cy="1191112"/>
-          </a:xfrm>
-          <a:prstGeom prst="rect">
-            <a:avLst/>
-          </a:prstGeom>
-          <a:noFill/>
-        </p:spPr>
-        <p:txBody>
-          <a:bodyPr wrap="square" lIns="74057" tIns="37029" rIns="74057" bIns="37029">
-            <a:spAutoFit/>
-          </a:bodyPr>
-          <a:lstStyle/>
-          <a:p>
-            <a:pPr algn="ctr" defTabSz="370286">
-              <a:buFont typeface="Times New Roman" charset="0"/>
-              <a:buNone/>
-              <a:defRPr/>
-            </a:pPr>
-            <a:endParaRPr lang="en-US" dirty="0">
-              <a:solidFill>
-                <a:schemeClr val="tx1"/>
-              </a:solidFill>
-              <a:latin typeface="Arial" charset="0"/>
-              <a:ea typeface="ＭＳ Ｐゴシック" charset="0"/>
-            </a:endParaRPr>
-          </a:p>
-          <a:p>
-            <a:pPr marL="277715" indent="-277715" defTabSz="370286">
-              <a:buFont typeface="Arial"/>
-              <a:buChar char="•"/>
-              <a:defRPr/>
-            </a:pPr>
-            <a:r>
-              <a:rPr lang="en-GB" sz="2000" dirty="0">
-                <a:solidFill>
-                  <a:srgbClr val="00B050"/>
-                </a:solidFill>
-              </a:rPr>
-              <a:t>💚</a:t>
-            </a:r>
-            <a:r>
-              <a:rPr lang="en-GB" sz="2000" dirty="0">
-                <a:solidFill>
-                  <a:srgbClr val="5382A1"/>
-                </a:solidFill>
-              </a:rPr>
-              <a:t> </a:t>
-            </a:r>
-            <a:r>
-              <a:rPr lang="en-GB" dirty="0">
-                <a:solidFill>
-                  <a:schemeClr val="tx1"/>
-                </a:solidFill>
-                <a:latin typeface="Arial" charset="0"/>
-                <a:ea typeface="ＭＳ Ｐゴシック" charset="0"/>
-              </a:rPr>
-              <a:t>Clean Code &amp; TDD</a:t>
-            </a:r>
-            <a:endParaRPr lang="en-US" dirty="0">
-              <a:solidFill>
-                <a:schemeClr val="tx1"/>
-              </a:solidFill>
-              <a:latin typeface="Arial" charset="0"/>
-              <a:ea typeface="ＭＳ Ｐゴシック" charset="0"/>
-            </a:endParaRPr>
-          </a:p>
-          <a:p>
-            <a:pPr marL="277715" indent="-277715" defTabSz="370286">
-              <a:buFont typeface="Arial"/>
-              <a:buChar char="•"/>
-              <a:defRPr/>
-            </a:pPr>
-            <a:endParaRPr lang="en-US" dirty="0">
-              <a:solidFill>
-                <a:schemeClr val="tx1"/>
-              </a:solidFill>
-              <a:latin typeface="Arial" charset="0"/>
-              <a:ea typeface="ＭＳ Ｐゴシック" charset="0"/>
-            </a:endParaRPr>
-          </a:p>
-          <a:p>
-            <a:pPr marL="277715" indent="-277715" defTabSz="370286">
-              <a:buFont typeface="Arial"/>
-              <a:buChar char="•"/>
-              <a:defRPr/>
-            </a:pPr>
-            <a:r>
-              <a:rPr lang="en-GB" sz="2000" b="1" dirty="0">
-                <a:solidFill>
-                  <a:srgbClr val="FF0000"/>
-                </a:solidFill>
-              </a:rPr>
-              <a:t>💔</a:t>
-            </a:r>
-            <a:r>
-              <a:rPr lang="en-GB" sz="2000" dirty="0">
-                <a:solidFill>
-                  <a:srgbClr val="5382A1"/>
-                </a:solidFill>
-              </a:rPr>
-              <a:t> </a:t>
-            </a:r>
-            <a:r>
-              <a:rPr lang="en-GB" dirty="0">
-                <a:solidFill>
-                  <a:schemeClr val="tx1"/>
-                </a:solidFill>
-                <a:latin typeface="Arial" charset="0"/>
-                <a:ea typeface="ＭＳ Ｐゴシック" charset="0"/>
-              </a:rPr>
-              <a:t>Bugs &amp; Untested Code</a:t>
-            </a:r>
-            <a:endParaRPr lang="en-US" dirty="0">
-              <a:solidFill>
-                <a:schemeClr val="tx1"/>
-              </a:solidFill>
-              <a:latin typeface="Arial" charset="0"/>
-              <a:ea typeface="ＭＳ Ｐゴシック" charset="0"/>
-            </a:endParaRPr>
-          </a:p>
-        </p:txBody>
-      </p:sp>
-    </p:spTree>
-  </p:cSld>
-  <p:clrMapOvr>
-    <a:masterClrMapping/>
-  </p:clrMapOvr>
-</p:sld>
-</file>
-
-<file path=ppt/slides/slide3.xml><?xml version="1.0" encoding="utf-8"?>
-<p:sld xmlns:a="http://schemas.openxmlformats.org/drawingml/2006/main" xmlns:r="http://schemas.openxmlformats.org/officeDocument/2006/relationships" xmlns:p="http://schemas.openxmlformats.org/presentationml/2006/main">
-  <p:cSld>
-    <p:spTree>
-      <p:nvGrpSpPr>
-        <p:cNvPr id="1" name=""/>
-        <p:cNvGrpSpPr/>
-        <p:nvPr/>
-      </p:nvGrpSpPr>
-      <p:grpSpPr>
-        <a:xfrm>
-          <a:off x="0" y="0"/>
-          <a:ext cx="0" cy="0"/>
-          <a:chOff x="0" y="0"/>
-          <a:chExt cx="0" cy="0"/>
-        </a:xfrm>
-      </p:grpSpPr>
-      <p:sp>
-        <p:nvSpPr>
-          <p:cNvPr id="2" name="Title 1">
-            <a:extLst>
-              <a:ext uri="{FF2B5EF4-FFF2-40B4-BE49-F238E27FC236}">
-                <a16:creationId xmlns:a16="http://schemas.microsoft.com/office/drawing/2014/main" id="{6FCCBA75-7662-4752-8F74-B705EDAC9965}"/>
-              </a:ext>
-            </a:extLst>
-          </p:cNvPr>
-          <p:cNvSpPr>
-            <a:spLocks noGrp="1"/>
-          </p:cNvSpPr>
-          <p:nvPr>
-            <p:ph type="title"/>
-          </p:nvPr>
-        </p:nvSpPr>
-        <p:spPr/>
-        <p:txBody>
-          <a:bodyPr/>
-          <a:lstStyle/>
-          <a:p>
             <a:r>
               <a:rPr lang="en-IE" dirty="0"/>
               <a:t>Meet Jim…</a:t>
@@ -10981,7 +9679,7 @@
           <p:cNvPr id="7" name="Content Placeholder 6">
             <a:extLst>
               <a:ext uri="{FF2B5EF4-FFF2-40B4-BE49-F238E27FC236}">
-                <a16:creationId xmlns:a16="http://schemas.microsoft.com/office/drawing/2014/main" id="{FF3577EF-27F8-47F9-B999-574B085E14E9}"/>
+                <a16:creationId xmlns:a16="http://schemas.microsoft.com/office/drawing/2014/main" xmlns="" id="{FF3577EF-27F8-47F9-B999-574B085E14E9}"/>
               </a:ext>
             </a:extLst>
           </p:cNvPr>
@@ -11018,7 +9716,7 @@
 </p:sld>
 </file>
 
-<file path=ppt/slides/slide4.xml><?xml version="1.0" encoding="utf-8"?>
+<file path=ppt/slides/slide3.xml><?xml version="1.0" encoding="utf-8"?>
 <p:sld xmlns:a="http://schemas.openxmlformats.org/drawingml/2006/main" xmlns:r="http://schemas.openxmlformats.org/officeDocument/2006/relationships" xmlns:p="http://schemas.openxmlformats.org/presentationml/2006/main">
   <p:cSld>
     <p:spTree>
@@ -11040,7 +9738,7 @@
           <p:cNvPr id="2" name="Title 1">
             <a:extLst>
               <a:ext uri="{FF2B5EF4-FFF2-40B4-BE49-F238E27FC236}">
-                <a16:creationId xmlns:a16="http://schemas.microsoft.com/office/drawing/2014/main" id="{6FCCBA75-7662-4752-8F74-B705EDAC9965}"/>
+                <a16:creationId xmlns:a16="http://schemas.microsoft.com/office/drawing/2014/main" xmlns="" id="{6FCCBA75-7662-4752-8F74-B705EDAC9965}"/>
               </a:ext>
             </a:extLst>
           </p:cNvPr>
@@ -11073,7 +9771,7 @@
           <p:cNvPr id="5" name="Content Placeholder 4">
             <a:extLst>
               <a:ext uri="{FF2B5EF4-FFF2-40B4-BE49-F238E27FC236}">
-                <a16:creationId xmlns:a16="http://schemas.microsoft.com/office/drawing/2014/main" id="{D273F107-DF92-42E2-9AAE-CB9330E8A2F2}"/>
+                <a16:creationId xmlns:a16="http://schemas.microsoft.com/office/drawing/2014/main" xmlns="" id="{D273F107-DF92-42E2-9AAE-CB9330E8A2F2}"/>
               </a:ext>
             </a:extLst>
           </p:cNvPr>
@@ -11110,7 +9808,7 @@
 </p:sld>
 </file>
 
-<file path=ppt/slides/slide5.xml><?xml version="1.0" encoding="utf-8"?>
+<file path=ppt/slides/slide4.xml><?xml version="1.0" encoding="utf-8"?>
 <p:sld xmlns:a="http://schemas.openxmlformats.org/drawingml/2006/main" xmlns:r="http://schemas.openxmlformats.org/officeDocument/2006/relationships" xmlns:p="http://schemas.openxmlformats.org/presentationml/2006/main">
   <p:cSld>
     <p:spTree>
@@ -11132,7 +9830,7 @@
           <p:cNvPr id="2" name="Title 1">
             <a:extLst>
               <a:ext uri="{FF2B5EF4-FFF2-40B4-BE49-F238E27FC236}">
-                <a16:creationId xmlns:a16="http://schemas.microsoft.com/office/drawing/2014/main" id="{609952A0-2D82-4ECC-B631-4D4465425C7C}"/>
+                <a16:creationId xmlns:a16="http://schemas.microsoft.com/office/drawing/2014/main" xmlns="" id="{609952A0-2D82-4ECC-B631-4D4465425C7C}"/>
               </a:ext>
             </a:extLst>
           </p:cNvPr>
@@ -11167,7 +9865,7 @@
           <p:cNvPr id="3" name="Content Placeholder 2">
             <a:extLst>
               <a:ext uri="{FF2B5EF4-FFF2-40B4-BE49-F238E27FC236}">
-                <a16:creationId xmlns:a16="http://schemas.microsoft.com/office/drawing/2014/main" id="{0EF78D32-0345-4FDA-AC20-757FE9A508E3}"/>
+                <a16:creationId xmlns:a16="http://schemas.microsoft.com/office/drawing/2014/main" xmlns="" id="{0EF78D32-0345-4FDA-AC20-757FE9A508E3}"/>
               </a:ext>
             </a:extLst>
           </p:cNvPr>
@@ -11300,7 +9998,7 @@
 </p:sld>
 </file>
 
-<file path=ppt/slides/slide6.xml><?xml version="1.0" encoding="utf-8"?>
+<file path=ppt/slides/slide5.xml><?xml version="1.0" encoding="utf-8"?>
 <p:sld xmlns:a="http://schemas.openxmlformats.org/drawingml/2006/main" xmlns:r="http://schemas.openxmlformats.org/officeDocument/2006/relationships" xmlns:p="http://schemas.openxmlformats.org/presentationml/2006/main">
   <p:cSld>
     <p:spTree>
@@ -11322,7 +10020,7 @@
           <p:cNvPr id="31745" name="Picture 7">
             <a:extLst>
               <a:ext uri="{FF2B5EF4-FFF2-40B4-BE49-F238E27FC236}">
-                <a16:creationId xmlns:a16="http://schemas.microsoft.com/office/drawing/2014/main" id="{6870422A-B84C-4A29-83F2-FE959D4783F8}"/>
+                <a16:creationId xmlns:a16="http://schemas.microsoft.com/office/drawing/2014/main" xmlns="" id="{6870422A-B84C-4A29-83F2-FE959D4783F8}"/>
               </a:ext>
             </a:extLst>
           </p:cNvPr>
@@ -11382,7 +10080,7 @@
           <p:cNvPr id="31746" name="Picture 8">
             <a:extLst>
               <a:ext uri="{FF2B5EF4-FFF2-40B4-BE49-F238E27FC236}">
-                <a16:creationId xmlns:a16="http://schemas.microsoft.com/office/drawing/2014/main" id="{8B4212F5-7BA9-4CBC-B1D9-4C069284D6B2}"/>
+                <a16:creationId xmlns:a16="http://schemas.microsoft.com/office/drawing/2014/main" xmlns="" id="{8B4212F5-7BA9-4CBC-B1D9-4C069284D6B2}"/>
               </a:ext>
             </a:extLst>
           </p:cNvPr>
@@ -11442,7 +10140,7 @@
           <p:cNvPr id="31747" name="Picture 9">
             <a:extLst>
               <a:ext uri="{FF2B5EF4-FFF2-40B4-BE49-F238E27FC236}">
-                <a16:creationId xmlns:a16="http://schemas.microsoft.com/office/drawing/2014/main" id="{28ABDAAA-136A-40F2-B382-50C1AF5A4B3B}"/>
+                <a16:creationId xmlns:a16="http://schemas.microsoft.com/office/drawing/2014/main" xmlns="" id="{28ABDAAA-136A-40F2-B382-50C1AF5A4B3B}"/>
               </a:ext>
             </a:extLst>
           </p:cNvPr>
@@ -11502,7 +10200,7 @@
           <p:cNvPr id="31748" name="Picture 12">
             <a:extLst>
               <a:ext uri="{FF2B5EF4-FFF2-40B4-BE49-F238E27FC236}">
-                <a16:creationId xmlns:a16="http://schemas.microsoft.com/office/drawing/2014/main" id="{8502D784-667D-4512-8E91-6CB3B6AF18F5}"/>
+                <a16:creationId xmlns:a16="http://schemas.microsoft.com/office/drawing/2014/main" xmlns="" id="{8502D784-667D-4512-8E91-6CB3B6AF18F5}"/>
               </a:ext>
             </a:extLst>
           </p:cNvPr>
@@ -11562,7 +10260,7 @@
           <p:cNvPr id="31749" name="Picture 13">
             <a:extLst>
               <a:ext uri="{FF2B5EF4-FFF2-40B4-BE49-F238E27FC236}">
-                <a16:creationId xmlns:a16="http://schemas.microsoft.com/office/drawing/2014/main" id="{68432DC3-A885-497D-91EE-42B2375DDA14}"/>
+                <a16:creationId xmlns:a16="http://schemas.microsoft.com/office/drawing/2014/main" xmlns="" id="{68432DC3-A885-497D-91EE-42B2375DDA14}"/>
               </a:ext>
             </a:extLst>
           </p:cNvPr>
@@ -11622,7 +10320,7 @@
           <p:cNvPr id="31750" name="Picture 14">
             <a:extLst>
               <a:ext uri="{FF2B5EF4-FFF2-40B4-BE49-F238E27FC236}">
-                <a16:creationId xmlns:a16="http://schemas.microsoft.com/office/drawing/2014/main" id="{27833088-210B-4FF3-AE24-A656533B6AB2}"/>
+                <a16:creationId xmlns:a16="http://schemas.microsoft.com/office/drawing/2014/main" xmlns="" id="{27833088-210B-4FF3-AE24-A656533B6AB2}"/>
               </a:ext>
             </a:extLst>
           </p:cNvPr>
@@ -11682,7 +10380,7 @@
           <p:cNvPr id="31751" name="TextBox 16">
             <a:extLst>
               <a:ext uri="{FF2B5EF4-FFF2-40B4-BE49-F238E27FC236}">
-                <a16:creationId xmlns:a16="http://schemas.microsoft.com/office/drawing/2014/main" id="{9FED4914-2DF4-4715-9A55-E227E47F785D}"/>
+                <a16:creationId xmlns:a16="http://schemas.microsoft.com/office/drawing/2014/main" xmlns="" id="{9FED4914-2DF4-4715-9A55-E227E47F785D}"/>
               </a:ext>
             </a:extLst>
           </p:cNvPr>
@@ -11884,7 +10582,7 @@
           <p:cNvPr id="31752" name="TextBox 17">
             <a:extLst>
               <a:ext uri="{FF2B5EF4-FFF2-40B4-BE49-F238E27FC236}">
-                <a16:creationId xmlns:a16="http://schemas.microsoft.com/office/drawing/2014/main" id="{B497B073-BE6E-4442-9720-662385A87332}"/>
+                <a16:creationId xmlns:a16="http://schemas.microsoft.com/office/drawing/2014/main" xmlns="" id="{B497B073-BE6E-4442-9720-662385A87332}"/>
               </a:ext>
             </a:extLst>
           </p:cNvPr>
@@ -12086,7 +10784,7 @@
           <p:cNvPr id="19" name="Straight Connector 18">
             <a:extLst>
               <a:ext uri="{FF2B5EF4-FFF2-40B4-BE49-F238E27FC236}">
-                <a16:creationId xmlns:a16="http://schemas.microsoft.com/office/drawing/2014/main" id="{5D3441AC-3D0D-4950-B80E-674CC8D7ED78}"/>
+                <a16:creationId xmlns:a16="http://schemas.microsoft.com/office/drawing/2014/main" xmlns="" id="{5D3441AC-3D0D-4950-B80E-674CC8D7ED78}"/>
               </a:ext>
             </a:extLst>
           </p:cNvPr>
@@ -12116,7 +10814,7 @@
           <a:effectLst/>
           <a:extLst>
             <a:ext uri="{AF507438-7753-43e0-B8FC-AC1667EBCBE1}">
-              <a14:hiddenEffects xmlns:a14="http://schemas.microsoft.com/office/drawing/2010/main" xmlns="">
+              <a14:hiddenEffects xmlns="" xmlns:a14="http://schemas.microsoft.com/office/drawing/2010/main">
                 <a:effectLst>
                   <a:outerShdw blurRad="63500" dist="38099" dir="2700000" algn="ctr" rotWithShape="0">
                     <a:schemeClr val="bg2">
@@ -12134,7 +10832,7 @@
           <p:cNvPr id="31754" name="TextBox 21">
             <a:extLst>
               <a:ext uri="{FF2B5EF4-FFF2-40B4-BE49-F238E27FC236}">
-                <a16:creationId xmlns:a16="http://schemas.microsoft.com/office/drawing/2014/main" id="{EFB2FF41-54C8-484D-B159-33B7ED72754B}"/>
+                <a16:creationId xmlns:a16="http://schemas.microsoft.com/office/drawing/2014/main" xmlns="" id="{EFB2FF41-54C8-484D-B159-33B7ED72754B}"/>
               </a:ext>
             </a:extLst>
           </p:cNvPr>
@@ -12339,7 +11037,7 @@
 </p:sld>
 </file>
 
-<file path=ppt/slides/slide7.xml><?xml version="1.0" encoding="utf-8"?>
+<file path=ppt/slides/slide6.xml><?xml version="1.0" encoding="utf-8"?>
 <p:sld xmlns:a="http://schemas.openxmlformats.org/drawingml/2006/main" xmlns:r="http://schemas.openxmlformats.org/officeDocument/2006/relationships" xmlns:p="http://schemas.openxmlformats.org/presentationml/2006/main">
   <p:cSld>
     <p:spTree>
@@ -12361,7 +11059,7 @@
           <p:cNvPr id="2" name="Title 1">
             <a:extLst>
               <a:ext uri="{FF2B5EF4-FFF2-40B4-BE49-F238E27FC236}">
-                <a16:creationId xmlns:a16="http://schemas.microsoft.com/office/drawing/2014/main" id="{AEF35A3C-6D04-4DD6-AFA3-05B5D0AE0B83}"/>
+                <a16:creationId xmlns:a16="http://schemas.microsoft.com/office/drawing/2014/main" xmlns="" id="{AEF35A3C-6D04-4DD6-AFA3-05B5D0AE0B83}"/>
               </a:ext>
             </a:extLst>
           </p:cNvPr>
@@ -12389,7 +11087,7 @@
           <p:cNvPr id="3" name="Content Placeholder 2">
             <a:extLst>
               <a:ext uri="{FF2B5EF4-FFF2-40B4-BE49-F238E27FC236}">
-                <a16:creationId xmlns:a16="http://schemas.microsoft.com/office/drawing/2014/main" id="{D066798B-99B6-4077-AB6A-F2A59EFAFE55}"/>
+                <a16:creationId xmlns:a16="http://schemas.microsoft.com/office/drawing/2014/main" xmlns="" id="{D066798B-99B6-4077-AB6A-F2A59EFAFE55}"/>
               </a:ext>
             </a:extLst>
           </p:cNvPr>
@@ -12500,7 +11198,7 @@
           <p:cNvPr id="4" name="Picture 2" descr="Image result for junit 5">
             <a:extLst>
               <a:ext uri="{FF2B5EF4-FFF2-40B4-BE49-F238E27FC236}">
-                <a16:creationId xmlns:a16="http://schemas.microsoft.com/office/drawing/2014/main" id="{E6ACAC9C-5F1B-43D3-B1A1-CC1DCEEB8BDE}"/>
+                <a16:creationId xmlns:a16="http://schemas.microsoft.com/office/drawing/2014/main" xmlns="" id="{E6ACAC9C-5F1B-43D3-B1A1-CC1DCEEB8BDE}"/>
               </a:ext>
             </a:extLst>
           </p:cNvPr>
@@ -12550,6 +11248,128 @@
 </p:sld>
 </file>
 
+<file path=ppt/slides/slide7.xml><?xml version="1.0" encoding="utf-8"?>
+<p:sld xmlns:a="http://schemas.openxmlformats.org/drawingml/2006/main" xmlns:r="http://schemas.openxmlformats.org/officeDocument/2006/relationships" xmlns:p="http://schemas.openxmlformats.org/presentationml/2006/main">
+  <p:cSld>
+    <p:spTree>
+      <p:nvGrpSpPr>
+        <p:cNvPr id="1" name=""/>
+        <p:cNvGrpSpPr/>
+        <p:nvPr/>
+      </p:nvGrpSpPr>
+      <p:grpSpPr>
+        <a:xfrm>
+          <a:off x="0" y="0"/>
+          <a:ext cx="0" cy="0"/>
+          <a:chOff x="0" y="0"/>
+          <a:chExt cx="0" cy="0"/>
+        </a:xfrm>
+      </p:grpSpPr>
+      <p:sp>
+        <p:nvSpPr>
+          <p:cNvPr id="2" name="Title 1">
+            <a:extLst>
+              <a:ext uri="{FF2B5EF4-FFF2-40B4-BE49-F238E27FC236}">
+                <a16:creationId xmlns:a16="http://schemas.microsoft.com/office/drawing/2014/main" xmlns="" id="{BC80DAB0-F147-407F-9ACB-62FA1D4F8BB7}"/>
+              </a:ext>
+            </a:extLst>
+          </p:cNvPr>
+          <p:cNvSpPr>
+            <a:spLocks noGrp="1"/>
+          </p:cNvSpPr>
+          <p:nvPr>
+            <p:ph type="title"/>
+          </p:nvPr>
+        </p:nvSpPr>
+        <p:spPr/>
+        <p:txBody>
+          <a:bodyPr/>
+          <a:lstStyle/>
+          <a:p>
+            <a:pPr defTabSz="370286">
+              <a:buFont typeface="Times New Roman" charset="0"/>
+              <a:buNone/>
+              <a:defRPr/>
+            </a:pPr>
+            <a:r>
+              <a:rPr lang="en-US" dirty="0">
+                <a:ea typeface="+mj-ea"/>
+              </a:rPr>
+              <a:t>Lab Flow</a:t>
+            </a:r>
+          </a:p>
+        </p:txBody>
+      </p:sp>
+      <p:sp>
+        <p:nvSpPr>
+          <p:cNvPr id="3" name="Content Placeholder 2">
+            <a:extLst>
+              <a:ext uri="{FF2B5EF4-FFF2-40B4-BE49-F238E27FC236}">
+                <a16:creationId xmlns:a16="http://schemas.microsoft.com/office/drawing/2014/main" xmlns="" id="{A2C275AB-83CC-470C-BCD2-7F3E5C481804}"/>
+              </a:ext>
+            </a:extLst>
+          </p:cNvPr>
+          <p:cNvSpPr>
+            <a:spLocks noGrp="1"/>
+          </p:cNvSpPr>
+          <p:nvPr>
+            <p:ph idx="1"/>
+          </p:nvPr>
+        </p:nvSpPr>
+        <p:spPr/>
+        <p:txBody>
+          <a:bodyPr/>
+          <a:lstStyle/>
+          <a:p>
+            <a:pPr marL="369888" indent="-369888">
+              <a:buFont typeface="Arial" panose="020B0604020202020204" pitchFamily="34" charset="0"/>
+              <a:buChar char="•"/>
+            </a:pPr>
+            <a:r>
+              <a:rPr lang="en-US" altLang="en-US" sz="2800" dirty="0"/>
+              <a:t>The lab is self paced</a:t>
+            </a:r>
+          </a:p>
+          <a:p>
+            <a:pPr marL="369888" indent="-369888">
+              <a:buFont typeface="Arial" panose="020B0604020202020204" pitchFamily="34" charset="0"/>
+              <a:buChar char="•"/>
+            </a:pPr>
+            <a:r>
+              <a:rPr lang="en-US" altLang="en-US" sz="2800" dirty="0"/>
+              <a:t>Raise your hand if you get stuck or have a question</a:t>
+            </a:r>
+          </a:p>
+          <a:p>
+            <a:pPr marL="369888" indent="-369888">
+              <a:buFont typeface="Arial" panose="020B0604020202020204" pitchFamily="34" charset="0"/>
+              <a:buChar char="•"/>
+            </a:pPr>
+            <a:r>
+              <a:rPr lang="en-US" altLang="en-US" sz="2800" dirty="0"/>
+              <a:t>If there is a FAQ, I’ll demo it on the screen.</a:t>
+            </a:r>
+          </a:p>
+          <a:p>
+            <a:pPr marL="369888" indent="-369888">
+              <a:buFont typeface="Arial" panose="020B0604020202020204" pitchFamily="34" charset="0"/>
+              <a:buChar char="•"/>
+            </a:pPr>
+            <a:r>
+              <a:rPr lang="en-US" altLang="en-US" sz="2800" dirty="0"/>
+              <a:t>Use 1 git commit per section</a:t>
+            </a:r>
+          </a:p>
+        </p:txBody>
+      </p:sp>
+    </p:spTree>
+  </p:cSld>
+  <p:clrMapOvr>
+    <a:masterClrMapping/>
+  </p:clrMapOvr>
+</p:sld>
+</file>
+
 <file path=ppt/slides/slide8.xml><?xml version="1.0" encoding="utf-8"?>
 <p:sld xmlns:a="http://schemas.openxmlformats.org/drawingml/2006/main" xmlns:r="http://schemas.openxmlformats.org/officeDocument/2006/relationships" xmlns:p="http://schemas.openxmlformats.org/presentationml/2006/main">
   <p:cSld>
@@ -12572,7 +11392,7 @@
           <p:cNvPr id="2" name="Title 1">
             <a:extLst>
               <a:ext uri="{FF2B5EF4-FFF2-40B4-BE49-F238E27FC236}">
-                <a16:creationId xmlns:a16="http://schemas.microsoft.com/office/drawing/2014/main" id="{BC80DAB0-F147-407F-9ACB-62FA1D4F8BB7}"/>
+                <a16:creationId xmlns:a16="http://schemas.microsoft.com/office/drawing/2014/main" xmlns="" id="{49652696-1EC9-4920-9C45-4FF657F92627}"/>
               </a:ext>
             </a:extLst>
           </p:cNvPr>
@@ -12597,128 +11417,6 @@
               <a:rPr lang="en-US" dirty="0">
                 <a:ea typeface="+mj-ea"/>
               </a:rPr>
-              <a:t>Lab Flow</a:t>
-            </a:r>
-          </a:p>
-        </p:txBody>
-      </p:sp>
-      <p:sp>
-        <p:nvSpPr>
-          <p:cNvPr id="3" name="Content Placeholder 2">
-            <a:extLst>
-              <a:ext uri="{FF2B5EF4-FFF2-40B4-BE49-F238E27FC236}">
-                <a16:creationId xmlns:a16="http://schemas.microsoft.com/office/drawing/2014/main" id="{A2C275AB-83CC-470C-BCD2-7F3E5C481804}"/>
-              </a:ext>
-            </a:extLst>
-          </p:cNvPr>
-          <p:cNvSpPr>
-            <a:spLocks noGrp="1"/>
-          </p:cNvSpPr>
-          <p:nvPr>
-            <p:ph idx="1"/>
-          </p:nvPr>
-        </p:nvSpPr>
-        <p:spPr/>
-        <p:txBody>
-          <a:bodyPr/>
-          <a:lstStyle/>
-          <a:p>
-            <a:pPr marL="369888" indent="-369888">
-              <a:buFont typeface="Arial" panose="020B0604020202020204" pitchFamily="34" charset="0"/>
-              <a:buChar char="•"/>
-            </a:pPr>
-            <a:r>
-              <a:rPr lang="en-US" altLang="en-US" sz="2800" dirty="0"/>
-              <a:t>The lab is self paced</a:t>
-            </a:r>
-          </a:p>
-          <a:p>
-            <a:pPr marL="369888" indent="-369888">
-              <a:buFont typeface="Arial" panose="020B0604020202020204" pitchFamily="34" charset="0"/>
-              <a:buChar char="•"/>
-            </a:pPr>
-            <a:r>
-              <a:rPr lang="en-US" altLang="en-US" sz="2800" dirty="0"/>
-              <a:t>Raise your hand if you get stuck or have a question</a:t>
-            </a:r>
-          </a:p>
-          <a:p>
-            <a:pPr marL="369888" indent="-369888">
-              <a:buFont typeface="Arial" panose="020B0604020202020204" pitchFamily="34" charset="0"/>
-              <a:buChar char="•"/>
-            </a:pPr>
-            <a:r>
-              <a:rPr lang="en-US" altLang="en-US" sz="2800" dirty="0"/>
-              <a:t>If there is a FAQ, I’ll demo it on the screen.</a:t>
-            </a:r>
-          </a:p>
-          <a:p>
-            <a:pPr marL="369888" indent="-369888">
-              <a:buFont typeface="Arial" panose="020B0604020202020204" pitchFamily="34" charset="0"/>
-              <a:buChar char="•"/>
-            </a:pPr>
-            <a:r>
-              <a:rPr lang="en-US" altLang="en-US" sz="2800" dirty="0"/>
-              <a:t>Use 1 git commit per section</a:t>
-            </a:r>
-          </a:p>
-        </p:txBody>
-      </p:sp>
-    </p:spTree>
-  </p:cSld>
-  <p:clrMapOvr>
-    <a:masterClrMapping/>
-  </p:clrMapOvr>
-</p:sld>
-</file>
-
-<file path=ppt/slides/slide9.xml><?xml version="1.0" encoding="utf-8"?>
-<p:sld xmlns:a="http://schemas.openxmlformats.org/drawingml/2006/main" xmlns:r="http://schemas.openxmlformats.org/officeDocument/2006/relationships" xmlns:p="http://schemas.openxmlformats.org/presentationml/2006/main">
-  <p:cSld>
-    <p:spTree>
-      <p:nvGrpSpPr>
-        <p:cNvPr id="1" name=""/>
-        <p:cNvGrpSpPr/>
-        <p:nvPr/>
-      </p:nvGrpSpPr>
-      <p:grpSpPr>
-        <a:xfrm>
-          <a:off x="0" y="0"/>
-          <a:ext cx="0" cy="0"/>
-          <a:chOff x="0" y="0"/>
-          <a:chExt cx="0" cy="0"/>
-        </a:xfrm>
-      </p:grpSpPr>
-      <p:sp>
-        <p:nvSpPr>
-          <p:cNvPr id="2" name="Title 1">
-            <a:extLst>
-              <a:ext uri="{FF2B5EF4-FFF2-40B4-BE49-F238E27FC236}">
-                <a16:creationId xmlns:a16="http://schemas.microsoft.com/office/drawing/2014/main" id="{49652696-1EC9-4920-9C45-4FF657F92627}"/>
-              </a:ext>
-            </a:extLst>
-          </p:cNvPr>
-          <p:cNvSpPr>
-            <a:spLocks noGrp="1"/>
-          </p:cNvSpPr>
-          <p:nvPr>
-            <p:ph type="title"/>
-          </p:nvPr>
-        </p:nvSpPr>
-        <p:spPr/>
-        <p:txBody>
-          <a:bodyPr/>
-          <a:lstStyle/>
-          <a:p>
-            <a:pPr defTabSz="370286">
-              <a:buFont typeface="Times New Roman" charset="0"/>
-              <a:buNone/>
-              <a:defRPr/>
-            </a:pPr>
-            <a:r>
-              <a:rPr lang="en-US" dirty="0">
-                <a:ea typeface="+mj-ea"/>
-              </a:rPr>
               <a:t>Before…</a:t>
             </a:r>
           </a:p>
@@ -12729,7 +11427,7 @@
           <p:cNvPr id="4" name="Content Placeholder 3">
             <a:extLst>
               <a:ext uri="{FF2B5EF4-FFF2-40B4-BE49-F238E27FC236}">
-                <a16:creationId xmlns:a16="http://schemas.microsoft.com/office/drawing/2014/main" id="{7A475299-DC12-4A6D-8D4B-900F501FE752}"/>
+                <a16:creationId xmlns:a16="http://schemas.microsoft.com/office/drawing/2014/main" xmlns="" id="{7A475299-DC12-4A6D-8D4B-900F501FE752}"/>
               </a:ext>
             </a:extLst>
           </p:cNvPr>
@@ -12760,6 +11458,101 @@
     <p:extLst>
       <p:ext uri="{BB962C8B-B14F-4D97-AF65-F5344CB8AC3E}">
         <p14:creationId xmlns:p14="http://schemas.microsoft.com/office/powerpoint/2010/main" val="1432686538"/>
+      </p:ext>
+    </p:extLst>
+  </p:cSld>
+  <p:clrMapOvr>
+    <a:masterClrMapping/>
+  </p:clrMapOvr>
+</p:sld>
+</file>
+
+<file path=ppt/slides/slide9.xml><?xml version="1.0" encoding="utf-8"?>
+<p:sld xmlns:a="http://schemas.openxmlformats.org/drawingml/2006/main" xmlns:r="http://schemas.openxmlformats.org/officeDocument/2006/relationships" xmlns:p="http://schemas.openxmlformats.org/presentationml/2006/main">
+  <p:cSld>
+    <p:spTree>
+      <p:nvGrpSpPr>
+        <p:cNvPr id="1" name=""/>
+        <p:cNvGrpSpPr/>
+        <p:nvPr/>
+      </p:nvGrpSpPr>
+      <p:grpSpPr>
+        <a:xfrm>
+          <a:off x="0" y="0"/>
+          <a:ext cx="0" cy="0"/>
+          <a:chOff x="0" y="0"/>
+          <a:chExt cx="0" cy="0"/>
+        </a:xfrm>
+      </p:grpSpPr>
+      <p:sp>
+        <p:nvSpPr>
+          <p:cNvPr id="2" name="Title 1">
+            <a:extLst>
+              <a:ext uri="{FF2B5EF4-FFF2-40B4-BE49-F238E27FC236}">
+                <a16:creationId xmlns:a16="http://schemas.microsoft.com/office/drawing/2014/main" xmlns="" id="{49652696-1EC9-4920-9C45-4FF657F92627}"/>
+              </a:ext>
+            </a:extLst>
+          </p:cNvPr>
+          <p:cNvSpPr>
+            <a:spLocks noGrp="1"/>
+          </p:cNvSpPr>
+          <p:nvPr>
+            <p:ph type="title"/>
+          </p:nvPr>
+        </p:nvSpPr>
+        <p:spPr/>
+        <p:txBody>
+          <a:bodyPr/>
+          <a:lstStyle/>
+          <a:p>
+            <a:pPr defTabSz="370286">
+              <a:buFont typeface="Times New Roman" charset="0"/>
+              <a:buNone/>
+              <a:defRPr/>
+            </a:pPr>
+            <a:r>
+              <a:rPr lang="en-US" dirty="0">
+                <a:ea typeface="+mj-ea"/>
+              </a:rPr>
+              <a:t>After…</a:t>
+            </a:r>
+          </a:p>
+        </p:txBody>
+      </p:sp>
+      <p:pic>
+        <p:nvPicPr>
+          <p:cNvPr id="6" name="Picture 5">
+            <a:extLst>
+              <a:ext uri="{FF2B5EF4-FFF2-40B4-BE49-F238E27FC236}">
+                <a16:creationId xmlns:a16="http://schemas.microsoft.com/office/drawing/2014/main" xmlns="" id="{B7230B95-95BA-4AAB-B0E5-49A6C17ED7E4}"/>
+              </a:ext>
+            </a:extLst>
+          </p:cNvPr>
+          <p:cNvPicPr>
+            <a:picLocks noChangeAspect="1"/>
+          </p:cNvPicPr>
+          <p:nvPr/>
+        </p:nvPicPr>
+        <p:blipFill>
+          <a:blip r:embed="rId2"/>
+          <a:stretch>
+            <a:fillRect/>
+          </a:stretch>
+        </p:blipFill>
+        <p:spPr>
+          <a:xfrm>
+            <a:off x="1982788" y="1253656"/>
+            <a:ext cx="5105400" cy="3169119"/>
+          </a:xfrm>
+          <a:prstGeom prst="rect">
+            <a:avLst/>
+          </a:prstGeom>
+        </p:spPr>
+      </p:pic>
+    </p:spTree>
+    <p:extLst>
+      <p:ext uri="{BB962C8B-B14F-4D97-AF65-F5344CB8AC3E}">
+        <p14:creationId xmlns:p14="http://schemas.microsoft.com/office/powerpoint/2010/main" val="1149604350"/>
       </p:ext>
     </p:extLst>
   </p:cSld>
@@ -13015,7 +11808,7 @@
         <a:effectLst/>
         <a:extLst>
           <a:ext uri="{AF507438-7753-43e0-B8FC-AC1667EBCBE1}">
-            <a14:hiddenEffects xmlns:a14="http://schemas.microsoft.com/office/drawing/2010/main" xmlns="">
+            <a14:hiddenEffects xmlns="" xmlns:a14="http://schemas.microsoft.com/office/drawing/2010/main">
               <a:effectLst>
                 <a:outerShdw blurRad="63500" dist="38099" dir="2700000" algn="ctr" rotWithShape="0">
                   <a:schemeClr val="bg2">
@@ -13094,7 +11887,7 @@
         <a:effectLst/>
         <a:extLst>
           <a:ext uri="{AF507438-7753-43e0-B8FC-AC1667EBCBE1}">
-            <a14:hiddenEffects xmlns:a14="http://schemas.microsoft.com/office/drawing/2010/main" xmlns="">
+            <a14:hiddenEffects xmlns="" xmlns:a14="http://schemas.microsoft.com/office/drawing/2010/main">
               <a:effectLst>
                 <a:outerShdw blurRad="63500" dist="38099" dir="2700000" algn="ctr" rotWithShape="0">
                   <a:schemeClr val="bg2">
@@ -13683,7 +12476,7 @@
         <a:effectLst/>
         <a:extLst>
           <a:ext uri="{AF507438-7753-43e0-B8FC-AC1667EBCBE1}">
-            <a14:hiddenEffects xmlns:a14="http://schemas.microsoft.com/office/drawing/2010/main" xmlns="">
+            <a14:hiddenEffects xmlns="" xmlns:a14="http://schemas.microsoft.com/office/drawing/2010/main">
               <a:effectLst>
                 <a:outerShdw blurRad="63500" dist="38099" dir="2700000" algn="ctr" rotWithShape="0">
                   <a:schemeClr val="bg2">
@@ -13762,7 +12555,7 @@
         <a:effectLst/>
         <a:extLst>
           <a:ext uri="{AF507438-7753-43e0-B8FC-AC1667EBCBE1}">
-            <a14:hiddenEffects xmlns:a14="http://schemas.microsoft.com/office/drawing/2010/main" xmlns="">
+            <a14:hiddenEffects xmlns="" xmlns:a14="http://schemas.microsoft.com/office/drawing/2010/main">
               <a:effectLst>
                 <a:outerShdw blurRad="63500" dist="38099" dir="2700000" algn="ctr" rotWithShape="0">
                   <a:schemeClr val="bg2">

</xml_diff>